<commit_message>
Reporte de monitoreo Abril
</commit_message>
<xml_diff>
--- a/qualtcom/Organizacional/Medicion y Monitoreo/Reporte Monitoreo-150227.pptx
+++ b/qualtcom/Organizacional/Medicion y Monitoreo/Reporte Monitoreo-150227.pptx
@@ -283,11 +283,11 @@
           <c:showBubbleSize val="0"/>
         </c:dLbls>
         <c:gapWidth val="150"/>
-        <c:axId val="85851504"/>
-        <c:axId val="85852064"/>
+        <c:axId val="71563616"/>
+        <c:axId val="71564176"/>
       </c:barChart>
       <c:catAx>
-        <c:axId val="85851504"/>
+        <c:axId val="71563616"/>
         <c:scaling>
           <c:orientation val="minMax"/>
         </c:scaling>
@@ -297,7 +297,7 @@
         <c:majorTickMark val="none"/>
         <c:minorTickMark val="none"/>
         <c:tickLblPos val="nextTo"/>
-        <c:crossAx val="85852064"/>
+        <c:crossAx val="71564176"/>
         <c:crosses val="autoZero"/>
         <c:auto val="1"/>
         <c:lblAlgn val="ctr"/>
@@ -305,7 +305,7 @@
         <c:noMultiLvlLbl val="0"/>
       </c:catAx>
       <c:valAx>
-        <c:axId val="85852064"/>
+        <c:axId val="71564176"/>
         <c:scaling>
           <c:orientation val="minMax"/>
         </c:scaling>
@@ -316,7 +316,7 @@
         <c:majorTickMark val="none"/>
         <c:minorTickMark val="none"/>
         <c:tickLblPos val="nextTo"/>
-        <c:crossAx val="85851504"/>
+        <c:crossAx val="71563616"/>
         <c:crosses val="autoZero"/>
         <c:crossBetween val="between"/>
       </c:valAx>
@@ -360,425 +360,12 @@
             </a:pPr>
             <a:r>
               <a:rPr lang="es-MX"/>
-              <a:t>Esfuerzo</a:t>
+              <a:t>Auditoria Fisica</a:t>
             </a:r>
           </a:p>
         </c:rich>
       </c:tx>
-      <c:overlay val="0"/>
-    </c:title>
-    <c:autoTitleDeleted val="0"/>
-    <c:plotArea>
       <c:layout/>
-      <c:barChart>
-        <c:barDir val="col"/>
-        <c:grouping val="clustered"/>
-        <c:varyColors val="0"/>
-        <c:ser>
-          <c:idx val="0"/>
-          <c:order val="0"/>
-          <c:tx>
-            <c:strRef>
-              <c:f>'Desviacion de esfuerzo'!$D$18:$D$19</c:f>
-              <c:strCache>
-                <c:ptCount val="2"/>
-                <c:pt idx="1">
-                  <c:v>Planeado</c:v>
-                </c:pt>
-              </c:strCache>
-            </c:strRef>
-          </c:tx>
-          <c:invertIfNegative val="0"/>
-          <c:cat>
-            <c:multiLvlStrRef>
-              <c:f>'Desviacion de esfuerzo'!$B$20:$C$23</c:f>
-              <c:multiLvlStrCache>
-                <c:ptCount val="4"/>
-                <c:lvl>
-                  <c:pt idx="0">
-                    <c:v>Preventivo</c:v>
-                  </c:pt>
-                  <c:pt idx="1">
-                    <c:v>Correctivo</c:v>
-                  </c:pt>
-                  <c:pt idx="2">
-                    <c:v>Preventivo</c:v>
-                  </c:pt>
-                  <c:pt idx="3">
-                    <c:v>Correctivo</c:v>
-                  </c:pt>
-                </c:lvl>
-                <c:lvl>
-                  <c:pt idx="0">
-                    <c:v>Entrega de Servicio</c:v>
-                  </c:pt>
-                  <c:pt idx="2">
-                    <c:v>Planeación</c:v>
-                  </c:pt>
-                </c:lvl>
-              </c:multiLvlStrCache>
-            </c:multiLvlStrRef>
-          </c:cat>
-          <c:val>
-            <c:numRef>
-              <c:f>'Desviacion de esfuerzo'!$D$20:$D$23</c:f>
-              <c:numCache>
-                <c:formatCode>General</c:formatCode>
-                <c:ptCount val="4"/>
-                <c:pt idx="0">
-                  <c:v>140</c:v>
-                </c:pt>
-                <c:pt idx="1">
-                  <c:v>140</c:v>
-                </c:pt>
-                <c:pt idx="2">
-                  <c:v>45.600000000000009</c:v>
-                </c:pt>
-                <c:pt idx="3">
-                  <c:v>91.200000000000017</c:v>
-                </c:pt>
-              </c:numCache>
-            </c:numRef>
-          </c:val>
-          <c:extLst>
-            <c:ext xmlns:c16="http://schemas.microsoft.com/office/drawing/2014/chart" uri="{C3380CC4-5D6E-409C-BE32-E72D297353CC}">
-              <c16:uniqueId val="{00000000-8F41-4054-8548-137549410953}"/>
-            </c:ext>
-          </c:extLst>
-        </c:ser>
-        <c:ser>
-          <c:idx val="1"/>
-          <c:order val="1"/>
-          <c:tx>
-            <c:strRef>
-              <c:f>'Desviacion de esfuerzo'!$E$18:$E$19</c:f>
-              <c:strCache>
-                <c:ptCount val="2"/>
-                <c:pt idx="1">
-                  <c:v>Real </c:v>
-                </c:pt>
-              </c:strCache>
-            </c:strRef>
-          </c:tx>
-          <c:invertIfNegative val="0"/>
-          <c:cat>
-            <c:multiLvlStrRef>
-              <c:f>'Desviacion de esfuerzo'!$B$20:$C$23</c:f>
-              <c:multiLvlStrCache>
-                <c:ptCount val="4"/>
-                <c:lvl>
-                  <c:pt idx="0">
-                    <c:v>Preventivo</c:v>
-                  </c:pt>
-                  <c:pt idx="1">
-                    <c:v>Correctivo</c:v>
-                  </c:pt>
-                  <c:pt idx="2">
-                    <c:v>Preventivo</c:v>
-                  </c:pt>
-                  <c:pt idx="3">
-                    <c:v>Correctivo</c:v>
-                  </c:pt>
-                </c:lvl>
-                <c:lvl>
-                  <c:pt idx="0">
-                    <c:v>Entrega de Servicio</c:v>
-                  </c:pt>
-                  <c:pt idx="2">
-                    <c:v>Planeación</c:v>
-                  </c:pt>
-                </c:lvl>
-              </c:multiLvlStrCache>
-            </c:multiLvlStrRef>
-          </c:cat>
-          <c:val>
-            <c:numRef>
-              <c:f>'Desviacion de esfuerzo'!$E$20:$E$23</c:f>
-              <c:numCache>
-                <c:formatCode>General</c:formatCode>
-                <c:ptCount val="4"/>
-                <c:pt idx="0">
-                  <c:v>0</c:v>
-                </c:pt>
-                <c:pt idx="1">
-                  <c:v>0</c:v>
-                </c:pt>
-                <c:pt idx="2">
-                  <c:v>25</c:v>
-                </c:pt>
-                <c:pt idx="3">
-                  <c:v>80</c:v>
-                </c:pt>
-              </c:numCache>
-            </c:numRef>
-          </c:val>
-          <c:extLst>
-            <c:ext xmlns:c16="http://schemas.microsoft.com/office/drawing/2014/chart" uri="{C3380CC4-5D6E-409C-BE32-E72D297353CC}">
-              <c16:uniqueId val="{00000001-8F41-4054-8548-137549410953}"/>
-            </c:ext>
-          </c:extLst>
-        </c:ser>
-        <c:dLbls>
-          <c:showLegendKey val="0"/>
-          <c:showVal val="0"/>
-          <c:showCatName val="0"/>
-          <c:showSerName val="0"/>
-          <c:showPercent val="0"/>
-          <c:showBubbleSize val="0"/>
-        </c:dLbls>
-        <c:gapWidth val="150"/>
-        <c:axId val="98294400"/>
-        <c:axId val="98294960"/>
-      </c:barChart>
-      <c:catAx>
-        <c:axId val="98294400"/>
-        <c:scaling>
-          <c:orientation val="minMax"/>
-        </c:scaling>
-        <c:delete val="0"/>
-        <c:axPos val="b"/>
-        <c:numFmt formatCode="General" sourceLinked="0"/>
-        <c:majorTickMark val="none"/>
-        <c:minorTickMark val="none"/>
-        <c:tickLblPos val="nextTo"/>
-        <c:crossAx val="98294960"/>
-        <c:crosses val="autoZero"/>
-        <c:auto val="1"/>
-        <c:lblAlgn val="ctr"/>
-        <c:lblOffset val="100"/>
-        <c:noMultiLvlLbl val="0"/>
-      </c:catAx>
-      <c:valAx>
-        <c:axId val="98294960"/>
-        <c:scaling>
-          <c:orientation val="minMax"/>
-        </c:scaling>
-        <c:delete val="0"/>
-        <c:axPos val="l"/>
-        <c:majorGridlines/>
-        <c:numFmt formatCode="General" sourceLinked="1"/>
-        <c:majorTickMark val="none"/>
-        <c:minorTickMark val="none"/>
-        <c:tickLblPos val="nextTo"/>
-        <c:crossAx val="98294400"/>
-        <c:crosses val="autoZero"/>
-        <c:crossBetween val="between"/>
-      </c:valAx>
-    </c:plotArea>
-    <c:legend>
-      <c:legendPos val="r"/>
-      <c:overlay val="0"/>
-    </c:legend>
-    <c:plotVisOnly val="1"/>
-    <c:dispBlanksAs val="gap"/>
-    <c:showDLblsOverMax val="0"/>
-  </c:chart>
-  <c:externalData r:id="rId1">
-    <c:autoUpdate val="0"/>
-  </c:externalData>
-</c:chartSpace>
-</file>
-
-<file path=ppt/charts/chart3.xml><?xml version="1.0" encoding="utf-8"?>
-<c:chartSpace xmlns:c="http://schemas.openxmlformats.org/drawingml/2006/chart" xmlns:a="http://schemas.openxmlformats.org/drawingml/2006/main" xmlns:r="http://schemas.openxmlformats.org/officeDocument/2006/relationships">
-  <c:date1904 val="0"/>
-  <c:lang val="es-ES"/>
-  <c:roundedCorners val="0"/>
-  <mc:AlternateContent xmlns:mc="http://schemas.openxmlformats.org/markup-compatibility/2006">
-    <mc:Choice xmlns:c14="http://schemas.microsoft.com/office/drawing/2007/8/2/chart" Requires="c14">
-      <c14:style val="102"/>
-    </mc:Choice>
-    <mc:Fallback>
-      <c:style val="2"/>
-    </mc:Fallback>
-  </mc:AlternateContent>
-  <c:chart>
-    <c:title>
-      <c:tx>
-        <c:rich>
-          <a:bodyPr/>
-          <a:lstStyle/>
-          <a:p>
-            <a:pPr>
-              <a:defRPr/>
-            </a:pPr>
-            <a:r>
-              <a:rPr lang="en-US"/>
-              <a:t>Desviación</a:t>
-            </a:r>
-          </a:p>
-        </c:rich>
-      </c:tx>
-      <c:overlay val="0"/>
-    </c:title>
-    <c:autoTitleDeleted val="0"/>
-    <c:plotArea>
-      <c:layout/>
-      <c:barChart>
-        <c:barDir val="col"/>
-        <c:grouping val="clustered"/>
-        <c:varyColors val="0"/>
-        <c:ser>
-          <c:idx val="0"/>
-          <c:order val="0"/>
-          <c:tx>
-            <c:strRef>
-              <c:f>'Desviacion de esfuerzo'!$F$18:$F$19</c:f>
-              <c:strCache>
-                <c:ptCount val="2"/>
-                <c:pt idx="1">
-                  <c:v>Desviación</c:v>
-                </c:pt>
-              </c:strCache>
-            </c:strRef>
-          </c:tx>
-          <c:invertIfNegative val="0"/>
-          <c:cat>
-            <c:multiLvlStrRef>
-              <c:f>'Desviacion de esfuerzo'!$B$20:$C$23</c:f>
-              <c:multiLvlStrCache>
-                <c:ptCount val="4"/>
-                <c:lvl>
-                  <c:pt idx="0">
-                    <c:v>Preventivo</c:v>
-                  </c:pt>
-                  <c:pt idx="1">
-                    <c:v>Correctivo</c:v>
-                  </c:pt>
-                  <c:pt idx="2">
-                    <c:v>Preventivo</c:v>
-                  </c:pt>
-                  <c:pt idx="3">
-                    <c:v>Correctivo</c:v>
-                  </c:pt>
-                </c:lvl>
-                <c:lvl>
-                  <c:pt idx="0">
-                    <c:v>Entrega de Servicio</c:v>
-                  </c:pt>
-                  <c:pt idx="2">
-                    <c:v>Planeación</c:v>
-                  </c:pt>
-                </c:lvl>
-              </c:multiLvlStrCache>
-            </c:multiLvlStrRef>
-          </c:cat>
-          <c:val>
-            <c:numRef>
-              <c:f>'Desviacion de esfuerzo'!$F$20:$F$23</c:f>
-              <c:numCache>
-                <c:formatCode>0%</c:formatCode>
-                <c:ptCount val="4"/>
-                <c:pt idx="0">
-                  <c:v>1</c:v>
-                </c:pt>
-                <c:pt idx="1">
-                  <c:v>1</c:v>
-                </c:pt>
-                <c:pt idx="2">
-                  <c:v>0.45175438596491241</c:v>
-                </c:pt>
-                <c:pt idx="3">
-                  <c:v>0.12280701754385981</c:v>
-                </c:pt>
-              </c:numCache>
-            </c:numRef>
-          </c:val>
-          <c:extLst>
-            <c:ext xmlns:c16="http://schemas.microsoft.com/office/drawing/2014/chart" uri="{C3380CC4-5D6E-409C-BE32-E72D297353CC}">
-              <c16:uniqueId val="{00000000-3C06-4A10-8FB4-B31601AB0A35}"/>
-            </c:ext>
-          </c:extLst>
-        </c:ser>
-        <c:dLbls>
-          <c:showLegendKey val="0"/>
-          <c:showVal val="0"/>
-          <c:showCatName val="0"/>
-          <c:showSerName val="0"/>
-          <c:showPercent val="0"/>
-          <c:showBubbleSize val="0"/>
-        </c:dLbls>
-        <c:gapWidth val="150"/>
-        <c:axId val="98297200"/>
-        <c:axId val="98297760"/>
-      </c:barChart>
-      <c:catAx>
-        <c:axId val="98297200"/>
-        <c:scaling>
-          <c:orientation val="minMax"/>
-        </c:scaling>
-        <c:delete val="0"/>
-        <c:axPos val="b"/>
-        <c:numFmt formatCode="General" sourceLinked="0"/>
-        <c:majorTickMark val="out"/>
-        <c:minorTickMark val="none"/>
-        <c:tickLblPos val="nextTo"/>
-        <c:crossAx val="98297760"/>
-        <c:crosses val="autoZero"/>
-        <c:auto val="1"/>
-        <c:lblAlgn val="ctr"/>
-        <c:lblOffset val="100"/>
-        <c:noMultiLvlLbl val="0"/>
-      </c:catAx>
-      <c:valAx>
-        <c:axId val="98297760"/>
-        <c:scaling>
-          <c:orientation val="minMax"/>
-          <c:max val="1"/>
-          <c:min val="0"/>
-        </c:scaling>
-        <c:delete val="0"/>
-        <c:axPos val="l"/>
-        <c:majorGridlines/>
-        <c:numFmt formatCode="0%" sourceLinked="1"/>
-        <c:majorTickMark val="out"/>
-        <c:minorTickMark val="none"/>
-        <c:tickLblPos val="nextTo"/>
-        <c:crossAx val="98297200"/>
-        <c:crosses val="autoZero"/>
-        <c:crossBetween val="between"/>
-      </c:valAx>
-    </c:plotArea>
-    <c:plotVisOnly val="1"/>
-    <c:dispBlanksAs val="gap"/>
-    <c:showDLblsOverMax val="0"/>
-  </c:chart>
-  <c:externalData r:id="rId1">
-    <c:autoUpdate val="0"/>
-  </c:externalData>
-</c:chartSpace>
-</file>
-
-<file path=ppt/charts/chart4.xml><?xml version="1.0" encoding="utf-8"?>
-<c:chartSpace xmlns:c="http://schemas.openxmlformats.org/drawingml/2006/chart" xmlns:a="http://schemas.openxmlformats.org/drawingml/2006/main" xmlns:r="http://schemas.openxmlformats.org/officeDocument/2006/relationships">
-  <c:date1904 val="0"/>
-  <c:lang val="es-ES"/>
-  <c:roundedCorners val="0"/>
-  <mc:AlternateContent xmlns:mc="http://schemas.openxmlformats.org/markup-compatibility/2006">
-    <mc:Choice xmlns:c14="http://schemas.microsoft.com/office/drawing/2007/8/2/chart" Requires="c14">
-      <c14:style val="102"/>
-    </mc:Choice>
-    <mc:Fallback>
-      <c:style val="2"/>
-    </mc:Fallback>
-  </mc:AlternateContent>
-  <c:chart>
-    <c:title>
-      <c:tx>
-        <c:rich>
-          <a:bodyPr/>
-          <a:lstStyle/>
-          <a:p>
-            <a:pPr>
-              <a:defRPr/>
-            </a:pPr>
-            <a:r>
-              <a:rPr lang="es-MX"/>
-              <a:t>Auditoria Fisica</a:t>
-            </a:r>
-          </a:p>
-        </c:rich>
-      </c:tx>
       <c:overlay val="0"/>
     </c:title>
     <c:autoTitleDeleted val="0"/>
@@ -842,11 +429,11 @@
           <c:showBubbleSize val="0"/>
         </c:dLbls>
         <c:gapWidth val="150"/>
-        <c:axId val="98300000"/>
-        <c:axId val="98564896"/>
+        <c:axId val="99419552"/>
+        <c:axId val="99420112"/>
       </c:barChart>
       <c:catAx>
-        <c:axId val="98300000"/>
+        <c:axId val="99419552"/>
         <c:scaling>
           <c:orientation val="minMax"/>
         </c:scaling>
@@ -856,7 +443,7 @@
         <c:majorTickMark val="none"/>
         <c:minorTickMark val="none"/>
         <c:tickLblPos val="nextTo"/>
-        <c:crossAx val="98564896"/>
+        <c:crossAx val="99420112"/>
         <c:crosses val="autoZero"/>
         <c:auto val="1"/>
         <c:lblAlgn val="ctr"/>
@@ -864,7 +451,7 @@
         <c:noMultiLvlLbl val="0"/>
       </c:catAx>
       <c:valAx>
-        <c:axId val="98564896"/>
+        <c:axId val="99420112"/>
         <c:scaling>
           <c:orientation val="minMax"/>
           <c:max val="1"/>
@@ -876,7 +463,7 @@
         <c:majorTickMark val="none"/>
         <c:minorTickMark val="none"/>
         <c:tickLblPos val="nextTo"/>
-        <c:crossAx val="98300000"/>
+        <c:crossAx val="99419552"/>
         <c:crosses val="autoZero"/>
         <c:crossBetween val="between"/>
       </c:valAx>
@@ -897,7 +484,7 @@
 </c:chartSpace>
 </file>
 
-<file path=ppt/charts/chart5.xml><?xml version="1.0" encoding="utf-8"?>
+<file path=ppt/charts/chart3.xml><?xml version="1.0" encoding="utf-8"?>
 <c:chartSpace xmlns:c="http://schemas.openxmlformats.org/drawingml/2006/chart" xmlns:a="http://schemas.openxmlformats.org/drawingml/2006/main" xmlns:r="http://schemas.openxmlformats.org/officeDocument/2006/relationships">
   <c:date1904 val="0"/>
   <c:lang val="es-ES"/>
@@ -998,11 +585,11 @@
           <c:showBubbleSize val="0"/>
         </c:dLbls>
         <c:gapWidth val="150"/>
-        <c:axId val="98567696"/>
-        <c:axId val="98568256"/>
+        <c:axId val="99422912"/>
+        <c:axId val="99423472"/>
       </c:barChart>
       <c:catAx>
-        <c:axId val="98567696"/>
+        <c:axId val="99422912"/>
         <c:scaling>
           <c:orientation val="minMax"/>
         </c:scaling>
@@ -1012,7 +599,7 @@
         <c:majorTickMark val="none"/>
         <c:minorTickMark val="none"/>
         <c:tickLblPos val="nextTo"/>
-        <c:crossAx val="98568256"/>
+        <c:crossAx val="99423472"/>
         <c:crosses val="autoZero"/>
         <c:auto val="1"/>
         <c:lblAlgn val="ctr"/>
@@ -1020,7 +607,7 @@
         <c:noMultiLvlLbl val="0"/>
       </c:catAx>
       <c:valAx>
-        <c:axId val="98568256"/>
+        <c:axId val="99423472"/>
         <c:scaling>
           <c:orientation val="minMax"/>
           <c:max val="1"/>
@@ -1032,7 +619,7 @@
         <c:majorTickMark val="none"/>
         <c:minorTickMark val="none"/>
         <c:tickLblPos val="nextTo"/>
-        <c:crossAx val="98567696"/>
+        <c:crossAx val="99422912"/>
         <c:crosses val="autoZero"/>
         <c:crossBetween val="between"/>
       </c:valAx>
@@ -1053,7 +640,155 @@
 </c:chartSpace>
 </file>
 
-<file path=ppt/charts/chart6.xml><?xml version="1.0" encoding="utf-8"?>
+<file path=ppt/charts/chart4.xml><?xml version="1.0" encoding="utf-8"?>
+<c:chartSpace xmlns:c="http://schemas.openxmlformats.org/drawingml/2006/chart" xmlns:a="http://schemas.openxmlformats.org/drawingml/2006/main" xmlns:r="http://schemas.openxmlformats.org/officeDocument/2006/relationships">
+  <c:date1904 val="0"/>
+  <c:lang val="es-ES"/>
+  <c:roundedCorners val="0"/>
+  <mc:AlternateContent xmlns:mc="http://schemas.openxmlformats.org/markup-compatibility/2006">
+    <mc:Choice xmlns:c14="http://schemas.microsoft.com/office/drawing/2007/8/2/chart" Requires="c14">
+      <c14:style val="102"/>
+    </mc:Choice>
+    <mc:Fallback>
+      <c:style val="2"/>
+    </mc:Fallback>
+  </mc:AlternateContent>
+  <c:chart>
+    <c:title>
+      <c:tx>
+        <c:rich>
+          <a:bodyPr/>
+          <a:lstStyle/>
+          <a:p>
+            <a:pPr>
+              <a:defRPr/>
+            </a:pPr>
+            <a:r>
+              <a:rPr lang="es-MX"/>
+              <a:t>Apego a Productos</a:t>
+            </a:r>
+          </a:p>
+        </c:rich>
+      </c:tx>
+      <c:overlay val="0"/>
+    </c:title>
+    <c:autoTitleDeleted val="0"/>
+    <c:plotArea>
+      <c:layout/>
+      <c:barChart>
+        <c:barDir val="col"/>
+        <c:grouping val="clustered"/>
+        <c:varyColors val="0"/>
+        <c:ser>
+          <c:idx val="0"/>
+          <c:order val="0"/>
+          <c:invertIfNegative val="0"/>
+          <c:cat>
+            <c:strRef>
+              <c:f>'Apego a Productos'!$C$4:$C$6</c:f>
+              <c:strCache>
+                <c:ptCount val="3"/>
+                <c:pt idx="0">
+                  <c:v>Plan estratégico</c:v>
+                </c:pt>
+                <c:pt idx="1">
+                  <c:v>Estimación</c:v>
+                </c:pt>
+                <c:pt idx="2">
+                  <c:v>Catalogo de Servicios</c:v>
+                </c:pt>
+              </c:strCache>
+            </c:strRef>
+          </c:cat>
+          <c:val>
+            <c:numRef>
+              <c:f>'Apego a Productos'!$G$4:$G$6</c:f>
+              <c:numCache>
+                <c:formatCode>0%</c:formatCode>
+                <c:ptCount val="3"/>
+                <c:pt idx="0">
+                  <c:v>1</c:v>
+                </c:pt>
+                <c:pt idx="1">
+                  <c:v>1</c:v>
+                </c:pt>
+                <c:pt idx="2">
+                  <c:v>1</c:v>
+                </c:pt>
+              </c:numCache>
+            </c:numRef>
+          </c:val>
+          <c:extLst>
+            <c:ext xmlns:c16="http://schemas.microsoft.com/office/drawing/2014/chart" uri="{C3380CC4-5D6E-409C-BE32-E72D297353CC}">
+              <c16:uniqueId val="{00000000-B20F-40C8-BC5D-40B2D4490654}"/>
+            </c:ext>
+          </c:extLst>
+        </c:ser>
+        <c:dLbls>
+          <c:showLegendKey val="0"/>
+          <c:showVal val="0"/>
+          <c:showCatName val="0"/>
+          <c:showSerName val="0"/>
+          <c:showPercent val="0"/>
+          <c:showBubbleSize val="0"/>
+        </c:dLbls>
+        <c:gapWidth val="150"/>
+        <c:axId val="99605040"/>
+        <c:axId val="99605600"/>
+      </c:barChart>
+      <c:catAx>
+        <c:axId val="99605040"/>
+        <c:scaling>
+          <c:orientation val="minMax"/>
+        </c:scaling>
+        <c:delete val="0"/>
+        <c:axPos val="b"/>
+        <c:numFmt formatCode="General" sourceLinked="0"/>
+        <c:majorTickMark val="none"/>
+        <c:minorTickMark val="none"/>
+        <c:tickLblPos val="nextTo"/>
+        <c:crossAx val="99605600"/>
+        <c:crosses val="autoZero"/>
+        <c:auto val="1"/>
+        <c:lblAlgn val="ctr"/>
+        <c:lblOffset val="100"/>
+        <c:noMultiLvlLbl val="0"/>
+      </c:catAx>
+      <c:valAx>
+        <c:axId val="99605600"/>
+        <c:scaling>
+          <c:orientation val="minMax"/>
+          <c:max val="1"/>
+        </c:scaling>
+        <c:delete val="0"/>
+        <c:axPos val="l"/>
+        <c:majorGridlines/>
+        <c:numFmt formatCode="0%" sourceLinked="1"/>
+        <c:majorTickMark val="none"/>
+        <c:minorTickMark val="none"/>
+        <c:tickLblPos val="nextTo"/>
+        <c:crossAx val="99605040"/>
+        <c:crosses val="autoZero"/>
+        <c:crossBetween val="between"/>
+      </c:valAx>
+      <c:dTable>
+        <c:showHorzBorder val="1"/>
+        <c:showVertBorder val="1"/>
+        <c:showOutline val="1"/>
+        <c:showKeys val="1"/>
+      </c:dTable>
+    </c:plotArea>
+    <c:plotVisOnly val="1"/>
+    <c:dispBlanksAs val="gap"/>
+    <c:showDLblsOverMax val="0"/>
+  </c:chart>
+  <c:externalData r:id="rId1">
+    <c:autoUpdate val="0"/>
+  </c:externalData>
+</c:chartSpace>
+</file>
+
+<file path=ppt/charts/chart5.xml><?xml version="1.0" encoding="utf-8"?>
 <c:chartSpace xmlns:c="http://schemas.openxmlformats.org/drawingml/2006/chart" xmlns:a="http://schemas.openxmlformats.org/drawingml/2006/main" xmlns:r="http://schemas.openxmlformats.org/officeDocument/2006/relationships">
   <c:date1904 val="0"/>
   <c:lang val="es-ES"/>
@@ -1123,7 +858,7 @@
                   <c:v>0</c:v>
                 </c:pt>
                 <c:pt idx="1">
-                  <c:v>1</c:v>
+                  <c:v>0</c:v>
                 </c:pt>
                 <c:pt idx="2">
                   <c:v>0</c:v>
@@ -1146,11 +881,11 @@
           <c:showBubbleSize val="0"/>
         </c:dLbls>
         <c:gapWidth val="150"/>
-        <c:axId val="98571056"/>
-        <c:axId val="98571616"/>
+        <c:axId val="99608400"/>
+        <c:axId val="99608960"/>
       </c:barChart>
       <c:catAx>
-        <c:axId val="98571056"/>
+        <c:axId val="99608400"/>
         <c:scaling>
           <c:orientation val="minMax"/>
         </c:scaling>
@@ -1160,7 +895,7 @@
         <c:majorTickMark val="none"/>
         <c:minorTickMark val="none"/>
         <c:tickLblPos val="nextTo"/>
-        <c:crossAx val="98571616"/>
+        <c:crossAx val="99608960"/>
         <c:crosses val="autoZero"/>
         <c:auto val="1"/>
         <c:lblAlgn val="ctr"/>
@@ -1168,7 +903,7 @@
         <c:noMultiLvlLbl val="0"/>
       </c:catAx>
       <c:valAx>
-        <c:axId val="98571616"/>
+        <c:axId val="99608960"/>
         <c:scaling>
           <c:orientation val="minMax"/>
           <c:max val="1"/>
@@ -1180,7 +915,7 @@
         <c:majorTickMark val="none"/>
         <c:minorTickMark val="none"/>
         <c:tickLblPos val="nextTo"/>
-        <c:crossAx val="98571056"/>
+        <c:crossAx val="99608400"/>
         <c:crosses val="autoZero"/>
         <c:crossBetween val="between"/>
       </c:valAx>
@@ -1201,303 +936,7 @@
 </c:chartSpace>
 </file>
 
-<file path=ppt/charts/chart7.xml><?xml version="1.0" encoding="utf-8"?>
-<c:chartSpace xmlns:c="http://schemas.openxmlformats.org/drawingml/2006/chart" xmlns:a="http://schemas.openxmlformats.org/drawingml/2006/main" xmlns:r="http://schemas.openxmlformats.org/officeDocument/2006/relationships">
-  <c:date1904 val="0"/>
-  <c:lang val="es-ES"/>
-  <c:roundedCorners val="0"/>
-  <mc:AlternateContent xmlns:mc="http://schemas.openxmlformats.org/markup-compatibility/2006">
-    <mc:Choice xmlns:c14="http://schemas.microsoft.com/office/drawing/2007/8/2/chart" Requires="c14">
-      <c14:style val="102"/>
-    </mc:Choice>
-    <mc:Fallback>
-      <c:style val="2"/>
-    </mc:Fallback>
-  </mc:AlternateContent>
-  <c:chart>
-    <c:title>
-      <c:tx>
-        <c:rich>
-          <a:bodyPr/>
-          <a:lstStyle/>
-          <a:p>
-            <a:pPr>
-              <a:defRPr/>
-            </a:pPr>
-            <a:r>
-              <a:rPr lang="es-MX"/>
-              <a:t>Apego a Productos</a:t>
-            </a:r>
-          </a:p>
-        </c:rich>
-      </c:tx>
-      <c:overlay val="0"/>
-    </c:title>
-    <c:autoTitleDeleted val="0"/>
-    <c:plotArea>
-      <c:layout/>
-      <c:barChart>
-        <c:barDir val="col"/>
-        <c:grouping val="clustered"/>
-        <c:varyColors val="0"/>
-        <c:ser>
-          <c:idx val="0"/>
-          <c:order val="0"/>
-          <c:invertIfNegative val="0"/>
-          <c:cat>
-            <c:strRef>
-              <c:f>'Apego a Productos'!$C$4:$C$6</c:f>
-              <c:strCache>
-                <c:ptCount val="3"/>
-                <c:pt idx="0">
-                  <c:v>Plan estratégico</c:v>
-                </c:pt>
-                <c:pt idx="1">
-                  <c:v>Estimación</c:v>
-                </c:pt>
-                <c:pt idx="2">
-                  <c:v>Reporte de monitoreo</c:v>
-                </c:pt>
-              </c:strCache>
-            </c:strRef>
-          </c:cat>
-          <c:val>
-            <c:numRef>
-              <c:f>'Apego a Productos'!$G$4:$G$6</c:f>
-              <c:numCache>
-                <c:formatCode>0%</c:formatCode>
-                <c:ptCount val="3"/>
-                <c:pt idx="0">
-                  <c:v>1</c:v>
-                </c:pt>
-                <c:pt idx="1">
-                  <c:v>1</c:v>
-                </c:pt>
-                <c:pt idx="2">
-                  <c:v>0</c:v>
-                </c:pt>
-              </c:numCache>
-            </c:numRef>
-          </c:val>
-          <c:extLst>
-            <c:ext xmlns:c16="http://schemas.microsoft.com/office/drawing/2014/chart" uri="{C3380CC4-5D6E-409C-BE32-E72D297353CC}">
-              <c16:uniqueId val="{00000000-B20F-40C8-BC5D-40B2D4490654}"/>
-            </c:ext>
-          </c:extLst>
-        </c:ser>
-        <c:dLbls>
-          <c:showLegendKey val="0"/>
-          <c:showVal val="0"/>
-          <c:showCatName val="0"/>
-          <c:showSerName val="0"/>
-          <c:showPercent val="0"/>
-          <c:showBubbleSize val="0"/>
-        </c:dLbls>
-        <c:gapWidth val="150"/>
-        <c:axId val="98723216"/>
-        <c:axId val="98723776"/>
-      </c:barChart>
-      <c:catAx>
-        <c:axId val="98723216"/>
-        <c:scaling>
-          <c:orientation val="minMax"/>
-        </c:scaling>
-        <c:delete val="0"/>
-        <c:axPos val="b"/>
-        <c:numFmt formatCode="General" sourceLinked="0"/>
-        <c:majorTickMark val="none"/>
-        <c:minorTickMark val="none"/>
-        <c:tickLblPos val="nextTo"/>
-        <c:crossAx val="98723776"/>
-        <c:crosses val="autoZero"/>
-        <c:auto val="1"/>
-        <c:lblAlgn val="ctr"/>
-        <c:lblOffset val="100"/>
-        <c:noMultiLvlLbl val="0"/>
-      </c:catAx>
-      <c:valAx>
-        <c:axId val="98723776"/>
-        <c:scaling>
-          <c:orientation val="minMax"/>
-          <c:max val="1"/>
-        </c:scaling>
-        <c:delete val="0"/>
-        <c:axPos val="l"/>
-        <c:majorGridlines/>
-        <c:numFmt formatCode="0%" sourceLinked="1"/>
-        <c:majorTickMark val="none"/>
-        <c:minorTickMark val="none"/>
-        <c:tickLblPos val="nextTo"/>
-        <c:crossAx val="98723216"/>
-        <c:crosses val="autoZero"/>
-        <c:crossBetween val="between"/>
-      </c:valAx>
-      <c:dTable>
-        <c:showHorzBorder val="1"/>
-        <c:showVertBorder val="1"/>
-        <c:showOutline val="1"/>
-        <c:showKeys val="1"/>
-      </c:dTable>
-    </c:plotArea>
-    <c:plotVisOnly val="1"/>
-    <c:dispBlanksAs val="gap"/>
-    <c:showDLblsOverMax val="0"/>
-  </c:chart>
-  <c:externalData r:id="rId1">
-    <c:autoUpdate val="0"/>
-  </c:externalData>
-</c:chartSpace>
-</file>
-
-<file path=ppt/charts/chart8.xml><?xml version="1.0" encoding="utf-8"?>
-<c:chartSpace xmlns:c="http://schemas.openxmlformats.org/drawingml/2006/chart" xmlns:a="http://schemas.openxmlformats.org/drawingml/2006/main" xmlns:r="http://schemas.openxmlformats.org/officeDocument/2006/relationships">
-  <c:date1904 val="0"/>
-  <c:lang val="es-ES"/>
-  <c:roundedCorners val="0"/>
-  <mc:AlternateContent xmlns:mc="http://schemas.openxmlformats.org/markup-compatibility/2006">
-    <mc:Choice xmlns:c14="http://schemas.microsoft.com/office/drawing/2007/8/2/chart" Requires="c14">
-      <c14:style val="102"/>
-    </mc:Choice>
-    <mc:Fallback>
-      <c:style val="2"/>
-    </mc:Fallback>
-  </mc:AlternateContent>
-  <c:chart>
-    <c:title>
-      <c:tx>
-        <c:rich>
-          <a:bodyPr/>
-          <a:lstStyle/>
-          <a:p>
-            <a:pPr>
-              <a:defRPr/>
-            </a:pPr>
-            <a:r>
-              <a:rPr lang="es-MX"/>
-              <a:t>Organizacional</a:t>
-            </a:r>
-          </a:p>
-        </c:rich>
-      </c:tx>
-      <c:overlay val="0"/>
-    </c:title>
-    <c:autoTitleDeleted val="0"/>
-    <c:plotArea>
-      <c:layout/>
-      <c:barChart>
-        <c:barDir val="col"/>
-        <c:grouping val="clustered"/>
-        <c:varyColors val="0"/>
-        <c:ser>
-          <c:idx val="0"/>
-          <c:order val="0"/>
-          <c:invertIfNegative val="0"/>
-          <c:cat>
-            <c:strRef>
-              <c:f>'Apego a Procesos'!$C$10:$C$12</c:f>
-              <c:strCache>
-                <c:ptCount val="3"/>
-                <c:pt idx="0">
-                  <c:v>Metricas </c:v>
-                </c:pt>
-                <c:pt idx="1">
-                  <c:v>Calidad</c:v>
-                </c:pt>
-                <c:pt idx="2">
-                  <c:v>Configuración</c:v>
-                </c:pt>
-              </c:strCache>
-            </c:strRef>
-          </c:cat>
-          <c:val>
-            <c:numRef>
-              <c:f>'Apego a Procesos'!$G$10:$G$12</c:f>
-              <c:numCache>
-                <c:formatCode>0%</c:formatCode>
-                <c:ptCount val="3"/>
-                <c:pt idx="0">
-                  <c:v>1</c:v>
-                </c:pt>
-                <c:pt idx="1">
-                  <c:v>1</c:v>
-                </c:pt>
-                <c:pt idx="2">
-                  <c:v>1</c:v>
-                </c:pt>
-              </c:numCache>
-            </c:numRef>
-          </c:val>
-          <c:extLst>
-            <c:ext xmlns:c16="http://schemas.microsoft.com/office/drawing/2014/chart" uri="{C3380CC4-5D6E-409C-BE32-E72D297353CC}">
-              <c16:uniqueId val="{00000000-0990-45A3-B614-F9841A457726}"/>
-            </c:ext>
-          </c:extLst>
-        </c:ser>
-        <c:dLbls>
-          <c:showLegendKey val="0"/>
-          <c:showVal val="0"/>
-          <c:showCatName val="0"/>
-          <c:showSerName val="0"/>
-          <c:showPercent val="0"/>
-          <c:showBubbleSize val="0"/>
-        </c:dLbls>
-        <c:gapWidth val="150"/>
-        <c:axId val="98726576"/>
-        <c:axId val="98727136"/>
-      </c:barChart>
-      <c:catAx>
-        <c:axId val="98726576"/>
-        <c:scaling>
-          <c:orientation val="minMax"/>
-        </c:scaling>
-        <c:delete val="0"/>
-        <c:axPos val="b"/>
-        <c:numFmt formatCode="General" sourceLinked="0"/>
-        <c:majorTickMark val="none"/>
-        <c:minorTickMark val="none"/>
-        <c:tickLblPos val="nextTo"/>
-        <c:crossAx val="98727136"/>
-        <c:crosses val="autoZero"/>
-        <c:auto val="1"/>
-        <c:lblAlgn val="ctr"/>
-        <c:lblOffset val="100"/>
-        <c:noMultiLvlLbl val="0"/>
-      </c:catAx>
-      <c:valAx>
-        <c:axId val="98727136"/>
-        <c:scaling>
-          <c:orientation val="minMax"/>
-          <c:max val="1"/>
-        </c:scaling>
-        <c:delete val="0"/>
-        <c:axPos val="l"/>
-        <c:majorGridlines/>
-        <c:numFmt formatCode="0%" sourceLinked="1"/>
-        <c:majorTickMark val="none"/>
-        <c:minorTickMark val="none"/>
-        <c:tickLblPos val="nextTo"/>
-        <c:crossAx val="98726576"/>
-        <c:crosses val="autoZero"/>
-        <c:crossBetween val="between"/>
-      </c:valAx>
-      <c:dTable>
-        <c:showHorzBorder val="1"/>
-        <c:showVertBorder val="1"/>
-        <c:showOutline val="1"/>
-        <c:showKeys val="1"/>
-      </c:dTable>
-    </c:plotArea>
-    <c:plotVisOnly val="1"/>
-    <c:dispBlanksAs val="gap"/>
-    <c:showDLblsOverMax val="0"/>
-  </c:chart>
-  <c:externalData r:id="rId1">
-    <c:autoUpdate val="0"/>
-  </c:externalData>
-</c:chartSpace>
-</file>
-
-<file path=ppt/charts/chart9.xml><?xml version="1.0" encoding="utf-8"?>
+<file path=ppt/charts/chart6.xml><?xml version="1.0" encoding="utf-8"?>
 <c:chartSpace xmlns:c="http://schemas.openxmlformats.org/drawingml/2006/chart" xmlns:a="http://schemas.openxmlformats.org/drawingml/2006/main" xmlns:r="http://schemas.openxmlformats.org/officeDocument/2006/relationships">
   <c:date1904 val="0"/>
   <c:lang val="es-ES"/>
@@ -1590,11 +1029,11 @@
           <c:showBubbleSize val="0"/>
         </c:dLbls>
         <c:gapWidth val="150"/>
-        <c:axId val="97986736"/>
-        <c:axId val="97987296"/>
+        <c:axId val="100056032"/>
+        <c:axId val="100056592"/>
       </c:barChart>
       <c:catAx>
-        <c:axId val="97986736"/>
+        <c:axId val="100056032"/>
         <c:scaling>
           <c:orientation val="minMax"/>
         </c:scaling>
@@ -1604,7 +1043,7 @@
         <c:majorTickMark val="none"/>
         <c:minorTickMark val="none"/>
         <c:tickLblPos val="nextTo"/>
-        <c:crossAx val="97987296"/>
+        <c:crossAx val="100056592"/>
         <c:crosses val="autoZero"/>
         <c:auto val="1"/>
         <c:lblAlgn val="ctr"/>
@@ -1612,7 +1051,7 @@
         <c:noMultiLvlLbl val="0"/>
       </c:catAx>
       <c:valAx>
-        <c:axId val="97987296"/>
+        <c:axId val="100056592"/>
         <c:scaling>
           <c:orientation val="minMax"/>
         </c:scaling>
@@ -1623,7 +1062,155 @@
         <c:majorTickMark val="none"/>
         <c:minorTickMark val="none"/>
         <c:tickLblPos val="nextTo"/>
-        <c:crossAx val="97986736"/>
+        <c:crossAx val="100056032"/>
+        <c:crosses val="autoZero"/>
+        <c:crossBetween val="between"/>
+      </c:valAx>
+      <c:dTable>
+        <c:showHorzBorder val="1"/>
+        <c:showVertBorder val="1"/>
+        <c:showOutline val="1"/>
+        <c:showKeys val="1"/>
+      </c:dTable>
+    </c:plotArea>
+    <c:plotVisOnly val="1"/>
+    <c:dispBlanksAs val="gap"/>
+    <c:showDLblsOverMax val="0"/>
+  </c:chart>
+  <c:externalData r:id="rId1">
+    <c:autoUpdate val="0"/>
+  </c:externalData>
+</c:chartSpace>
+</file>
+
+<file path=ppt/charts/chart7.xml><?xml version="1.0" encoding="utf-8"?>
+<c:chartSpace xmlns:c="http://schemas.openxmlformats.org/drawingml/2006/chart" xmlns:a="http://schemas.openxmlformats.org/drawingml/2006/main" xmlns:r="http://schemas.openxmlformats.org/officeDocument/2006/relationships">
+  <c:date1904 val="0"/>
+  <c:lang val="es-ES"/>
+  <c:roundedCorners val="0"/>
+  <mc:AlternateContent xmlns:mc="http://schemas.openxmlformats.org/markup-compatibility/2006">
+    <mc:Choice xmlns:c14="http://schemas.microsoft.com/office/drawing/2007/8/2/chart" Requires="c14">
+      <c14:style val="102"/>
+    </mc:Choice>
+    <mc:Fallback>
+      <c:style val="2"/>
+    </mc:Fallback>
+  </mc:AlternateContent>
+  <c:chart>
+    <c:title>
+      <c:tx>
+        <c:rich>
+          <a:bodyPr/>
+          <a:lstStyle/>
+          <a:p>
+            <a:pPr>
+              <a:defRPr/>
+            </a:pPr>
+            <a:r>
+              <a:rPr lang="es-MX"/>
+              <a:t>Organizacional</a:t>
+            </a:r>
+          </a:p>
+        </c:rich>
+      </c:tx>
+      <c:overlay val="0"/>
+    </c:title>
+    <c:autoTitleDeleted val="0"/>
+    <c:plotArea>
+      <c:layout/>
+      <c:barChart>
+        <c:barDir val="col"/>
+        <c:grouping val="clustered"/>
+        <c:varyColors val="0"/>
+        <c:ser>
+          <c:idx val="0"/>
+          <c:order val="0"/>
+          <c:invertIfNegative val="0"/>
+          <c:cat>
+            <c:strRef>
+              <c:f>'Apego a Procesos'!$C$10:$C$12</c:f>
+              <c:strCache>
+                <c:ptCount val="3"/>
+                <c:pt idx="0">
+                  <c:v>Metricas </c:v>
+                </c:pt>
+                <c:pt idx="1">
+                  <c:v>Calidad</c:v>
+                </c:pt>
+                <c:pt idx="2">
+                  <c:v>Configuración</c:v>
+                </c:pt>
+              </c:strCache>
+            </c:strRef>
+          </c:cat>
+          <c:val>
+            <c:numRef>
+              <c:f>'Apego a Procesos'!$G$10:$G$12</c:f>
+              <c:numCache>
+                <c:formatCode>0%</c:formatCode>
+                <c:ptCount val="3"/>
+                <c:pt idx="0">
+                  <c:v>0</c:v>
+                </c:pt>
+                <c:pt idx="1">
+                  <c:v>0</c:v>
+                </c:pt>
+                <c:pt idx="2">
+                  <c:v>0</c:v>
+                </c:pt>
+              </c:numCache>
+            </c:numRef>
+          </c:val>
+          <c:extLst>
+            <c:ext xmlns:c16="http://schemas.microsoft.com/office/drawing/2014/chart" uri="{C3380CC4-5D6E-409C-BE32-E72D297353CC}">
+              <c16:uniqueId val="{00000000-0990-45A3-B614-F9841A457726}"/>
+            </c:ext>
+          </c:extLst>
+        </c:ser>
+        <c:dLbls>
+          <c:showLegendKey val="0"/>
+          <c:showVal val="0"/>
+          <c:showCatName val="0"/>
+          <c:showSerName val="0"/>
+          <c:showPercent val="0"/>
+          <c:showBubbleSize val="0"/>
+        </c:dLbls>
+        <c:gapWidth val="150"/>
+        <c:axId val="100059392"/>
+        <c:axId val="100059952"/>
+      </c:barChart>
+      <c:catAx>
+        <c:axId val="100059392"/>
+        <c:scaling>
+          <c:orientation val="minMax"/>
+        </c:scaling>
+        <c:delete val="0"/>
+        <c:axPos val="b"/>
+        <c:numFmt formatCode="General" sourceLinked="0"/>
+        <c:majorTickMark val="none"/>
+        <c:minorTickMark val="none"/>
+        <c:tickLblPos val="nextTo"/>
+        <c:crossAx val="100059952"/>
+        <c:crosses val="autoZero"/>
+        <c:auto val="1"/>
+        <c:lblAlgn val="ctr"/>
+        <c:lblOffset val="100"/>
+        <c:noMultiLvlLbl val="0"/>
+      </c:catAx>
+      <c:valAx>
+        <c:axId val="100059952"/>
+        <c:scaling>
+          <c:orientation val="minMax"/>
+          <c:max val="1"/>
+        </c:scaling>
+        <c:delete val="0"/>
+        <c:axPos val="l"/>
+        <c:majorGridlines/>
+        <c:numFmt formatCode="0%" sourceLinked="1"/>
+        <c:majorTickMark val="none"/>
+        <c:minorTickMark val="none"/>
+        <c:tickLblPos val="nextTo"/>
+        <c:crossAx val="100059392"/>
         <c:crosses val="autoZero"/>
         <c:crossBetween val="between"/>
       </c:valAx>
@@ -5890,30 +5477,147 @@
               <a:lnSpc>
                 <a:spcPct val="100000"/>
               </a:lnSpc>
-              <a:buFont typeface="Arial"/>
-              <a:buChar char="•"/>
             </a:pPr>
-            <a:r>
-              <a:rPr lang="es-MX" sz="3200" dirty="0">
-                <a:solidFill>
-                  <a:srgbClr val="000000"/>
-                </a:solidFill>
-                <a:latin typeface="Calibri"/>
-              </a:rPr>
-              <a:t> </a:t>
-            </a:r>
-            <a:r>
-              <a:rPr lang="es-MX" sz="3200" dirty="0" smtClean="0">
-                <a:solidFill>
-                  <a:srgbClr val="000000"/>
-                </a:solidFill>
-                <a:latin typeface="Calibri"/>
-              </a:rPr>
-              <a:t>Generación de línea : fecha de entrega -&gt; 18 – 02 – 15 , fecha planeada - &gt; 20 – 02 – 15.</a:t>
-            </a:r>
-          </a:p>
-        </p:txBody>
-      </p:sp>
+            <a:endParaRPr lang="es-MX" sz="3200" dirty="0" smtClean="0">
+              <a:solidFill>
+                <a:srgbClr val="000000"/>
+              </a:solidFill>
+              <a:latin typeface="Calibri"/>
+            </a:endParaRPr>
+          </a:p>
+        </p:txBody>
+      </p:sp>
+      <p:graphicFrame>
+        <p:nvGraphicFramePr>
+          <p:cNvPr id="2" name="Tabla 1"/>
+          <p:cNvGraphicFramePr>
+            <a:graphicFrameLocks noGrp="1"/>
+          </p:cNvGraphicFramePr>
+          <p:nvPr>
+            <p:extLst>
+              <p:ext uri="{D42A27DB-BD31-4B8C-83A1-F6EECF244321}">
+                <p14:modId xmlns:p14="http://schemas.microsoft.com/office/powerpoint/2010/main" val="2096550117"/>
+              </p:ext>
+            </p:extLst>
+          </p:nvPr>
+        </p:nvGraphicFramePr>
+        <p:xfrm>
+          <a:off x="1524000" y="1397000"/>
+          <a:ext cx="6096000" cy="741680"/>
+        </p:xfrm>
+        <a:graphic>
+          <a:graphicData uri="http://schemas.openxmlformats.org/drawingml/2006/table">
+            <a:tbl>
+              <a:tblPr firstRow="1" bandRow="1">
+                <a:tableStyleId>{5C22544A-7EE6-4342-B048-85BDC9FD1C3A}</a:tableStyleId>
+              </a:tblPr>
+              <a:tblGrid>
+                <a:gridCol w="2032000"/>
+                <a:gridCol w="2032000"/>
+                <a:gridCol w="2032000"/>
+              </a:tblGrid>
+              <a:tr h="370840">
+                <a:tc>
+                  <a:txBody>
+                    <a:bodyPr/>
+                    <a:lstStyle/>
+                    <a:p>
+                      <a:pPr algn="ctr"/>
+                      <a:r>
+                        <a:rPr lang="es-MX" dirty="0" smtClean="0"/>
+                        <a:t>Nombre de hito</a:t>
+                      </a:r>
+                      <a:endParaRPr lang="es-MX" dirty="0"/>
+                    </a:p>
+                  </a:txBody>
+                  <a:tcPr/>
+                </a:tc>
+                <a:tc>
+                  <a:txBody>
+                    <a:bodyPr/>
+                    <a:lstStyle/>
+                    <a:p>
+                      <a:pPr algn="ctr"/>
+                      <a:r>
+                        <a:rPr lang="es-MX" dirty="0" smtClean="0"/>
+                        <a:t>Fecha Planeada</a:t>
+                      </a:r>
+                      <a:endParaRPr lang="es-MX" dirty="0"/>
+                    </a:p>
+                  </a:txBody>
+                  <a:tcPr/>
+                </a:tc>
+                <a:tc>
+                  <a:txBody>
+                    <a:bodyPr/>
+                    <a:lstStyle/>
+                    <a:p>
+                      <a:pPr algn="ctr"/>
+                      <a:r>
+                        <a:rPr lang="es-MX" dirty="0" smtClean="0"/>
+                        <a:t>Fecha Real</a:t>
+                      </a:r>
+                      <a:endParaRPr lang="es-MX" dirty="0"/>
+                    </a:p>
+                  </a:txBody>
+                  <a:tcPr/>
+                </a:tc>
+              </a:tr>
+              <a:tr h="370840">
+                <a:tc>
+                  <a:txBody>
+                    <a:bodyPr/>
+                    <a:lstStyle/>
+                    <a:p>
+                      <a:pPr algn="ctr"/>
+                      <a:r>
+                        <a:rPr lang="es-MX" dirty="0" smtClean="0"/>
+                        <a:t>Planeación</a:t>
+                      </a:r>
+                      <a:r>
+                        <a:rPr lang="es-MX" baseline="0" dirty="0" smtClean="0"/>
+                        <a:t> </a:t>
+                      </a:r>
+                      <a:endParaRPr lang="es-MX" dirty="0"/>
+                    </a:p>
+                  </a:txBody>
+                  <a:tcPr/>
+                </a:tc>
+                <a:tc>
+                  <a:txBody>
+                    <a:bodyPr/>
+                    <a:lstStyle/>
+                    <a:p>
+                      <a:pPr algn="ctr"/>
+                      <a:r>
+                        <a:rPr lang="es-MX" dirty="0" smtClean="0"/>
+                        <a:t>09-02-2015</a:t>
+                      </a:r>
+                      <a:endParaRPr lang="es-MX" dirty="0"/>
+                    </a:p>
+                  </a:txBody>
+                  <a:tcPr/>
+                </a:tc>
+                <a:tc>
+                  <a:txBody>
+                    <a:bodyPr/>
+                    <a:lstStyle/>
+                    <a:p>
+                      <a:pPr algn="ctr"/>
+                      <a:r>
+                        <a:rPr lang="es-MX" dirty="0" smtClean="0"/>
+                        <a:t>09-02-2015</a:t>
+                      </a:r>
+                      <a:endParaRPr lang="es-MX" dirty="0"/>
+                    </a:p>
+                  </a:txBody>
+                  <a:tcPr/>
+                </a:tc>
+              </a:tr>
+            </a:tbl>
+          </a:graphicData>
+        </a:graphic>
+      </p:graphicFrame>
     </p:spTree>
   </p:cSld>
   <p:clrMapOvr>
@@ -6587,96 +6291,981 @@
           </a:p>
         </p:txBody>
       </p:sp>
+      <p:sp>
+        <p:nvSpPr>
+          <p:cNvPr id="2" name="CuadroTexto 1"/>
+          <p:cNvSpPr txBox="1"/>
+          <p:nvPr/>
+        </p:nvSpPr>
+        <p:spPr>
+          <a:xfrm>
+            <a:off x="5292080" y="1416240"/>
+            <a:ext cx="3393280" cy="923330"/>
+          </a:xfrm>
+          <a:prstGeom prst="rect">
+            <a:avLst/>
+          </a:prstGeom>
+          <a:noFill/>
+        </p:spPr>
+        <p:txBody>
+          <a:bodyPr wrap="square" rtlCol="0">
+            <a:spAutoFit/>
+          </a:bodyPr>
+          <a:lstStyle/>
+          <a:p>
+            <a:r>
+              <a:rPr lang="es-MX" dirty="0" smtClean="0"/>
+              <a:t>Por falta de clientes no existen horas a registrar en la entrega de servicio.</a:t>
+            </a:r>
+            <a:endParaRPr lang="es-MX" dirty="0"/>
+          </a:p>
+        </p:txBody>
+      </p:sp>
       <p:graphicFrame>
         <p:nvGraphicFramePr>
-          <p:cNvPr id="4" name="2 Gráfico">
-            <a:extLst>
-              <a:ext uri="{FF2B5EF4-FFF2-40B4-BE49-F238E27FC236}">
-                <a16:creationId xmlns:lc="http://schemas.openxmlformats.org/drawingml/2006/lockedCanvas" xmlns="" xmlns:a16="http://schemas.microsoft.com/office/drawing/2014/main" xmlns:xdr="http://schemas.openxmlformats.org/drawingml/2006/spreadsheetDrawing" id="{00000000-0008-0000-0100-000003000000}"/>
-              </a:ext>
-            </a:extLst>
-          </p:cNvPr>
+          <p:cNvPr id="3" name="Tabla 2"/>
           <p:cNvGraphicFramePr>
-            <a:graphicFrameLocks/>
+            <a:graphicFrameLocks noGrp="1"/>
           </p:cNvGraphicFramePr>
           <p:nvPr>
             <p:extLst>
               <p:ext uri="{D42A27DB-BD31-4B8C-83A1-F6EECF244321}">
-                <p14:modId xmlns:p14="http://schemas.microsoft.com/office/powerpoint/2010/main" val="2005708115"/>
+                <p14:modId xmlns:p14="http://schemas.microsoft.com/office/powerpoint/2010/main" val="720612802"/>
               </p:ext>
             </p:extLst>
           </p:nvPr>
         </p:nvGraphicFramePr>
         <p:xfrm>
-          <a:off x="457200" y="908720"/>
-          <a:ext cx="4531783" cy="2800350"/>
+          <a:off x="2058988" y="2481263"/>
+          <a:ext cx="5825379" cy="2747939"/>
         </p:xfrm>
         <a:graphic>
-          <a:graphicData uri="http://schemas.openxmlformats.org/drawingml/2006/chart">
-            <c:chart xmlns:c="http://schemas.openxmlformats.org/drawingml/2006/chart" xmlns:r="http://schemas.openxmlformats.org/officeDocument/2006/relationships" r:id="rId2"/>
+          <a:graphicData uri="http://schemas.openxmlformats.org/drawingml/2006/table">
+            <a:tbl>
+              <a:tblPr>
+                <a:tableStyleId>{5C22544A-7EE6-4342-B048-85BDC9FD1C3A}</a:tableStyleId>
+              </a:tblPr>
+              <a:tblGrid>
+                <a:gridCol w="2659253"/>
+                <a:gridCol w="782349"/>
+                <a:gridCol w="749292"/>
+                <a:gridCol w="782349"/>
+                <a:gridCol w="852136"/>
+              </a:tblGrid>
+              <a:tr h="367312">
+                <a:tc>
+                  <a:txBody>
+                    <a:bodyPr/>
+                    <a:lstStyle/>
+                    <a:p>
+                      <a:pPr algn="ctr" fontAlgn="ctr"/>
+                      <a:r>
+                        <a:rPr lang="es-MX" sz="1600" u="none" strike="noStrike" dirty="0">
+                          <a:effectLst/>
+                        </a:rPr>
+                        <a:t>Febrero</a:t>
+                      </a:r>
+                      <a:endParaRPr lang="es-MX" sz="1600" b="1" i="0" u="none" strike="noStrike" dirty="0">
+                        <a:solidFill>
+                          <a:srgbClr val="000000"/>
+                        </a:solidFill>
+                        <a:effectLst/>
+                        <a:latin typeface="Calibri" panose="020F0502020204030204" pitchFamily="34" charset="0"/>
+                      </a:endParaRPr>
+                    </a:p>
+                  </a:txBody>
+                  <a:tcPr marL="9525" marR="9525" marT="9525" marB="0" anchor="ctr"/>
+                </a:tc>
+                <a:tc>
+                  <a:txBody>
+                    <a:bodyPr/>
+                    <a:lstStyle/>
+                    <a:p>
+                      <a:pPr algn="l" fontAlgn="b"/>
+                      <a:r>
+                        <a:rPr lang="es-MX" sz="1100" u="none" strike="noStrike" dirty="0">
+                          <a:effectLst/>
+                        </a:rPr>
+                        <a:t> </a:t>
+                      </a:r>
+                      <a:endParaRPr lang="es-MX" sz="1100" b="0" i="0" u="none" strike="noStrike" dirty="0">
+                        <a:solidFill>
+                          <a:srgbClr val="000000"/>
+                        </a:solidFill>
+                        <a:effectLst/>
+                        <a:latin typeface="Calibri" panose="020F0502020204030204" pitchFamily="34" charset="0"/>
+                      </a:endParaRPr>
+                    </a:p>
+                  </a:txBody>
+                  <a:tcPr marL="9525" marR="9525" marT="9525" marB="0" anchor="b"/>
+                </a:tc>
+                <a:tc>
+                  <a:txBody>
+                    <a:bodyPr/>
+                    <a:lstStyle/>
+                    <a:p>
+                      <a:pPr algn="l" fontAlgn="b"/>
+                      <a:r>
+                        <a:rPr lang="es-MX" sz="1100" u="none" strike="noStrike">
+                          <a:effectLst/>
+                        </a:rPr>
+                        <a:t>Planeado</a:t>
+                      </a:r>
+                      <a:endParaRPr lang="es-MX" sz="1100" b="0" i="0" u="none" strike="noStrike">
+                        <a:solidFill>
+                          <a:srgbClr val="000000"/>
+                        </a:solidFill>
+                        <a:effectLst/>
+                        <a:latin typeface="Calibri" panose="020F0502020204030204" pitchFamily="34" charset="0"/>
+                      </a:endParaRPr>
+                    </a:p>
+                  </a:txBody>
+                  <a:tcPr marL="9525" marR="9525" marT="9525" marB="0" anchor="b"/>
+                </a:tc>
+                <a:tc>
+                  <a:txBody>
+                    <a:bodyPr/>
+                    <a:lstStyle/>
+                    <a:p>
+                      <a:pPr algn="l" fontAlgn="b"/>
+                      <a:r>
+                        <a:rPr lang="es-MX" sz="1100" u="none" strike="noStrike">
+                          <a:effectLst/>
+                        </a:rPr>
+                        <a:t>Real </a:t>
+                      </a:r>
+                      <a:endParaRPr lang="es-MX" sz="1100" b="0" i="0" u="none" strike="noStrike">
+                        <a:solidFill>
+                          <a:srgbClr val="000000"/>
+                        </a:solidFill>
+                        <a:effectLst/>
+                        <a:latin typeface="Calibri" panose="020F0502020204030204" pitchFamily="34" charset="0"/>
+                      </a:endParaRPr>
+                    </a:p>
+                  </a:txBody>
+                  <a:tcPr marL="9525" marR="9525" marT="9525" marB="0" anchor="b"/>
+                </a:tc>
+                <a:tc>
+                  <a:txBody>
+                    <a:bodyPr/>
+                    <a:lstStyle/>
+                    <a:p>
+                      <a:pPr algn="l" fontAlgn="b"/>
+                      <a:r>
+                        <a:rPr lang="es-MX" sz="1100" u="none" strike="noStrike">
+                          <a:effectLst/>
+                        </a:rPr>
+                        <a:t>Desviación</a:t>
+                      </a:r>
+                      <a:endParaRPr lang="es-MX" sz="1100" b="0" i="0" u="none" strike="noStrike">
+                        <a:solidFill>
+                          <a:srgbClr val="000000"/>
+                        </a:solidFill>
+                        <a:effectLst/>
+                        <a:latin typeface="Calibri" panose="020F0502020204030204" pitchFamily="34" charset="0"/>
+                      </a:endParaRPr>
+                    </a:p>
+                  </a:txBody>
+                  <a:tcPr marL="9525" marR="9525" marT="9525" marB="0" anchor="b"/>
+                </a:tc>
+              </a:tr>
+              <a:tr h="499876">
+                <a:tc rowSpan="2">
+                  <a:txBody>
+                    <a:bodyPr/>
+                    <a:lstStyle/>
+                    <a:p>
+                      <a:pPr algn="ctr" fontAlgn="ctr"/>
+                      <a:r>
+                        <a:rPr lang="es-MX" sz="1100" u="none" strike="noStrike">
+                          <a:effectLst/>
+                        </a:rPr>
+                        <a:t>Entrega de Servicio</a:t>
+                      </a:r>
+                      <a:endParaRPr lang="es-MX" sz="1100" b="0" i="0" u="none" strike="noStrike">
+                        <a:solidFill>
+                          <a:srgbClr val="000000"/>
+                        </a:solidFill>
+                        <a:effectLst/>
+                        <a:latin typeface="Calibri" panose="020F0502020204030204" pitchFamily="34" charset="0"/>
+                      </a:endParaRPr>
+                    </a:p>
+                  </a:txBody>
+                  <a:tcPr marL="9525" marR="9525" marT="9525" marB="0" anchor="ctr"/>
+                </a:tc>
+                <a:tc>
+                  <a:txBody>
+                    <a:bodyPr/>
+                    <a:lstStyle/>
+                    <a:p>
+                      <a:pPr algn="l" fontAlgn="b"/>
+                      <a:r>
+                        <a:rPr lang="es-MX" sz="1100" u="none" strike="noStrike">
+                          <a:effectLst/>
+                        </a:rPr>
+                        <a:t>Preventivo</a:t>
+                      </a:r>
+                      <a:endParaRPr lang="es-MX" sz="1100" b="0" i="0" u="none" strike="noStrike">
+                        <a:solidFill>
+                          <a:srgbClr val="000000"/>
+                        </a:solidFill>
+                        <a:effectLst/>
+                        <a:latin typeface="Calibri" panose="020F0502020204030204" pitchFamily="34" charset="0"/>
+                      </a:endParaRPr>
+                    </a:p>
+                  </a:txBody>
+                  <a:tcPr marL="9525" marR="9525" marT="9525" marB="0" anchor="b"/>
+                </a:tc>
+                <a:tc>
+                  <a:txBody>
+                    <a:bodyPr/>
+                    <a:lstStyle/>
+                    <a:p>
+                      <a:pPr algn="ctr" fontAlgn="b"/>
+                      <a:r>
+                        <a:rPr lang="es-MX" sz="1100" u="none" strike="noStrike">
+                          <a:effectLst/>
+                        </a:rPr>
+                        <a:t>140</a:t>
+                      </a:r>
+                      <a:endParaRPr lang="es-MX" sz="1100" b="0" i="0" u="none" strike="noStrike">
+                        <a:solidFill>
+                          <a:srgbClr val="000000"/>
+                        </a:solidFill>
+                        <a:effectLst/>
+                        <a:latin typeface="Calibri" panose="020F0502020204030204" pitchFamily="34" charset="0"/>
+                      </a:endParaRPr>
+                    </a:p>
+                  </a:txBody>
+                  <a:tcPr marL="9525" marR="9525" marT="9525" marB="0" anchor="b"/>
+                </a:tc>
+                <a:tc>
+                  <a:txBody>
+                    <a:bodyPr/>
+                    <a:lstStyle/>
+                    <a:p>
+                      <a:pPr algn="ctr" fontAlgn="b"/>
+                      <a:r>
+                        <a:rPr lang="es-MX" sz="1100" u="none" strike="noStrike">
+                          <a:effectLst/>
+                        </a:rPr>
+                        <a:t>0</a:t>
+                      </a:r>
+                      <a:endParaRPr lang="es-MX" sz="1100" b="0" i="0" u="none" strike="noStrike">
+                        <a:solidFill>
+                          <a:srgbClr val="000000"/>
+                        </a:solidFill>
+                        <a:effectLst/>
+                        <a:latin typeface="Calibri" panose="020F0502020204030204" pitchFamily="34" charset="0"/>
+                      </a:endParaRPr>
+                    </a:p>
+                  </a:txBody>
+                  <a:tcPr marL="9525" marR="9525" marT="9525" marB="0" anchor="b"/>
+                </a:tc>
+                <a:tc>
+                  <a:txBody>
+                    <a:bodyPr/>
+                    <a:lstStyle/>
+                    <a:p>
+                      <a:pPr algn="r" fontAlgn="b"/>
+                      <a:r>
+                        <a:rPr lang="es-MX" sz="1100" u="none" strike="noStrike">
+                          <a:effectLst/>
+                        </a:rPr>
+                        <a:t>100%</a:t>
+                      </a:r>
+                      <a:endParaRPr lang="es-MX" sz="1100" b="0" i="0" u="none" strike="noStrike">
+                        <a:solidFill>
+                          <a:srgbClr val="000000"/>
+                        </a:solidFill>
+                        <a:effectLst/>
+                        <a:latin typeface="Calibri" panose="020F0502020204030204" pitchFamily="34" charset="0"/>
+                      </a:endParaRPr>
+                    </a:p>
+                  </a:txBody>
+                  <a:tcPr marL="9525" marR="9525" marT="9525" marB="0" anchor="b"/>
+                </a:tc>
+              </a:tr>
+              <a:tr h="276175">
+                <a:tc vMerge="1">
+                  <a:txBody>
+                    <a:bodyPr/>
+                    <a:lstStyle/>
+                    <a:p>
+                      <a:endParaRPr lang="es-MX"/>
+                    </a:p>
+                  </a:txBody>
+                  <a:tcPr/>
+                </a:tc>
+                <a:tc>
+                  <a:txBody>
+                    <a:bodyPr/>
+                    <a:lstStyle/>
+                    <a:p>
+                      <a:pPr algn="l" fontAlgn="b"/>
+                      <a:r>
+                        <a:rPr lang="es-MX" sz="1100" u="none" strike="noStrike">
+                          <a:effectLst/>
+                        </a:rPr>
+                        <a:t>Correctivo</a:t>
+                      </a:r>
+                      <a:endParaRPr lang="es-MX" sz="1100" b="0" i="0" u="none" strike="noStrike">
+                        <a:solidFill>
+                          <a:srgbClr val="000000"/>
+                        </a:solidFill>
+                        <a:effectLst/>
+                        <a:latin typeface="Calibri" panose="020F0502020204030204" pitchFamily="34" charset="0"/>
+                      </a:endParaRPr>
+                    </a:p>
+                  </a:txBody>
+                  <a:tcPr marL="9525" marR="9525" marT="9525" marB="0" anchor="b"/>
+                </a:tc>
+                <a:tc>
+                  <a:txBody>
+                    <a:bodyPr/>
+                    <a:lstStyle/>
+                    <a:p>
+                      <a:pPr algn="ctr" fontAlgn="b"/>
+                      <a:r>
+                        <a:rPr lang="es-MX" sz="1100" u="none" strike="noStrike">
+                          <a:effectLst/>
+                        </a:rPr>
+                        <a:t>140</a:t>
+                      </a:r>
+                      <a:endParaRPr lang="es-MX" sz="1100" b="0" i="0" u="none" strike="noStrike">
+                        <a:solidFill>
+                          <a:srgbClr val="000000"/>
+                        </a:solidFill>
+                        <a:effectLst/>
+                        <a:latin typeface="Calibri" panose="020F0502020204030204" pitchFamily="34" charset="0"/>
+                      </a:endParaRPr>
+                    </a:p>
+                  </a:txBody>
+                  <a:tcPr marL="9525" marR="9525" marT="9525" marB="0" anchor="b"/>
+                </a:tc>
+                <a:tc>
+                  <a:txBody>
+                    <a:bodyPr/>
+                    <a:lstStyle/>
+                    <a:p>
+                      <a:pPr algn="ctr" fontAlgn="b"/>
+                      <a:r>
+                        <a:rPr lang="es-MX" sz="1100" u="none" strike="noStrike">
+                          <a:effectLst/>
+                        </a:rPr>
+                        <a:t>0</a:t>
+                      </a:r>
+                      <a:endParaRPr lang="es-MX" sz="1100" b="0" i="0" u="none" strike="noStrike">
+                        <a:solidFill>
+                          <a:srgbClr val="000000"/>
+                        </a:solidFill>
+                        <a:effectLst/>
+                        <a:latin typeface="Calibri" panose="020F0502020204030204" pitchFamily="34" charset="0"/>
+                      </a:endParaRPr>
+                    </a:p>
+                  </a:txBody>
+                  <a:tcPr marL="9525" marR="9525" marT="9525" marB="0" anchor="b"/>
+                </a:tc>
+                <a:tc>
+                  <a:txBody>
+                    <a:bodyPr/>
+                    <a:lstStyle/>
+                    <a:p>
+                      <a:pPr algn="r" fontAlgn="b"/>
+                      <a:r>
+                        <a:rPr lang="es-MX" sz="1100" u="none" strike="noStrike">
+                          <a:effectLst/>
+                        </a:rPr>
+                        <a:t>100%</a:t>
+                      </a:r>
+                      <a:endParaRPr lang="es-MX" sz="1100" b="0" i="0" u="none" strike="noStrike">
+                        <a:solidFill>
+                          <a:srgbClr val="000000"/>
+                        </a:solidFill>
+                        <a:effectLst/>
+                        <a:latin typeface="Calibri" panose="020F0502020204030204" pitchFamily="34" charset="0"/>
+                      </a:endParaRPr>
+                    </a:p>
+                  </a:txBody>
+                  <a:tcPr marL="9525" marR="9525" marT="9525" marB="0" anchor="b"/>
+                </a:tc>
+              </a:tr>
+              <a:tr h="499876">
+                <a:tc rowSpan="2">
+                  <a:txBody>
+                    <a:bodyPr/>
+                    <a:lstStyle/>
+                    <a:p>
+                      <a:pPr algn="ctr" fontAlgn="ctr"/>
+                      <a:r>
+                        <a:rPr lang="es-MX" sz="1100" u="none" strike="noStrike">
+                          <a:effectLst/>
+                        </a:rPr>
+                        <a:t>Planeación</a:t>
+                      </a:r>
+                      <a:endParaRPr lang="es-MX" sz="1100" b="0" i="0" u="none" strike="noStrike">
+                        <a:solidFill>
+                          <a:srgbClr val="000000"/>
+                        </a:solidFill>
+                        <a:effectLst/>
+                        <a:latin typeface="Calibri" panose="020F0502020204030204" pitchFamily="34" charset="0"/>
+                      </a:endParaRPr>
+                    </a:p>
+                  </a:txBody>
+                  <a:tcPr marL="9525" marR="9525" marT="9525" marB="0" anchor="ctr"/>
+                </a:tc>
+                <a:tc>
+                  <a:txBody>
+                    <a:bodyPr/>
+                    <a:lstStyle/>
+                    <a:p>
+                      <a:pPr algn="l" fontAlgn="b"/>
+                      <a:r>
+                        <a:rPr lang="es-MX" sz="1100" u="none" strike="noStrike">
+                          <a:effectLst/>
+                        </a:rPr>
+                        <a:t>Preventivo</a:t>
+                      </a:r>
+                      <a:endParaRPr lang="es-MX" sz="1100" b="0" i="0" u="none" strike="noStrike">
+                        <a:solidFill>
+                          <a:srgbClr val="000000"/>
+                        </a:solidFill>
+                        <a:effectLst/>
+                        <a:latin typeface="Calibri" panose="020F0502020204030204" pitchFamily="34" charset="0"/>
+                      </a:endParaRPr>
+                    </a:p>
+                  </a:txBody>
+                  <a:tcPr marL="9525" marR="9525" marT="9525" marB="0" anchor="b"/>
+                </a:tc>
+                <a:tc>
+                  <a:txBody>
+                    <a:bodyPr/>
+                    <a:lstStyle/>
+                    <a:p>
+                      <a:pPr algn="ctr" fontAlgn="b"/>
+                      <a:r>
+                        <a:rPr lang="es-MX" sz="1100" u="none" strike="noStrike">
+                          <a:effectLst/>
+                        </a:rPr>
+                        <a:t>45,6</a:t>
+                      </a:r>
+                      <a:endParaRPr lang="es-MX" sz="1100" b="0" i="0" u="none" strike="noStrike">
+                        <a:solidFill>
+                          <a:srgbClr val="000000"/>
+                        </a:solidFill>
+                        <a:effectLst/>
+                        <a:latin typeface="Calibri" panose="020F0502020204030204" pitchFamily="34" charset="0"/>
+                      </a:endParaRPr>
+                    </a:p>
+                  </a:txBody>
+                  <a:tcPr marL="9525" marR="9525" marT="9525" marB="0" anchor="b"/>
+                </a:tc>
+                <a:tc>
+                  <a:txBody>
+                    <a:bodyPr/>
+                    <a:lstStyle/>
+                    <a:p>
+                      <a:pPr algn="ctr" fontAlgn="b"/>
+                      <a:r>
+                        <a:rPr lang="es-MX" sz="1100" u="none" strike="noStrike">
+                          <a:effectLst/>
+                        </a:rPr>
+                        <a:t>25</a:t>
+                      </a:r>
+                      <a:endParaRPr lang="es-MX" sz="1100" b="0" i="0" u="none" strike="noStrike">
+                        <a:solidFill>
+                          <a:srgbClr val="000000"/>
+                        </a:solidFill>
+                        <a:effectLst/>
+                        <a:latin typeface="Calibri" panose="020F0502020204030204" pitchFamily="34" charset="0"/>
+                      </a:endParaRPr>
+                    </a:p>
+                  </a:txBody>
+                  <a:tcPr marL="9525" marR="9525" marT="9525" marB="0" anchor="b"/>
+                </a:tc>
+                <a:tc>
+                  <a:txBody>
+                    <a:bodyPr/>
+                    <a:lstStyle/>
+                    <a:p>
+                      <a:pPr algn="r" fontAlgn="b"/>
+                      <a:r>
+                        <a:rPr lang="es-MX" sz="1100" u="none" strike="noStrike">
+                          <a:effectLst/>
+                        </a:rPr>
+                        <a:t>45%</a:t>
+                      </a:r>
+                      <a:endParaRPr lang="es-MX" sz="1100" b="0" i="0" u="none" strike="noStrike">
+                        <a:solidFill>
+                          <a:srgbClr val="000000"/>
+                        </a:solidFill>
+                        <a:effectLst/>
+                        <a:latin typeface="Calibri" panose="020F0502020204030204" pitchFamily="34" charset="0"/>
+                      </a:endParaRPr>
+                    </a:p>
+                  </a:txBody>
+                  <a:tcPr marL="9525" marR="9525" marT="9525" marB="0" anchor="b"/>
+                </a:tc>
+              </a:tr>
+              <a:tr h="276175">
+                <a:tc vMerge="1">
+                  <a:txBody>
+                    <a:bodyPr/>
+                    <a:lstStyle/>
+                    <a:p>
+                      <a:endParaRPr lang="es-MX"/>
+                    </a:p>
+                  </a:txBody>
+                  <a:tcPr/>
+                </a:tc>
+                <a:tc>
+                  <a:txBody>
+                    <a:bodyPr/>
+                    <a:lstStyle/>
+                    <a:p>
+                      <a:pPr algn="l" fontAlgn="b"/>
+                      <a:r>
+                        <a:rPr lang="es-MX" sz="1100" u="none" strike="noStrike">
+                          <a:effectLst/>
+                        </a:rPr>
+                        <a:t>Correctivo</a:t>
+                      </a:r>
+                      <a:endParaRPr lang="es-MX" sz="1100" b="0" i="0" u="none" strike="noStrike">
+                        <a:solidFill>
+                          <a:srgbClr val="000000"/>
+                        </a:solidFill>
+                        <a:effectLst/>
+                        <a:latin typeface="Calibri" panose="020F0502020204030204" pitchFamily="34" charset="0"/>
+                      </a:endParaRPr>
+                    </a:p>
+                  </a:txBody>
+                  <a:tcPr marL="9525" marR="9525" marT="9525" marB="0" anchor="b"/>
+                </a:tc>
+                <a:tc>
+                  <a:txBody>
+                    <a:bodyPr/>
+                    <a:lstStyle/>
+                    <a:p>
+                      <a:pPr algn="ctr" fontAlgn="b"/>
+                      <a:r>
+                        <a:rPr lang="es-MX" sz="1100" u="none" strike="noStrike">
+                          <a:effectLst/>
+                        </a:rPr>
+                        <a:t>91,2</a:t>
+                      </a:r>
+                      <a:endParaRPr lang="es-MX" sz="1100" b="0" i="0" u="none" strike="noStrike">
+                        <a:solidFill>
+                          <a:srgbClr val="000000"/>
+                        </a:solidFill>
+                        <a:effectLst/>
+                        <a:latin typeface="Calibri" panose="020F0502020204030204" pitchFamily="34" charset="0"/>
+                      </a:endParaRPr>
+                    </a:p>
+                  </a:txBody>
+                  <a:tcPr marL="9525" marR="9525" marT="9525" marB="0" anchor="b"/>
+                </a:tc>
+                <a:tc>
+                  <a:txBody>
+                    <a:bodyPr/>
+                    <a:lstStyle/>
+                    <a:p>
+                      <a:pPr algn="ctr" fontAlgn="b"/>
+                      <a:r>
+                        <a:rPr lang="es-MX" sz="1100" u="none" strike="noStrike">
+                          <a:effectLst/>
+                        </a:rPr>
+                        <a:t>80</a:t>
+                      </a:r>
+                      <a:endParaRPr lang="es-MX" sz="1100" b="0" i="0" u="none" strike="noStrike">
+                        <a:solidFill>
+                          <a:srgbClr val="000000"/>
+                        </a:solidFill>
+                        <a:effectLst/>
+                        <a:latin typeface="Calibri" panose="020F0502020204030204" pitchFamily="34" charset="0"/>
+                      </a:endParaRPr>
+                    </a:p>
+                  </a:txBody>
+                  <a:tcPr marL="9525" marR="9525" marT="9525" marB="0" anchor="b"/>
+                </a:tc>
+                <a:tc>
+                  <a:txBody>
+                    <a:bodyPr/>
+                    <a:lstStyle/>
+                    <a:p>
+                      <a:pPr algn="r" fontAlgn="b"/>
+                      <a:r>
+                        <a:rPr lang="es-MX" sz="1100" u="none" strike="noStrike">
+                          <a:effectLst/>
+                        </a:rPr>
+                        <a:t>12%</a:t>
+                      </a:r>
+                      <a:endParaRPr lang="es-MX" sz="1100" b="0" i="0" u="none" strike="noStrike">
+                        <a:solidFill>
+                          <a:srgbClr val="000000"/>
+                        </a:solidFill>
+                        <a:effectLst/>
+                        <a:latin typeface="Calibri" panose="020F0502020204030204" pitchFamily="34" charset="0"/>
+                      </a:endParaRPr>
+                    </a:p>
+                  </a:txBody>
+                  <a:tcPr marL="9525" marR="9525" marT="9525" marB="0" anchor="b"/>
+                </a:tc>
+              </a:tr>
+              <a:tr h="276175">
+                <a:tc>
+                  <a:txBody>
+                    <a:bodyPr/>
+                    <a:lstStyle/>
+                    <a:p>
+                      <a:pPr algn="ctr" fontAlgn="b"/>
+                      <a:r>
+                        <a:rPr lang="es-MX" sz="1100" u="none" strike="noStrike">
+                          <a:effectLst/>
+                        </a:rPr>
+                        <a:t>Medicion-Monitoreo</a:t>
+                      </a:r>
+                      <a:endParaRPr lang="es-MX" sz="1100" b="0" i="0" u="none" strike="noStrike">
+                        <a:solidFill>
+                          <a:srgbClr val="000000"/>
+                        </a:solidFill>
+                        <a:effectLst/>
+                        <a:latin typeface="Calibri" panose="020F0502020204030204" pitchFamily="34" charset="0"/>
+                      </a:endParaRPr>
+                    </a:p>
+                  </a:txBody>
+                  <a:tcPr marL="9525" marR="9525" marT="9525" marB="0" anchor="b"/>
+                </a:tc>
+                <a:tc>
+                  <a:txBody>
+                    <a:bodyPr/>
+                    <a:lstStyle/>
+                    <a:p>
+                      <a:pPr algn="ctr" fontAlgn="b"/>
+                      <a:r>
+                        <a:rPr lang="es-MX" sz="1100" u="none" strike="noStrike">
+                          <a:effectLst/>
+                        </a:rPr>
+                        <a:t> </a:t>
+                      </a:r>
+                      <a:endParaRPr lang="es-MX" sz="1100" b="0" i="0" u="none" strike="noStrike">
+                        <a:solidFill>
+                          <a:srgbClr val="000000"/>
+                        </a:solidFill>
+                        <a:effectLst/>
+                        <a:latin typeface="Calibri" panose="020F0502020204030204" pitchFamily="34" charset="0"/>
+                      </a:endParaRPr>
+                    </a:p>
+                  </a:txBody>
+                  <a:tcPr marL="9525" marR="9525" marT="9525" marB="0" anchor="b"/>
+                </a:tc>
+                <a:tc>
+                  <a:txBody>
+                    <a:bodyPr/>
+                    <a:lstStyle/>
+                    <a:p>
+                      <a:pPr algn="ctr" fontAlgn="b"/>
+                      <a:r>
+                        <a:rPr lang="es-MX" sz="1100" u="none" strike="noStrike">
+                          <a:effectLst/>
+                        </a:rPr>
+                        <a:t>1</a:t>
+                      </a:r>
+                      <a:endParaRPr lang="es-MX" sz="1100" b="0" i="0" u="none" strike="noStrike">
+                        <a:solidFill>
+                          <a:srgbClr val="000000"/>
+                        </a:solidFill>
+                        <a:effectLst/>
+                        <a:latin typeface="Calibri" panose="020F0502020204030204" pitchFamily="34" charset="0"/>
+                      </a:endParaRPr>
+                    </a:p>
+                  </a:txBody>
+                  <a:tcPr marL="9525" marR="9525" marT="9525" marB="0" anchor="b"/>
+                </a:tc>
+                <a:tc>
+                  <a:txBody>
+                    <a:bodyPr/>
+                    <a:lstStyle/>
+                    <a:p>
+                      <a:pPr algn="ctr" fontAlgn="b"/>
+                      <a:r>
+                        <a:rPr lang="es-MX" sz="1100" u="none" strike="noStrike">
+                          <a:effectLst/>
+                        </a:rPr>
+                        <a:t>1</a:t>
+                      </a:r>
+                      <a:endParaRPr lang="es-MX" sz="1100" b="0" i="0" u="none" strike="noStrike">
+                        <a:solidFill>
+                          <a:srgbClr val="000000"/>
+                        </a:solidFill>
+                        <a:effectLst/>
+                        <a:latin typeface="Calibri" panose="020F0502020204030204" pitchFamily="34" charset="0"/>
+                      </a:endParaRPr>
+                    </a:p>
+                  </a:txBody>
+                  <a:tcPr marL="9525" marR="9525" marT="9525" marB="0" anchor="b"/>
+                </a:tc>
+                <a:tc>
+                  <a:txBody>
+                    <a:bodyPr/>
+                    <a:lstStyle/>
+                    <a:p>
+                      <a:pPr algn="r" fontAlgn="b"/>
+                      <a:r>
+                        <a:rPr lang="es-MX" sz="1100" u="none" strike="noStrike">
+                          <a:effectLst/>
+                        </a:rPr>
+                        <a:t>0%</a:t>
+                      </a:r>
+                      <a:endParaRPr lang="es-MX" sz="1100" b="0" i="0" u="none" strike="noStrike">
+                        <a:solidFill>
+                          <a:srgbClr val="000000"/>
+                        </a:solidFill>
+                        <a:effectLst/>
+                        <a:latin typeface="Calibri" panose="020F0502020204030204" pitchFamily="34" charset="0"/>
+                      </a:endParaRPr>
+                    </a:p>
+                  </a:txBody>
+                  <a:tcPr marL="9525" marR="9525" marT="9525" marB="0" anchor="b"/>
+                </a:tc>
+              </a:tr>
+              <a:tr h="276175">
+                <a:tc>
+                  <a:txBody>
+                    <a:bodyPr/>
+                    <a:lstStyle/>
+                    <a:p>
+                      <a:pPr algn="ctr" fontAlgn="b"/>
+                      <a:r>
+                        <a:rPr lang="es-MX" sz="1100" u="none" strike="noStrike">
+                          <a:effectLst/>
+                        </a:rPr>
+                        <a:t>Calidad</a:t>
+                      </a:r>
+                      <a:endParaRPr lang="es-MX" sz="1100" b="0" i="0" u="none" strike="noStrike">
+                        <a:solidFill>
+                          <a:srgbClr val="000000"/>
+                        </a:solidFill>
+                        <a:effectLst/>
+                        <a:latin typeface="Calibri" panose="020F0502020204030204" pitchFamily="34" charset="0"/>
+                      </a:endParaRPr>
+                    </a:p>
+                  </a:txBody>
+                  <a:tcPr marL="9525" marR="9525" marT="9525" marB="0" anchor="b"/>
+                </a:tc>
+                <a:tc>
+                  <a:txBody>
+                    <a:bodyPr/>
+                    <a:lstStyle/>
+                    <a:p>
+                      <a:pPr algn="ctr" fontAlgn="b"/>
+                      <a:r>
+                        <a:rPr lang="es-MX" sz="1100" u="none" strike="noStrike">
+                          <a:effectLst/>
+                        </a:rPr>
+                        <a:t> </a:t>
+                      </a:r>
+                      <a:endParaRPr lang="es-MX" sz="1100" b="0" i="0" u="none" strike="noStrike">
+                        <a:solidFill>
+                          <a:srgbClr val="000000"/>
+                        </a:solidFill>
+                        <a:effectLst/>
+                        <a:latin typeface="Calibri" panose="020F0502020204030204" pitchFamily="34" charset="0"/>
+                      </a:endParaRPr>
+                    </a:p>
+                  </a:txBody>
+                  <a:tcPr marL="9525" marR="9525" marT="9525" marB="0" anchor="b"/>
+                </a:tc>
+                <a:tc>
+                  <a:txBody>
+                    <a:bodyPr/>
+                    <a:lstStyle/>
+                    <a:p>
+                      <a:pPr algn="ctr" fontAlgn="b"/>
+                      <a:r>
+                        <a:rPr lang="es-MX" sz="1100" u="none" strike="noStrike">
+                          <a:effectLst/>
+                        </a:rPr>
+                        <a:t>2</a:t>
+                      </a:r>
+                      <a:endParaRPr lang="es-MX" sz="1100" b="0" i="0" u="none" strike="noStrike">
+                        <a:solidFill>
+                          <a:srgbClr val="000000"/>
+                        </a:solidFill>
+                        <a:effectLst/>
+                        <a:latin typeface="Calibri" panose="020F0502020204030204" pitchFamily="34" charset="0"/>
+                      </a:endParaRPr>
+                    </a:p>
+                  </a:txBody>
+                  <a:tcPr marL="9525" marR="9525" marT="9525" marB="0" anchor="b"/>
+                </a:tc>
+                <a:tc>
+                  <a:txBody>
+                    <a:bodyPr/>
+                    <a:lstStyle/>
+                    <a:p>
+                      <a:pPr algn="ctr" fontAlgn="b"/>
+                      <a:r>
+                        <a:rPr lang="es-MX" sz="1100" u="none" strike="noStrike">
+                          <a:effectLst/>
+                        </a:rPr>
+                        <a:t>2,4</a:t>
+                      </a:r>
+                      <a:endParaRPr lang="es-MX" sz="1100" b="0" i="0" u="none" strike="noStrike">
+                        <a:solidFill>
+                          <a:srgbClr val="000000"/>
+                        </a:solidFill>
+                        <a:effectLst/>
+                        <a:latin typeface="Calibri" panose="020F0502020204030204" pitchFamily="34" charset="0"/>
+                      </a:endParaRPr>
+                    </a:p>
+                  </a:txBody>
+                  <a:tcPr marL="9525" marR="9525" marT="9525" marB="0" anchor="b"/>
+                </a:tc>
+                <a:tc>
+                  <a:txBody>
+                    <a:bodyPr/>
+                    <a:lstStyle/>
+                    <a:p>
+                      <a:pPr algn="r" fontAlgn="b"/>
+                      <a:r>
+                        <a:rPr lang="es-MX" sz="1100" u="none" strike="noStrike">
+                          <a:effectLst/>
+                        </a:rPr>
+                        <a:t>-20%</a:t>
+                      </a:r>
+                      <a:endParaRPr lang="es-MX" sz="1100" b="0" i="0" u="none" strike="noStrike">
+                        <a:solidFill>
+                          <a:srgbClr val="000000"/>
+                        </a:solidFill>
+                        <a:effectLst/>
+                        <a:latin typeface="Calibri" panose="020F0502020204030204" pitchFamily="34" charset="0"/>
+                      </a:endParaRPr>
+                    </a:p>
+                  </a:txBody>
+                  <a:tcPr marL="9525" marR="9525" marT="9525" marB="0" anchor="b"/>
+                </a:tc>
+              </a:tr>
+              <a:tr h="276175">
+                <a:tc>
+                  <a:txBody>
+                    <a:bodyPr/>
+                    <a:lstStyle/>
+                    <a:p>
+                      <a:pPr algn="ctr" fontAlgn="b"/>
+                      <a:r>
+                        <a:rPr lang="es-MX" sz="1100" u="none" strike="noStrike">
+                          <a:effectLst/>
+                        </a:rPr>
+                        <a:t>Configuracion</a:t>
+                      </a:r>
+                      <a:endParaRPr lang="es-MX" sz="1100" b="0" i="0" u="none" strike="noStrike">
+                        <a:solidFill>
+                          <a:srgbClr val="000000"/>
+                        </a:solidFill>
+                        <a:effectLst/>
+                        <a:latin typeface="Calibri" panose="020F0502020204030204" pitchFamily="34" charset="0"/>
+                      </a:endParaRPr>
+                    </a:p>
+                  </a:txBody>
+                  <a:tcPr marL="9525" marR="9525" marT="9525" marB="0" anchor="b"/>
+                </a:tc>
+                <a:tc>
+                  <a:txBody>
+                    <a:bodyPr/>
+                    <a:lstStyle/>
+                    <a:p>
+                      <a:pPr algn="ctr" fontAlgn="b"/>
+                      <a:r>
+                        <a:rPr lang="es-MX" sz="1100" u="none" strike="noStrike">
+                          <a:effectLst/>
+                        </a:rPr>
+                        <a:t> </a:t>
+                      </a:r>
+                      <a:endParaRPr lang="es-MX" sz="1100" b="0" i="0" u="none" strike="noStrike">
+                        <a:solidFill>
+                          <a:srgbClr val="000000"/>
+                        </a:solidFill>
+                        <a:effectLst/>
+                        <a:latin typeface="Calibri" panose="020F0502020204030204" pitchFamily="34" charset="0"/>
+                      </a:endParaRPr>
+                    </a:p>
+                  </a:txBody>
+                  <a:tcPr marL="9525" marR="9525" marT="9525" marB="0" anchor="b"/>
+                </a:tc>
+                <a:tc>
+                  <a:txBody>
+                    <a:bodyPr/>
+                    <a:lstStyle/>
+                    <a:p>
+                      <a:pPr algn="ctr" fontAlgn="b"/>
+                      <a:r>
+                        <a:rPr lang="es-MX" sz="1100" u="none" strike="noStrike">
+                          <a:effectLst/>
+                        </a:rPr>
+                        <a:t>0,5</a:t>
+                      </a:r>
+                      <a:endParaRPr lang="es-MX" sz="1100" b="0" i="0" u="none" strike="noStrike">
+                        <a:solidFill>
+                          <a:srgbClr val="000000"/>
+                        </a:solidFill>
+                        <a:effectLst/>
+                        <a:latin typeface="Calibri" panose="020F0502020204030204" pitchFamily="34" charset="0"/>
+                      </a:endParaRPr>
+                    </a:p>
+                  </a:txBody>
+                  <a:tcPr marL="9525" marR="9525" marT="9525" marB="0" anchor="b"/>
+                </a:tc>
+                <a:tc>
+                  <a:txBody>
+                    <a:bodyPr/>
+                    <a:lstStyle/>
+                    <a:p>
+                      <a:pPr algn="ctr" fontAlgn="b"/>
+                      <a:r>
+                        <a:rPr lang="es-MX" sz="1100" u="none" strike="noStrike">
+                          <a:effectLst/>
+                        </a:rPr>
+                        <a:t>0,17</a:t>
+                      </a:r>
+                      <a:endParaRPr lang="es-MX" sz="1100" b="0" i="0" u="none" strike="noStrike">
+                        <a:solidFill>
+                          <a:srgbClr val="000000"/>
+                        </a:solidFill>
+                        <a:effectLst/>
+                        <a:latin typeface="Calibri" panose="020F0502020204030204" pitchFamily="34" charset="0"/>
+                      </a:endParaRPr>
+                    </a:p>
+                  </a:txBody>
+                  <a:tcPr marL="9525" marR="9525" marT="9525" marB="0" anchor="b"/>
+                </a:tc>
+                <a:tc>
+                  <a:txBody>
+                    <a:bodyPr/>
+                    <a:lstStyle/>
+                    <a:p>
+                      <a:pPr algn="r" fontAlgn="b"/>
+                      <a:r>
+                        <a:rPr lang="es-MX" sz="1100" u="none" strike="noStrike" dirty="0">
+                          <a:effectLst/>
+                        </a:rPr>
+                        <a:t>66%</a:t>
+                      </a:r>
+                      <a:endParaRPr lang="es-MX" sz="1100" b="0" i="0" u="none" strike="noStrike" dirty="0">
+                        <a:solidFill>
+                          <a:srgbClr val="000000"/>
+                        </a:solidFill>
+                        <a:effectLst/>
+                        <a:latin typeface="Calibri" panose="020F0502020204030204" pitchFamily="34" charset="0"/>
+                      </a:endParaRPr>
+                    </a:p>
+                  </a:txBody>
+                  <a:tcPr marL="9525" marR="9525" marT="9525" marB="0" anchor="b"/>
+                </a:tc>
+              </a:tr>
+            </a:tbl>
           </a:graphicData>
         </a:graphic>
       </p:graphicFrame>
-      <p:graphicFrame>
-        <p:nvGraphicFramePr>
-          <p:cNvPr id="5" name="4 Gráfico">
-            <a:extLst>
-              <a:ext uri="{FF2B5EF4-FFF2-40B4-BE49-F238E27FC236}">
-                <a16:creationId xmlns:lc="http://schemas.openxmlformats.org/drawingml/2006/lockedCanvas" xmlns="" xmlns:a16="http://schemas.microsoft.com/office/drawing/2014/main" xmlns:xdr="http://schemas.openxmlformats.org/drawingml/2006/spreadsheetDrawing" id="{00000000-0008-0000-0100-000005000000}"/>
-              </a:ext>
-            </a:extLst>
-          </p:cNvPr>
-          <p:cNvGraphicFramePr>
-            <a:graphicFrameLocks/>
-          </p:cNvGraphicFramePr>
-          <p:nvPr>
-            <p:extLst>
-              <p:ext uri="{D42A27DB-BD31-4B8C-83A1-F6EECF244321}">
-                <p14:modId xmlns:p14="http://schemas.microsoft.com/office/powerpoint/2010/main" val="2387950108"/>
-              </p:ext>
-            </p:extLst>
-          </p:nvPr>
-        </p:nvGraphicFramePr>
-        <p:xfrm>
-          <a:off x="323528" y="3789040"/>
-          <a:ext cx="4438650" cy="2800350"/>
-        </p:xfrm>
-        <a:graphic>
-          <a:graphicData uri="http://schemas.openxmlformats.org/drawingml/2006/chart">
-            <c:chart xmlns:c="http://schemas.openxmlformats.org/drawingml/2006/chart" xmlns:r="http://schemas.openxmlformats.org/officeDocument/2006/relationships" r:id="rId3"/>
-          </a:graphicData>
-        </a:graphic>
-      </p:graphicFrame>
-      <p:sp>
-        <p:nvSpPr>
-          <p:cNvPr id="2" name="CuadroTexto 1"/>
-          <p:cNvSpPr txBox="1"/>
-          <p:nvPr/>
-        </p:nvSpPr>
-        <p:spPr>
-          <a:xfrm>
-            <a:off x="5292080" y="1416240"/>
-            <a:ext cx="3393280" cy="923330"/>
-          </a:xfrm>
-          <a:prstGeom prst="rect">
-            <a:avLst/>
-          </a:prstGeom>
-          <a:noFill/>
-        </p:spPr>
-        <p:txBody>
-          <a:bodyPr wrap="square" rtlCol="0">
-            <a:spAutoFit/>
-          </a:bodyPr>
-          <a:lstStyle/>
-          <a:p>
-            <a:r>
-              <a:rPr lang="es-MX" dirty="0" smtClean="0"/>
-              <a:t>Por falta de clientes no existen horas a registrar en la entrega de servicio.</a:t>
-            </a:r>
-            <a:endParaRPr lang="es-MX" dirty="0"/>
-          </a:p>
-        </p:txBody>
-      </p:sp>
     </p:spTree>
   </p:cSld>
   <p:clrMapOvr>
@@ -7166,9 +7755,77 @@
           </a:p>
         </p:txBody>
       </p:sp>
+      <p:sp>
+        <p:nvSpPr>
+          <p:cNvPr id="2" name="CuadroTexto 1"/>
+          <p:cNvSpPr txBox="1"/>
+          <p:nvPr/>
+        </p:nvSpPr>
+        <p:spPr>
+          <a:xfrm>
+            <a:off x="1115616" y="4077072"/>
+            <a:ext cx="7056784" cy="646331"/>
+          </a:xfrm>
+          <a:prstGeom prst="rect">
+            <a:avLst/>
+          </a:prstGeom>
+          <a:noFill/>
+        </p:spPr>
+        <p:txBody>
+          <a:bodyPr wrap="square" rtlCol="0">
+            <a:spAutoFit/>
+          </a:bodyPr>
+          <a:lstStyle/>
+          <a:p>
+            <a:r>
+              <a:rPr lang="es-MX" dirty="0" smtClean="0"/>
+              <a:t>Actualmente no se han generado </a:t>
+            </a:r>
+            <a:r>
+              <a:rPr lang="es-MX" dirty="0" err="1" smtClean="0"/>
+              <a:t>evaluaciónes</a:t>
+            </a:r>
+            <a:r>
+              <a:rPr lang="es-MX" dirty="0" smtClean="0"/>
+              <a:t> sobre métricas , plan de configuración y plan de auditorias</a:t>
+            </a:r>
+            <a:endParaRPr lang="es-MX" dirty="0"/>
+          </a:p>
+        </p:txBody>
+      </p:sp>
       <p:graphicFrame>
         <p:nvGraphicFramePr>
-          <p:cNvPr id="4" name="4 Gráfico">
+          <p:cNvPr id="8" name="1 Gráfico">
+            <a:extLst>
+              <a:ext uri="{FF2B5EF4-FFF2-40B4-BE49-F238E27FC236}">
+                <a16:creationId xmlns:lc="http://schemas.openxmlformats.org/drawingml/2006/lockedCanvas" xmlns="" xmlns:a16="http://schemas.microsoft.com/office/drawing/2014/main" xmlns:xdr="http://schemas.openxmlformats.org/drawingml/2006/spreadsheetDrawing" id="{00000000-0008-0000-0400-000002000000}"/>
+              </a:ext>
+            </a:extLst>
+          </p:cNvPr>
+          <p:cNvGraphicFramePr>
+            <a:graphicFrameLocks/>
+          </p:cNvGraphicFramePr>
+          <p:nvPr>
+            <p:extLst>
+              <p:ext uri="{D42A27DB-BD31-4B8C-83A1-F6EECF244321}">
+                <p14:modId xmlns:p14="http://schemas.microsoft.com/office/powerpoint/2010/main" val="2012074757"/>
+              </p:ext>
+            </p:extLst>
+          </p:nvPr>
+        </p:nvGraphicFramePr>
+        <p:xfrm>
+          <a:off x="251520" y="908720"/>
+          <a:ext cx="4457700" cy="2857500"/>
+        </p:xfrm>
+        <a:graphic>
+          <a:graphicData uri="http://schemas.openxmlformats.org/drawingml/2006/chart">
+            <c:chart xmlns:c="http://schemas.openxmlformats.org/drawingml/2006/chart" xmlns:r="http://schemas.openxmlformats.org/officeDocument/2006/relationships" r:id="rId2"/>
+          </a:graphicData>
+        </a:graphic>
+      </p:graphicFrame>
+      <p:graphicFrame>
+        <p:nvGraphicFramePr>
+          <p:cNvPr id="9" name="4 Gráfico">
             <a:extLst>
               <a:ext uri="{FF2B5EF4-FFF2-40B4-BE49-F238E27FC236}">
                 <a16:creationId xmlns:lc="http://schemas.openxmlformats.org/drawingml/2006/lockedCanvas" xmlns="" xmlns:a16="http://schemas.microsoft.com/office/drawing/2014/main" xmlns:xdr="http://schemas.openxmlformats.org/drawingml/2006/spreadsheetDrawing" id="{00000000-0008-0000-0400-000005000000}"/>
@@ -7181,44 +7838,14 @@
           <p:nvPr>
             <p:extLst>
               <p:ext uri="{D42A27DB-BD31-4B8C-83A1-F6EECF244321}">
-                <p14:modId xmlns:p14="http://schemas.microsoft.com/office/powerpoint/2010/main" val="1823616336"/>
+                <p14:modId xmlns:p14="http://schemas.microsoft.com/office/powerpoint/2010/main" val="2743471965"/>
               </p:ext>
             </p:extLst>
           </p:nvPr>
         </p:nvGraphicFramePr>
         <p:xfrm>
-          <a:off x="4355976" y="1124744"/>
+          <a:off x="4427984" y="908720"/>
           <a:ext cx="4867275" cy="2857500"/>
-        </p:xfrm>
-        <a:graphic>
-          <a:graphicData uri="http://schemas.openxmlformats.org/drawingml/2006/chart">
-            <c:chart xmlns:c="http://schemas.openxmlformats.org/drawingml/2006/chart" xmlns:r="http://schemas.openxmlformats.org/officeDocument/2006/relationships" r:id="rId2"/>
-          </a:graphicData>
-        </a:graphic>
-      </p:graphicFrame>
-      <p:graphicFrame>
-        <p:nvGraphicFramePr>
-          <p:cNvPr id="6" name="1 Gráfico">
-            <a:extLst>
-              <a:ext uri="{FF2B5EF4-FFF2-40B4-BE49-F238E27FC236}">
-                <a16:creationId xmlns:lc="http://schemas.openxmlformats.org/drawingml/2006/lockedCanvas" xmlns="" xmlns:a16="http://schemas.microsoft.com/office/drawing/2014/main" xmlns:xdr="http://schemas.openxmlformats.org/drawingml/2006/spreadsheetDrawing" id="{00000000-0008-0000-0400-000002000000}"/>
-              </a:ext>
-            </a:extLst>
-          </p:cNvPr>
-          <p:cNvGraphicFramePr>
-            <a:graphicFrameLocks/>
-          </p:cNvGraphicFramePr>
-          <p:nvPr>
-            <p:extLst>
-              <p:ext uri="{D42A27DB-BD31-4B8C-83A1-F6EECF244321}">
-                <p14:modId xmlns:p14="http://schemas.microsoft.com/office/powerpoint/2010/main" val="601394539"/>
-              </p:ext>
-            </p:extLst>
-          </p:nvPr>
-        </p:nvGraphicFramePr>
-        <p:xfrm>
-          <a:off x="251520" y="1124744"/>
-          <a:ext cx="4457700" cy="2857500"/>
         </p:xfrm>
         <a:graphic>
           <a:graphicData uri="http://schemas.openxmlformats.org/drawingml/2006/chart">
@@ -7226,36 +7853,6 @@
           </a:graphicData>
         </a:graphic>
       </p:graphicFrame>
-      <p:sp>
-        <p:nvSpPr>
-          <p:cNvPr id="2" name="CuadroTexto 1"/>
-          <p:cNvSpPr txBox="1"/>
-          <p:nvPr/>
-        </p:nvSpPr>
-        <p:spPr>
-          <a:xfrm>
-            <a:off x="1115616" y="4077072"/>
-            <a:ext cx="7056784" cy="923330"/>
-          </a:xfrm>
-          <a:prstGeom prst="rect">
-            <a:avLst/>
-          </a:prstGeom>
-          <a:noFill/>
-        </p:spPr>
-        <p:txBody>
-          <a:bodyPr wrap="square" rtlCol="0">
-            <a:spAutoFit/>
-          </a:bodyPr>
-          <a:lstStyle/>
-          <a:p>
-            <a:r>
-              <a:rPr lang="es-MX" dirty="0" smtClean="0"/>
-              <a:t>Actualmente no se cuenta con evaluación sobre monitoreo , métricas y auditorias , por ese motivo esas sección aun aparecen en blanco.</a:t>
-            </a:r>
-            <a:endParaRPr lang="es-MX" dirty="0"/>
-          </a:p>
-        </p:txBody>
-      </p:sp>
     </p:spTree>
   </p:cSld>
   <p:clrMapOvr>
@@ -7379,9 +7976,69 @@
           </a:p>
         </p:txBody>
       </p:sp>
+      <p:sp>
+        <p:nvSpPr>
+          <p:cNvPr id="2" name="CuadroTexto 1"/>
+          <p:cNvSpPr txBox="1"/>
+          <p:nvPr/>
+        </p:nvSpPr>
+        <p:spPr>
+          <a:xfrm>
+            <a:off x="1547664" y="4149080"/>
+            <a:ext cx="6192688" cy="923330"/>
+          </a:xfrm>
+          <a:prstGeom prst="rect">
+            <a:avLst/>
+          </a:prstGeom>
+          <a:noFill/>
+        </p:spPr>
+        <p:txBody>
+          <a:bodyPr wrap="square" rtlCol="0">
+            <a:spAutoFit/>
+          </a:bodyPr>
+          <a:lstStyle/>
+          <a:p>
+            <a:r>
+              <a:rPr lang="es-MX" dirty="0" smtClean="0"/>
+              <a:t>Dentro de procesos solo se puede evaluar la planeación por falta de clientes mientras que organizacionalmente no existe evaluación alguna.</a:t>
+            </a:r>
+            <a:endParaRPr lang="es-MX" dirty="0"/>
+          </a:p>
+        </p:txBody>
+      </p:sp>
       <p:graphicFrame>
         <p:nvGraphicFramePr>
-          <p:cNvPr id="4" name="6 Gráfico">
+          <p:cNvPr id="7" name="4 Gráfico">
+            <a:extLst>
+              <a:ext uri="{FF2B5EF4-FFF2-40B4-BE49-F238E27FC236}">
+                <a16:creationId xmlns:lc="http://schemas.openxmlformats.org/drawingml/2006/lockedCanvas" xmlns="" xmlns:a16="http://schemas.microsoft.com/office/drawing/2014/main" xmlns:xdr="http://schemas.openxmlformats.org/drawingml/2006/spreadsheetDrawing" id="{00000000-0008-0000-0300-000005000000}"/>
+              </a:ext>
+            </a:extLst>
+          </p:cNvPr>
+          <p:cNvGraphicFramePr>
+            <a:graphicFrameLocks/>
+          </p:cNvGraphicFramePr>
+          <p:nvPr>
+            <p:extLst>
+              <p:ext uri="{D42A27DB-BD31-4B8C-83A1-F6EECF244321}">
+                <p14:modId xmlns:p14="http://schemas.microsoft.com/office/powerpoint/2010/main" val="575854914"/>
+              </p:ext>
+            </p:extLst>
+          </p:nvPr>
+        </p:nvGraphicFramePr>
+        <p:xfrm>
+          <a:off x="251520" y="980728"/>
+          <a:ext cx="4448175" cy="2857500"/>
+        </p:xfrm>
+        <a:graphic>
+          <a:graphicData uri="http://schemas.openxmlformats.org/drawingml/2006/chart">
+            <c:chart xmlns:c="http://schemas.openxmlformats.org/drawingml/2006/chart" xmlns:r="http://schemas.openxmlformats.org/officeDocument/2006/relationships" r:id="rId2"/>
+          </a:graphicData>
+        </a:graphic>
+      </p:graphicFrame>
+      <p:graphicFrame>
+        <p:nvGraphicFramePr>
+          <p:cNvPr id="8" name="6 Gráfico">
             <a:extLst>
               <a:ext uri="{FF2B5EF4-FFF2-40B4-BE49-F238E27FC236}">
                 <a16:creationId xmlns:lc="http://schemas.openxmlformats.org/drawingml/2006/lockedCanvas" xmlns="" xmlns:a16="http://schemas.microsoft.com/office/drawing/2014/main" xmlns:xdr="http://schemas.openxmlformats.org/drawingml/2006/spreadsheetDrawing" id="{00000000-0008-0000-0300-000007000000}"/>
@@ -7394,44 +8051,14 @@
           <p:nvPr>
             <p:extLst>
               <p:ext uri="{D42A27DB-BD31-4B8C-83A1-F6EECF244321}">
-                <p14:modId xmlns:p14="http://schemas.microsoft.com/office/powerpoint/2010/main" val="410861350"/>
+                <p14:modId xmlns:p14="http://schemas.microsoft.com/office/powerpoint/2010/main" val="2566418046"/>
               </p:ext>
             </p:extLst>
           </p:nvPr>
         </p:nvGraphicFramePr>
         <p:xfrm>
-          <a:off x="251520" y="1052736"/>
+          <a:off x="4499992" y="980728"/>
           <a:ext cx="4448175" cy="2847975"/>
-        </p:xfrm>
-        <a:graphic>
-          <a:graphicData uri="http://schemas.openxmlformats.org/drawingml/2006/chart">
-            <c:chart xmlns:c="http://schemas.openxmlformats.org/drawingml/2006/chart" xmlns:r="http://schemas.openxmlformats.org/officeDocument/2006/relationships" r:id="rId2"/>
-          </a:graphicData>
-        </a:graphic>
-      </p:graphicFrame>
-      <p:graphicFrame>
-        <p:nvGraphicFramePr>
-          <p:cNvPr id="5" name="4 Gráfico">
-            <a:extLst>
-              <a:ext uri="{FF2B5EF4-FFF2-40B4-BE49-F238E27FC236}">
-                <a16:creationId xmlns:lc="http://schemas.openxmlformats.org/drawingml/2006/lockedCanvas" xmlns="" xmlns:a16="http://schemas.microsoft.com/office/drawing/2014/main" xmlns:xdr="http://schemas.openxmlformats.org/drawingml/2006/spreadsheetDrawing" id="{00000000-0008-0000-0300-000005000000}"/>
-              </a:ext>
-            </a:extLst>
-          </p:cNvPr>
-          <p:cNvGraphicFramePr>
-            <a:graphicFrameLocks/>
-          </p:cNvGraphicFramePr>
-          <p:nvPr>
-            <p:extLst>
-              <p:ext uri="{D42A27DB-BD31-4B8C-83A1-F6EECF244321}">
-                <p14:modId xmlns:p14="http://schemas.microsoft.com/office/powerpoint/2010/main" val="2594924610"/>
-              </p:ext>
-            </p:extLst>
-          </p:nvPr>
-        </p:nvGraphicFramePr>
-        <p:xfrm>
-          <a:off x="4572000" y="1124744"/>
-          <a:ext cx="4448175" cy="2857500"/>
         </p:xfrm>
         <a:graphic>
           <a:graphicData uri="http://schemas.openxmlformats.org/drawingml/2006/chart">
@@ -7439,36 +8066,6 @@
           </a:graphicData>
         </a:graphic>
       </p:graphicFrame>
-      <p:sp>
-        <p:nvSpPr>
-          <p:cNvPr id="2" name="CuadroTexto 1"/>
-          <p:cNvSpPr txBox="1"/>
-          <p:nvPr/>
-        </p:nvSpPr>
-        <p:spPr>
-          <a:xfrm>
-            <a:off x="1547664" y="4149080"/>
-            <a:ext cx="6192688" cy="1200329"/>
-          </a:xfrm>
-          <a:prstGeom prst="rect">
-            <a:avLst/>
-          </a:prstGeom>
-          <a:noFill/>
-        </p:spPr>
-        <p:txBody>
-          <a:bodyPr wrap="square" rtlCol="0">
-            <a:spAutoFit/>
-          </a:bodyPr>
-          <a:lstStyle/>
-          <a:p>
-            <a:r>
-              <a:rPr lang="es-MX" dirty="0" smtClean="0"/>
-              <a:t>Debido a que no se cuenta con clientes la ejecución no puede ser aplica en estos momentos, monitoreo queda en blanco por motivos en los cuales aun no se puede presentar dicha evaluación por falta de clientes.</a:t>
-            </a:r>
-            <a:endParaRPr lang="es-MX" dirty="0"/>
-          </a:p>
-        </p:txBody>
-      </p:sp>
     </p:spTree>
   </p:cSld>
   <p:clrMapOvr>

</xml_diff>

<commit_message>
Reportes de monitoreo por auditoria mayo
</commit_message>
<xml_diff>
--- a/qualtcom/Organizacional/Medicion y Monitoreo/Reporte Monitoreo-150227.pptx
+++ b/qualtcom/Organizacional/Medicion y Monitoreo/Reporte Monitoreo-150227.pptx
@@ -165,6 +165,7 @@
           </a:p>
         </c:rich>
       </c:tx>
+      <c:layout/>
       <c:overlay val="0"/>
     </c:title>
     <c:autoTitleDeleted val="0"/>
@@ -283,11 +284,11 @@
           <c:showBubbleSize val="0"/>
         </c:dLbls>
         <c:gapWidth val="150"/>
-        <c:axId val="71563616"/>
-        <c:axId val="71564176"/>
+        <c:axId val="139399360"/>
+        <c:axId val="139397680"/>
       </c:barChart>
       <c:catAx>
-        <c:axId val="71563616"/>
+        <c:axId val="139399360"/>
         <c:scaling>
           <c:orientation val="minMax"/>
         </c:scaling>
@@ -297,7 +298,7 @@
         <c:majorTickMark val="none"/>
         <c:minorTickMark val="none"/>
         <c:tickLblPos val="nextTo"/>
-        <c:crossAx val="71564176"/>
+        <c:crossAx val="139397680"/>
         <c:crosses val="autoZero"/>
         <c:auto val="1"/>
         <c:lblAlgn val="ctr"/>
@@ -305,7 +306,7 @@
         <c:noMultiLvlLbl val="0"/>
       </c:catAx>
       <c:valAx>
-        <c:axId val="71564176"/>
+        <c:axId val="139397680"/>
         <c:scaling>
           <c:orientation val="minMax"/>
         </c:scaling>
@@ -316,13 +317,14 @@
         <c:majorTickMark val="none"/>
         <c:minorTickMark val="none"/>
         <c:tickLblPos val="nextTo"/>
-        <c:crossAx val="71563616"/>
+        <c:crossAx val="139399360"/>
         <c:crosses val="autoZero"/>
         <c:crossBetween val="between"/>
       </c:valAx>
     </c:plotArea>
     <c:legend>
       <c:legendPos val="r"/>
+      <c:layout/>
       <c:overlay val="0"/>
     </c:legend>
     <c:plotVisOnly val="1"/>
@@ -336,6 +338,626 @@
 </file>
 
 <file path=ppt/charts/chart2.xml><?xml version="1.0" encoding="utf-8"?>
+<c:chartSpace xmlns:c="http://schemas.openxmlformats.org/drawingml/2006/chart" xmlns:a="http://schemas.openxmlformats.org/drawingml/2006/main" xmlns:r="http://schemas.openxmlformats.org/officeDocument/2006/relationships">
+  <c:date1904 val="0"/>
+  <c:lang val="es-ES"/>
+  <c:roundedCorners val="0"/>
+  <mc:AlternateContent xmlns:mc="http://schemas.openxmlformats.org/markup-compatibility/2006">
+    <mc:Choice xmlns:c14="http://schemas.microsoft.com/office/drawing/2007/8/2/chart" Requires="c14">
+      <c14:style val="102"/>
+    </mc:Choice>
+    <mc:Fallback>
+      <c:style val="2"/>
+    </mc:Fallback>
+  </mc:AlternateContent>
+  <c:chart>
+    <c:title>
+      <c:tx>
+        <c:rich>
+          <a:bodyPr/>
+          <a:lstStyle/>
+          <a:p>
+            <a:pPr>
+              <a:defRPr/>
+            </a:pPr>
+            <a:r>
+              <a:rPr lang="en-US"/>
+              <a:t>Desviación</a:t>
+            </a:r>
+          </a:p>
+        </c:rich>
+      </c:tx>
+      <c:layout/>
+      <c:overlay val="0"/>
+    </c:title>
+    <c:autoTitleDeleted val="0"/>
+    <c:plotArea>
+      <c:layout/>
+      <c:barChart>
+        <c:barDir val="col"/>
+        <c:grouping val="clustered"/>
+        <c:varyColors val="0"/>
+        <c:ser>
+          <c:idx val="0"/>
+          <c:order val="0"/>
+          <c:tx>
+            <c:strRef>
+              <c:f>'Desviacion de costos'!$E$18:$E$19</c:f>
+              <c:strCache>
+                <c:ptCount val="2"/>
+                <c:pt idx="1">
+                  <c:v>Desviación</c:v>
+                </c:pt>
+              </c:strCache>
+            </c:strRef>
+          </c:tx>
+          <c:invertIfNegative val="0"/>
+          <c:cat>
+            <c:strRef>
+              <c:f>'Desviacion de costos'!$B$20:$B$21</c:f>
+              <c:strCache>
+                <c:ptCount val="2"/>
+                <c:pt idx="0">
+                  <c:v>Entrega de Servicio</c:v>
+                </c:pt>
+                <c:pt idx="1">
+                  <c:v>Planeación</c:v>
+                </c:pt>
+              </c:strCache>
+            </c:strRef>
+          </c:cat>
+          <c:val>
+            <c:numRef>
+              <c:f>'Desviacion de costos'!$E$20:$E$21</c:f>
+              <c:numCache>
+                <c:formatCode>0%</c:formatCode>
+                <c:ptCount val="2"/>
+                <c:pt idx="0">
+                  <c:v>1</c:v>
+                </c:pt>
+                <c:pt idx="1">
+                  <c:v>0.17714749382215175</c:v>
+                </c:pt>
+              </c:numCache>
+            </c:numRef>
+          </c:val>
+          <c:extLst>
+            <c:ext xmlns:c16="http://schemas.microsoft.com/office/drawing/2014/chart" uri="{C3380CC4-5D6E-409C-BE32-E72D297353CC}">
+              <c16:uniqueId val="{00000000-4C53-4413-9153-0DEA66086AD7}"/>
+            </c:ext>
+          </c:extLst>
+        </c:ser>
+        <c:dLbls>
+          <c:showLegendKey val="0"/>
+          <c:showVal val="0"/>
+          <c:showCatName val="0"/>
+          <c:showSerName val="0"/>
+          <c:showPercent val="0"/>
+          <c:showBubbleSize val="0"/>
+        </c:dLbls>
+        <c:gapWidth val="150"/>
+        <c:axId val="183132304"/>
+        <c:axId val="183135664"/>
+      </c:barChart>
+      <c:catAx>
+        <c:axId val="183132304"/>
+        <c:scaling>
+          <c:orientation val="minMax"/>
+        </c:scaling>
+        <c:delete val="0"/>
+        <c:axPos val="b"/>
+        <c:numFmt formatCode="General" sourceLinked="0"/>
+        <c:majorTickMark val="out"/>
+        <c:minorTickMark val="none"/>
+        <c:tickLblPos val="nextTo"/>
+        <c:crossAx val="183135664"/>
+        <c:crosses val="autoZero"/>
+        <c:auto val="1"/>
+        <c:lblAlgn val="ctr"/>
+        <c:lblOffset val="100"/>
+        <c:noMultiLvlLbl val="0"/>
+      </c:catAx>
+      <c:valAx>
+        <c:axId val="183135664"/>
+        <c:scaling>
+          <c:orientation val="minMax"/>
+          <c:max val="1"/>
+          <c:min val="0"/>
+        </c:scaling>
+        <c:delete val="0"/>
+        <c:axPos val="l"/>
+        <c:majorGridlines/>
+        <c:numFmt formatCode="0%" sourceLinked="1"/>
+        <c:majorTickMark val="out"/>
+        <c:minorTickMark val="none"/>
+        <c:tickLblPos val="nextTo"/>
+        <c:crossAx val="183132304"/>
+        <c:crosses val="autoZero"/>
+        <c:crossBetween val="between"/>
+      </c:valAx>
+    </c:plotArea>
+    <c:plotVisOnly val="1"/>
+    <c:dispBlanksAs val="gap"/>
+    <c:showDLblsOverMax val="0"/>
+  </c:chart>
+  <c:externalData r:id="rId1">
+    <c:autoUpdate val="0"/>
+  </c:externalData>
+</c:chartSpace>
+</file>
+
+<file path=ppt/charts/chart3.xml><?xml version="1.0" encoding="utf-8"?>
+<c:chartSpace xmlns:c="http://schemas.openxmlformats.org/drawingml/2006/chart" xmlns:a="http://schemas.openxmlformats.org/drawingml/2006/main" xmlns:r="http://schemas.openxmlformats.org/officeDocument/2006/relationships">
+  <c:date1904 val="0"/>
+  <c:lang val="es-ES"/>
+  <c:roundedCorners val="0"/>
+  <mc:AlternateContent xmlns:mc="http://schemas.openxmlformats.org/markup-compatibility/2006">
+    <mc:Choice xmlns:c14="http://schemas.microsoft.com/office/drawing/2007/8/2/chart" Requires="c14">
+      <c14:style val="102"/>
+    </mc:Choice>
+    <mc:Fallback>
+      <c:style val="2"/>
+    </mc:Fallback>
+  </mc:AlternateContent>
+  <c:chart>
+    <c:title>
+      <c:tx>
+        <c:rich>
+          <a:bodyPr/>
+          <a:lstStyle/>
+          <a:p>
+            <a:pPr>
+              <a:defRPr/>
+            </a:pPr>
+            <a:r>
+              <a:rPr lang="es-MX"/>
+              <a:t>Esfuerzo</a:t>
+            </a:r>
+          </a:p>
+        </c:rich>
+      </c:tx>
+      <c:layout/>
+      <c:overlay val="0"/>
+    </c:title>
+    <c:autoTitleDeleted val="0"/>
+    <c:plotArea>
+      <c:layout/>
+      <c:barChart>
+        <c:barDir val="col"/>
+        <c:grouping val="clustered"/>
+        <c:varyColors val="0"/>
+        <c:ser>
+          <c:idx val="0"/>
+          <c:order val="0"/>
+          <c:tx>
+            <c:strRef>
+              <c:f>'Desviacion de esfuerzo'!$D$18:$D$19</c:f>
+              <c:strCache>
+                <c:ptCount val="2"/>
+                <c:pt idx="1">
+                  <c:v>Planeado</c:v>
+                </c:pt>
+              </c:strCache>
+            </c:strRef>
+          </c:tx>
+          <c:invertIfNegative val="0"/>
+          <c:cat>
+            <c:multiLvlStrRef>
+              <c:f>'Desviacion de esfuerzo'!$B$20:$C$26</c:f>
+              <c:multiLvlStrCache>
+                <c:ptCount val="7"/>
+                <c:lvl>
+                  <c:pt idx="0">
+                    <c:v>Preventivo</c:v>
+                  </c:pt>
+                  <c:pt idx="1">
+                    <c:v>Correctivo</c:v>
+                  </c:pt>
+                  <c:pt idx="2">
+                    <c:v>Preventivo</c:v>
+                  </c:pt>
+                  <c:pt idx="3">
+                    <c:v>Correctivo</c:v>
+                  </c:pt>
+                </c:lvl>
+                <c:lvl>
+                  <c:pt idx="0">
+                    <c:v>Entrega de Servicio</c:v>
+                  </c:pt>
+                  <c:pt idx="2">
+                    <c:v>Planeación</c:v>
+                  </c:pt>
+                  <c:pt idx="4">
+                    <c:v>Medicion-Monitoreo</c:v>
+                  </c:pt>
+                  <c:pt idx="5">
+                    <c:v>Calidad</c:v>
+                  </c:pt>
+                  <c:pt idx="6">
+                    <c:v>Configuracion</c:v>
+                  </c:pt>
+                </c:lvl>
+              </c:multiLvlStrCache>
+            </c:multiLvlStrRef>
+          </c:cat>
+          <c:val>
+            <c:numRef>
+              <c:f>'Desviacion de esfuerzo'!$D$20:$D$26</c:f>
+              <c:numCache>
+                <c:formatCode>General</c:formatCode>
+                <c:ptCount val="7"/>
+                <c:pt idx="0">
+                  <c:v>140</c:v>
+                </c:pt>
+                <c:pt idx="1">
+                  <c:v>140</c:v>
+                </c:pt>
+                <c:pt idx="2">
+                  <c:v>45.600000000000009</c:v>
+                </c:pt>
+                <c:pt idx="3">
+                  <c:v>91.200000000000017</c:v>
+                </c:pt>
+                <c:pt idx="4">
+                  <c:v>1</c:v>
+                </c:pt>
+                <c:pt idx="5">
+                  <c:v>2</c:v>
+                </c:pt>
+                <c:pt idx="6">
+                  <c:v>0.5</c:v>
+                </c:pt>
+              </c:numCache>
+            </c:numRef>
+          </c:val>
+          <c:extLst>
+            <c:ext xmlns:c16="http://schemas.microsoft.com/office/drawing/2014/chart" uri="{C3380CC4-5D6E-409C-BE32-E72D297353CC}">
+              <c16:uniqueId val="{00000000-8F41-4054-8548-137549410953}"/>
+            </c:ext>
+          </c:extLst>
+        </c:ser>
+        <c:ser>
+          <c:idx val="1"/>
+          <c:order val="1"/>
+          <c:tx>
+            <c:strRef>
+              <c:f>'Desviacion de esfuerzo'!$E$18:$E$19</c:f>
+              <c:strCache>
+                <c:ptCount val="2"/>
+                <c:pt idx="1">
+                  <c:v>Real </c:v>
+                </c:pt>
+              </c:strCache>
+            </c:strRef>
+          </c:tx>
+          <c:invertIfNegative val="0"/>
+          <c:cat>
+            <c:multiLvlStrRef>
+              <c:f>'Desviacion de esfuerzo'!$B$20:$C$26</c:f>
+              <c:multiLvlStrCache>
+                <c:ptCount val="7"/>
+                <c:lvl>
+                  <c:pt idx="0">
+                    <c:v>Preventivo</c:v>
+                  </c:pt>
+                  <c:pt idx="1">
+                    <c:v>Correctivo</c:v>
+                  </c:pt>
+                  <c:pt idx="2">
+                    <c:v>Preventivo</c:v>
+                  </c:pt>
+                  <c:pt idx="3">
+                    <c:v>Correctivo</c:v>
+                  </c:pt>
+                </c:lvl>
+                <c:lvl>
+                  <c:pt idx="0">
+                    <c:v>Entrega de Servicio</c:v>
+                  </c:pt>
+                  <c:pt idx="2">
+                    <c:v>Planeación</c:v>
+                  </c:pt>
+                  <c:pt idx="4">
+                    <c:v>Medicion-Monitoreo</c:v>
+                  </c:pt>
+                  <c:pt idx="5">
+                    <c:v>Calidad</c:v>
+                  </c:pt>
+                  <c:pt idx="6">
+                    <c:v>Configuracion</c:v>
+                  </c:pt>
+                </c:lvl>
+              </c:multiLvlStrCache>
+            </c:multiLvlStrRef>
+          </c:cat>
+          <c:val>
+            <c:numRef>
+              <c:f>'Desviacion de esfuerzo'!$E$20:$E$26</c:f>
+              <c:numCache>
+                <c:formatCode>General</c:formatCode>
+                <c:ptCount val="7"/>
+                <c:pt idx="0">
+                  <c:v>0</c:v>
+                </c:pt>
+                <c:pt idx="1">
+                  <c:v>0</c:v>
+                </c:pt>
+                <c:pt idx="2">
+                  <c:v>25</c:v>
+                </c:pt>
+                <c:pt idx="3">
+                  <c:v>80</c:v>
+                </c:pt>
+                <c:pt idx="4">
+                  <c:v>1</c:v>
+                </c:pt>
+                <c:pt idx="5">
+                  <c:v>2.4</c:v>
+                </c:pt>
+                <c:pt idx="6">
+                  <c:v>0.17</c:v>
+                </c:pt>
+              </c:numCache>
+            </c:numRef>
+          </c:val>
+          <c:extLst>
+            <c:ext xmlns:c16="http://schemas.microsoft.com/office/drawing/2014/chart" uri="{C3380CC4-5D6E-409C-BE32-E72D297353CC}">
+              <c16:uniqueId val="{00000001-8F41-4054-8548-137549410953}"/>
+            </c:ext>
+          </c:extLst>
+        </c:ser>
+        <c:dLbls>
+          <c:showLegendKey val="0"/>
+          <c:showVal val="0"/>
+          <c:showCatName val="0"/>
+          <c:showSerName val="0"/>
+          <c:showPercent val="0"/>
+          <c:showBubbleSize val="0"/>
+        </c:dLbls>
+        <c:gapWidth val="150"/>
+        <c:axId val="189317344"/>
+        <c:axId val="189319024"/>
+      </c:barChart>
+      <c:catAx>
+        <c:axId val="189317344"/>
+        <c:scaling>
+          <c:orientation val="minMax"/>
+        </c:scaling>
+        <c:delete val="0"/>
+        <c:axPos val="b"/>
+        <c:numFmt formatCode="General" sourceLinked="0"/>
+        <c:majorTickMark val="none"/>
+        <c:minorTickMark val="none"/>
+        <c:tickLblPos val="nextTo"/>
+        <c:crossAx val="189319024"/>
+        <c:crosses val="autoZero"/>
+        <c:auto val="1"/>
+        <c:lblAlgn val="ctr"/>
+        <c:lblOffset val="100"/>
+        <c:noMultiLvlLbl val="0"/>
+      </c:catAx>
+      <c:valAx>
+        <c:axId val="189319024"/>
+        <c:scaling>
+          <c:orientation val="minMax"/>
+        </c:scaling>
+        <c:delete val="0"/>
+        <c:axPos val="l"/>
+        <c:majorGridlines/>
+        <c:numFmt formatCode="General" sourceLinked="1"/>
+        <c:majorTickMark val="none"/>
+        <c:minorTickMark val="none"/>
+        <c:tickLblPos val="nextTo"/>
+        <c:crossAx val="189317344"/>
+        <c:crosses val="autoZero"/>
+        <c:crossBetween val="between"/>
+      </c:valAx>
+    </c:plotArea>
+    <c:legend>
+      <c:legendPos val="r"/>
+      <c:layout/>
+      <c:overlay val="0"/>
+    </c:legend>
+    <c:plotVisOnly val="1"/>
+    <c:dispBlanksAs val="gap"/>
+    <c:showDLblsOverMax val="0"/>
+  </c:chart>
+  <c:externalData r:id="rId1">
+    <c:autoUpdate val="0"/>
+  </c:externalData>
+</c:chartSpace>
+</file>
+
+<file path=ppt/charts/chart4.xml><?xml version="1.0" encoding="utf-8"?>
+<c:chartSpace xmlns:c="http://schemas.openxmlformats.org/drawingml/2006/chart" xmlns:a="http://schemas.openxmlformats.org/drawingml/2006/main" xmlns:r="http://schemas.openxmlformats.org/officeDocument/2006/relationships">
+  <c:date1904 val="0"/>
+  <c:lang val="es-ES"/>
+  <c:roundedCorners val="0"/>
+  <mc:AlternateContent xmlns:mc="http://schemas.openxmlformats.org/markup-compatibility/2006">
+    <mc:Choice xmlns:c14="http://schemas.microsoft.com/office/drawing/2007/8/2/chart" Requires="c14">
+      <c14:style val="102"/>
+    </mc:Choice>
+    <mc:Fallback>
+      <c:style val="2"/>
+    </mc:Fallback>
+  </mc:AlternateContent>
+  <c:chart>
+    <c:title>
+      <c:tx>
+        <c:rich>
+          <a:bodyPr/>
+          <a:lstStyle/>
+          <a:p>
+            <a:pPr>
+              <a:defRPr/>
+            </a:pPr>
+            <a:r>
+              <a:rPr lang="en-US"/>
+              <a:t>Desviación</a:t>
+            </a:r>
+          </a:p>
+        </c:rich>
+      </c:tx>
+      <c:layout/>
+      <c:overlay val="0"/>
+    </c:title>
+    <c:autoTitleDeleted val="0"/>
+    <c:plotArea>
+      <c:layout/>
+      <c:barChart>
+        <c:barDir val="col"/>
+        <c:grouping val="clustered"/>
+        <c:varyColors val="0"/>
+        <c:ser>
+          <c:idx val="0"/>
+          <c:order val="0"/>
+          <c:tx>
+            <c:strRef>
+              <c:f>'Desviacion de esfuerzo'!$F$18:$F$19</c:f>
+              <c:strCache>
+                <c:ptCount val="2"/>
+                <c:pt idx="1">
+                  <c:v>Desviación</c:v>
+                </c:pt>
+              </c:strCache>
+            </c:strRef>
+          </c:tx>
+          <c:invertIfNegative val="0"/>
+          <c:cat>
+            <c:multiLvlStrRef>
+              <c:f>'Desviacion de esfuerzo'!$B$20:$C$26</c:f>
+              <c:multiLvlStrCache>
+                <c:ptCount val="7"/>
+                <c:lvl>
+                  <c:pt idx="0">
+                    <c:v>Preventivo</c:v>
+                  </c:pt>
+                  <c:pt idx="1">
+                    <c:v>Correctivo</c:v>
+                  </c:pt>
+                  <c:pt idx="2">
+                    <c:v>Preventivo</c:v>
+                  </c:pt>
+                  <c:pt idx="3">
+                    <c:v>Correctivo</c:v>
+                  </c:pt>
+                </c:lvl>
+                <c:lvl>
+                  <c:pt idx="0">
+                    <c:v>Entrega de Servicio</c:v>
+                  </c:pt>
+                  <c:pt idx="2">
+                    <c:v>Planeación</c:v>
+                  </c:pt>
+                  <c:pt idx="4">
+                    <c:v>Medicion-Monitoreo</c:v>
+                  </c:pt>
+                  <c:pt idx="5">
+                    <c:v>Calidad</c:v>
+                  </c:pt>
+                  <c:pt idx="6">
+                    <c:v>Configuracion</c:v>
+                  </c:pt>
+                </c:lvl>
+              </c:multiLvlStrCache>
+            </c:multiLvlStrRef>
+          </c:cat>
+          <c:val>
+            <c:numRef>
+              <c:f>'Desviacion de esfuerzo'!$F$20:$F$26</c:f>
+              <c:numCache>
+                <c:formatCode>0%</c:formatCode>
+                <c:ptCount val="7"/>
+                <c:pt idx="0">
+                  <c:v>1</c:v>
+                </c:pt>
+                <c:pt idx="1">
+                  <c:v>1</c:v>
+                </c:pt>
+                <c:pt idx="2">
+                  <c:v>0.45175438596491241</c:v>
+                </c:pt>
+                <c:pt idx="3">
+                  <c:v>0.12280701754385981</c:v>
+                </c:pt>
+                <c:pt idx="4">
+                  <c:v>0</c:v>
+                </c:pt>
+                <c:pt idx="5">
+                  <c:v>-0.19999999999999996</c:v>
+                </c:pt>
+                <c:pt idx="6">
+                  <c:v>0.65999999999999992</c:v>
+                </c:pt>
+              </c:numCache>
+            </c:numRef>
+          </c:val>
+          <c:extLst>
+            <c:ext xmlns:c16="http://schemas.microsoft.com/office/drawing/2014/chart" uri="{C3380CC4-5D6E-409C-BE32-E72D297353CC}">
+              <c16:uniqueId val="{00000000-3C06-4A10-8FB4-B31601AB0A35}"/>
+            </c:ext>
+          </c:extLst>
+        </c:ser>
+        <c:dLbls>
+          <c:showLegendKey val="0"/>
+          <c:showVal val="0"/>
+          <c:showCatName val="0"/>
+          <c:showSerName val="0"/>
+          <c:showPercent val="0"/>
+          <c:showBubbleSize val="0"/>
+        </c:dLbls>
+        <c:gapWidth val="150"/>
+        <c:axId val="195310480"/>
+        <c:axId val="195307120"/>
+      </c:barChart>
+      <c:catAx>
+        <c:axId val="195310480"/>
+        <c:scaling>
+          <c:orientation val="minMax"/>
+        </c:scaling>
+        <c:delete val="0"/>
+        <c:axPos val="b"/>
+        <c:numFmt formatCode="General" sourceLinked="0"/>
+        <c:majorTickMark val="out"/>
+        <c:minorTickMark val="none"/>
+        <c:tickLblPos val="nextTo"/>
+        <c:crossAx val="195307120"/>
+        <c:crosses val="autoZero"/>
+        <c:auto val="1"/>
+        <c:lblAlgn val="ctr"/>
+        <c:lblOffset val="100"/>
+        <c:noMultiLvlLbl val="0"/>
+      </c:catAx>
+      <c:valAx>
+        <c:axId val="195307120"/>
+        <c:scaling>
+          <c:orientation val="minMax"/>
+          <c:max val="1"/>
+          <c:min val="0"/>
+        </c:scaling>
+        <c:delete val="0"/>
+        <c:axPos val="l"/>
+        <c:majorGridlines/>
+        <c:numFmt formatCode="0%" sourceLinked="1"/>
+        <c:majorTickMark val="out"/>
+        <c:minorTickMark val="none"/>
+        <c:tickLblPos val="nextTo"/>
+        <c:crossAx val="195310480"/>
+        <c:crosses val="autoZero"/>
+        <c:crossBetween val="between"/>
+      </c:valAx>
+    </c:plotArea>
+    <c:plotVisOnly val="1"/>
+    <c:dispBlanksAs val="gap"/>
+    <c:showDLblsOverMax val="0"/>
+  </c:chart>
+  <c:externalData r:id="rId1">
+    <c:autoUpdate val="0"/>
+  </c:externalData>
+</c:chartSpace>
+</file>
+
+<file path=ppt/charts/chart5.xml><?xml version="1.0" encoding="utf-8"?>
 <c:chartSpace xmlns:c="http://schemas.openxmlformats.org/drawingml/2006/chart" xmlns:a="http://schemas.openxmlformats.org/drawingml/2006/main" xmlns:r="http://schemas.openxmlformats.org/officeDocument/2006/relationships">
   <c:date1904 val="0"/>
   <c:lang val="es-ES"/>
@@ -429,11 +1051,11 @@
           <c:showBubbleSize val="0"/>
         </c:dLbls>
         <c:gapWidth val="150"/>
-        <c:axId val="99419552"/>
-        <c:axId val="99420112"/>
+        <c:axId val="139403280"/>
+        <c:axId val="56402512"/>
       </c:barChart>
       <c:catAx>
-        <c:axId val="99419552"/>
+        <c:axId val="139403280"/>
         <c:scaling>
           <c:orientation val="minMax"/>
         </c:scaling>
@@ -443,7 +1065,7 @@
         <c:majorTickMark val="none"/>
         <c:minorTickMark val="none"/>
         <c:tickLblPos val="nextTo"/>
-        <c:crossAx val="99420112"/>
+        <c:crossAx val="56402512"/>
         <c:crosses val="autoZero"/>
         <c:auto val="1"/>
         <c:lblAlgn val="ctr"/>
@@ -451,7 +1073,7 @@
         <c:noMultiLvlLbl val="0"/>
       </c:catAx>
       <c:valAx>
-        <c:axId val="99420112"/>
+        <c:axId val="56402512"/>
         <c:scaling>
           <c:orientation val="minMax"/>
           <c:max val="1"/>
@@ -463,7 +1085,7 @@
         <c:majorTickMark val="none"/>
         <c:minorTickMark val="none"/>
         <c:tickLblPos val="nextTo"/>
-        <c:crossAx val="99419552"/>
+        <c:crossAx val="139403280"/>
         <c:crosses val="autoZero"/>
         <c:crossBetween val="between"/>
       </c:valAx>
@@ -484,7 +1106,7 @@
 </c:chartSpace>
 </file>
 
-<file path=ppt/charts/chart3.xml><?xml version="1.0" encoding="utf-8"?>
+<file path=ppt/charts/chart6.xml><?xml version="1.0" encoding="utf-8"?>
 <c:chartSpace xmlns:c="http://schemas.openxmlformats.org/drawingml/2006/chart" xmlns:a="http://schemas.openxmlformats.org/drawingml/2006/main" xmlns:r="http://schemas.openxmlformats.org/officeDocument/2006/relationships">
   <c:date1904 val="0"/>
   <c:lang val="es-ES"/>
@@ -585,11 +1207,11 @@
           <c:showBubbleSize val="0"/>
         </c:dLbls>
         <c:gapWidth val="150"/>
-        <c:axId val="99422912"/>
-        <c:axId val="99423472"/>
+        <c:axId val="141398032"/>
+        <c:axId val="141398592"/>
       </c:barChart>
       <c:catAx>
-        <c:axId val="99422912"/>
+        <c:axId val="141398032"/>
         <c:scaling>
           <c:orientation val="minMax"/>
         </c:scaling>
@@ -599,7 +1221,7 @@
         <c:majorTickMark val="none"/>
         <c:minorTickMark val="none"/>
         <c:tickLblPos val="nextTo"/>
-        <c:crossAx val="99423472"/>
+        <c:crossAx val="141398592"/>
         <c:crosses val="autoZero"/>
         <c:auto val="1"/>
         <c:lblAlgn val="ctr"/>
@@ -607,7 +1229,7 @@
         <c:noMultiLvlLbl val="0"/>
       </c:catAx>
       <c:valAx>
-        <c:axId val="99423472"/>
+        <c:axId val="141398592"/>
         <c:scaling>
           <c:orientation val="minMax"/>
           <c:max val="1"/>
@@ -619,7 +1241,7 @@
         <c:majorTickMark val="none"/>
         <c:minorTickMark val="none"/>
         <c:tickLblPos val="nextTo"/>
-        <c:crossAx val="99422912"/>
+        <c:crossAx val="141398032"/>
         <c:crosses val="autoZero"/>
         <c:crossBetween val="between"/>
       </c:valAx>
@@ -640,7 +1262,7 @@
 </c:chartSpace>
 </file>
 
-<file path=ppt/charts/chart4.xml><?xml version="1.0" encoding="utf-8"?>
+<file path=ppt/charts/chart7.xml><?xml version="1.0" encoding="utf-8"?>
 <c:chartSpace xmlns:c="http://schemas.openxmlformats.org/drawingml/2006/chart" xmlns:a="http://schemas.openxmlformats.org/drawingml/2006/main" xmlns:r="http://schemas.openxmlformats.org/officeDocument/2006/relationships">
   <c:date1904 val="0"/>
   <c:lang val="es-ES"/>
@@ -670,11 +1292,22 @@
           </a:p>
         </c:rich>
       </c:tx>
+      <c:layout/>
       <c:overlay val="0"/>
     </c:title>
     <c:autoTitleDeleted val="0"/>
     <c:plotArea>
-      <c:layout/>
+      <c:layout>
+        <c:manualLayout>
+          <c:layoutTarget val="inner"/>
+          <c:xMode val="edge"/>
+          <c:yMode val="edge"/>
+          <c:x val="0.20785606927339215"/>
+          <c:y val="0.2031111111111111"/>
+          <c:w val="0.78644592502860222"/>
+          <c:h val="0.61802939632545928"/>
+        </c:manualLayout>
+      </c:layout>
       <c:barChart>
         <c:barDir val="col"/>
         <c:grouping val="clustered"/>
@@ -733,11 +1366,11 @@
           <c:showBubbleSize val="0"/>
         </c:dLbls>
         <c:gapWidth val="150"/>
-        <c:axId val="99605040"/>
-        <c:axId val="99605600"/>
+        <c:axId val="141401392"/>
+        <c:axId val="141401952"/>
       </c:barChart>
       <c:catAx>
-        <c:axId val="99605040"/>
+        <c:axId val="141401392"/>
         <c:scaling>
           <c:orientation val="minMax"/>
         </c:scaling>
@@ -747,7 +1380,7 @@
         <c:majorTickMark val="none"/>
         <c:minorTickMark val="none"/>
         <c:tickLblPos val="nextTo"/>
-        <c:crossAx val="99605600"/>
+        <c:crossAx val="141401952"/>
         <c:crosses val="autoZero"/>
         <c:auto val="1"/>
         <c:lblAlgn val="ctr"/>
@@ -755,7 +1388,7 @@
         <c:noMultiLvlLbl val="0"/>
       </c:catAx>
       <c:valAx>
-        <c:axId val="99605600"/>
+        <c:axId val="141401952"/>
         <c:scaling>
           <c:orientation val="minMax"/>
           <c:max val="1"/>
@@ -767,7 +1400,7 @@
         <c:majorTickMark val="none"/>
         <c:minorTickMark val="none"/>
         <c:tickLblPos val="nextTo"/>
-        <c:crossAx val="99605040"/>
+        <c:crossAx val="141401392"/>
         <c:crosses val="autoZero"/>
         <c:crossBetween val="between"/>
       </c:valAx>
@@ -788,7 +1421,7 @@
 </c:chartSpace>
 </file>
 
-<file path=ppt/charts/chart5.xml><?xml version="1.0" encoding="utf-8"?>
+<file path=ppt/charts/chart8.xml><?xml version="1.0" encoding="utf-8"?>
 <c:chartSpace xmlns:c="http://schemas.openxmlformats.org/drawingml/2006/chart" xmlns:a="http://schemas.openxmlformats.org/drawingml/2006/main" xmlns:r="http://schemas.openxmlformats.org/officeDocument/2006/relationships">
   <c:date1904 val="0"/>
   <c:lang val="es-ES"/>
@@ -813,159 +1446,12 @@
             </a:pPr>
             <a:r>
               <a:rPr lang="es-MX"/>
-              <a:t>Apego a Productos</a:t>
+              <a:t>Apego a Procesos</a:t>
             </a:r>
           </a:p>
         </c:rich>
       </c:tx>
-      <c:overlay val="0"/>
-    </c:title>
-    <c:autoTitleDeleted val="0"/>
-    <c:plotArea>
       <c:layout/>
-      <c:barChart>
-        <c:barDir val="col"/>
-        <c:grouping val="clustered"/>
-        <c:varyColors val="0"/>
-        <c:ser>
-          <c:idx val="0"/>
-          <c:order val="0"/>
-          <c:invertIfNegative val="0"/>
-          <c:cat>
-            <c:strRef>
-              <c:f>'Apego a Productos'!$C$10:$C$12</c:f>
-              <c:strCache>
-                <c:ptCount val="3"/>
-                <c:pt idx="0">
-                  <c:v>Plan de métricas</c:v>
-                </c:pt>
-                <c:pt idx="1">
-                  <c:v>Plan de configuración</c:v>
-                </c:pt>
-                <c:pt idx="2">
-                  <c:v>Plan de auditorias</c:v>
-                </c:pt>
-              </c:strCache>
-            </c:strRef>
-          </c:cat>
-          <c:val>
-            <c:numRef>
-              <c:f>'Apego a Productos'!$G$10:$G$12</c:f>
-              <c:numCache>
-                <c:formatCode>0%</c:formatCode>
-                <c:ptCount val="3"/>
-                <c:pt idx="0">
-                  <c:v>0</c:v>
-                </c:pt>
-                <c:pt idx="1">
-                  <c:v>0</c:v>
-                </c:pt>
-                <c:pt idx="2">
-                  <c:v>0</c:v>
-                </c:pt>
-              </c:numCache>
-            </c:numRef>
-          </c:val>
-          <c:extLst>
-            <c:ext xmlns:c16="http://schemas.microsoft.com/office/drawing/2014/chart" uri="{C3380CC4-5D6E-409C-BE32-E72D297353CC}">
-              <c16:uniqueId val="{00000000-7775-4687-9B4D-5A5CC5655AC5}"/>
-            </c:ext>
-          </c:extLst>
-        </c:ser>
-        <c:dLbls>
-          <c:showLegendKey val="0"/>
-          <c:showVal val="0"/>
-          <c:showCatName val="0"/>
-          <c:showSerName val="0"/>
-          <c:showPercent val="0"/>
-          <c:showBubbleSize val="0"/>
-        </c:dLbls>
-        <c:gapWidth val="150"/>
-        <c:axId val="99608400"/>
-        <c:axId val="99608960"/>
-      </c:barChart>
-      <c:catAx>
-        <c:axId val="99608400"/>
-        <c:scaling>
-          <c:orientation val="minMax"/>
-        </c:scaling>
-        <c:delete val="0"/>
-        <c:axPos val="b"/>
-        <c:numFmt formatCode="General" sourceLinked="0"/>
-        <c:majorTickMark val="none"/>
-        <c:minorTickMark val="none"/>
-        <c:tickLblPos val="nextTo"/>
-        <c:crossAx val="99608960"/>
-        <c:crosses val="autoZero"/>
-        <c:auto val="1"/>
-        <c:lblAlgn val="ctr"/>
-        <c:lblOffset val="100"/>
-        <c:noMultiLvlLbl val="0"/>
-      </c:catAx>
-      <c:valAx>
-        <c:axId val="99608960"/>
-        <c:scaling>
-          <c:orientation val="minMax"/>
-          <c:max val="1"/>
-        </c:scaling>
-        <c:delete val="0"/>
-        <c:axPos val="l"/>
-        <c:majorGridlines/>
-        <c:numFmt formatCode="0%" sourceLinked="1"/>
-        <c:majorTickMark val="none"/>
-        <c:minorTickMark val="none"/>
-        <c:tickLblPos val="nextTo"/>
-        <c:crossAx val="99608400"/>
-        <c:crosses val="autoZero"/>
-        <c:crossBetween val="between"/>
-      </c:valAx>
-      <c:dTable>
-        <c:showHorzBorder val="1"/>
-        <c:showVertBorder val="1"/>
-        <c:showOutline val="1"/>
-        <c:showKeys val="1"/>
-      </c:dTable>
-    </c:plotArea>
-    <c:plotVisOnly val="1"/>
-    <c:dispBlanksAs val="gap"/>
-    <c:showDLblsOverMax val="0"/>
-  </c:chart>
-  <c:externalData r:id="rId1">
-    <c:autoUpdate val="0"/>
-  </c:externalData>
-</c:chartSpace>
-</file>
-
-<file path=ppt/charts/chart6.xml><?xml version="1.0" encoding="utf-8"?>
-<c:chartSpace xmlns:c="http://schemas.openxmlformats.org/drawingml/2006/chart" xmlns:a="http://schemas.openxmlformats.org/drawingml/2006/main" xmlns:r="http://schemas.openxmlformats.org/officeDocument/2006/relationships">
-  <c:date1904 val="0"/>
-  <c:lang val="es-ES"/>
-  <c:roundedCorners val="0"/>
-  <mc:AlternateContent xmlns:mc="http://schemas.openxmlformats.org/markup-compatibility/2006">
-    <mc:Choice xmlns:c14="http://schemas.microsoft.com/office/drawing/2007/8/2/chart" Requires="c14">
-      <c14:style val="102"/>
-    </mc:Choice>
-    <mc:Fallback>
-      <c:style val="2"/>
-    </mc:Fallback>
-  </mc:AlternateContent>
-  <c:chart>
-    <c:title>
-      <c:tx>
-        <c:rich>
-          <a:bodyPr/>
-          <a:lstStyle/>
-          <a:p>
-            <a:pPr>
-              <a:defRPr/>
-            </a:pPr>
-            <a:r>
-              <a:rPr lang="es-MX"/>
-              <a:t>Apego a Procesos</a:t>
-            </a:r>
-          </a:p>
-        </c:rich>
-      </c:tx>
       <c:overlay val="0"/>
     </c:title>
     <c:autoTitleDeleted val="0"/>
@@ -1029,11 +1515,11 @@
           <c:showBubbleSize val="0"/>
         </c:dLbls>
         <c:gapWidth val="150"/>
-        <c:axId val="100056032"/>
-        <c:axId val="100056592"/>
+        <c:axId val="142021552"/>
+        <c:axId val="142022112"/>
       </c:barChart>
       <c:catAx>
-        <c:axId val="100056032"/>
+        <c:axId val="142021552"/>
         <c:scaling>
           <c:orientation val="minMax"/>
         </c:scaling>
@@ -1043,7 +1529,7 @@
         <c:majorTickMark val="none"/>
         <c:minorTickMark val="none"/>
         <c:tickLblPos val="nextTo"/>
-        <c:crossAx val="100056592"/>
+        <c:crossAx val="142022112"/>
         <c:crosses val="autoZero"/>
         <c:auto val="1"/>
         <c:lblAlgn val="ctr"/>
@@ -1051,7 +1537,7 @@
         <c:noMultiLvlLbl val="0"/>
       </c:catAx>
       <c:valAx>
-        <c:axId val="100056592"/>
+        <c:axId val="142022112"/>
         <c:scaling>
           <c:orientation val="minMax"/>
         </c:scaling>
@@ -1062,155 +1548,7 @@
         <c:majorTickMark val="none"/>
         <c:minorTickMark val="none"/>
         <c:tickLblPos val="nextTo"/>
-        <c:crossAx val="100056032"/>
-        <c:crosses val="autoZero"/>
-        <c:crossBetween val="between"/>
-      </c:valAx>
-      <c:dTable>
-        <c:showHorzBorder val="1"/>
-        <c:showVertBorder val="1"/>
-        <c:showOutline val="1"/>
-        <c:showKeys val="1"/>
-      </c:dTable>
-    </c:plotArea>
-    <c:plotVisOnly val="1"/>
-    <c:dispBlanksAs val="gap"/>
-    <c:showDLblsOverMax val="0"/>
-  </c:chart>
-  <c:externalData r:id="rId1">
-    <c:autoUpdate val="0"/>
-  </c:externalData>
-</c:chartSpace>
-</file>
-
-<file path=ppt/charts/chart7.xml><?xml version="1.0" encoding="utf-8"?>
-<c:chartSpace xmlns:c="http://schemas.openxmlformats.org/drawingml/2006/chart" xmlns:a="http://schemas.openxmlformats.org/drawingml/2006/main" xmlns:r="http://schemas.openxmlformats.org/officeDocument/2006/relationships">
-  <c:date1904 val="0"/>
-  <c:lang val="es-ES"/>
-  <c:roundedCorners val="0"/>
-  <mc:AlternateContent xmlns:mc="http://schemas.openxmlformats.org/markup-compatibility/2006">
-    <mc:Choice xmlns:c14="http://schemas.microsoft.com/office/drawing/2007/8/2/chart" Requires="c14">
-      <c14:style val="102"/>
-    </mc:Choice>
-    <mc:Fallback>
-      <c:style val="2"/>
-    </mc:Fallback>
-  </mc:AlternateContent>
-  <c:chart>
-    <c:title>
-      <c:tx>
-        <c:rich>
-          <a:bodyPr/>
-          <a:lstStyle/>
-          <a:p>
-            <a:pPr>
-              <a:defRPr/>
-            </a:pPr>
-            <a:r>
-              <a:rPr lang="es-MX"/>
-              <a:t>Organizacional</a:t>
-            </a:r>
-          </a:p>
-        </c:rich>
-      </c:tx>
-      <c:overlay val="0"/>
-    </c:title>
-    <c:autoTitleDeleted val="0"/>
-    <c:plotArea>
-      <c:layout/>
-      <c:barChart>
-        <c:barDir val="col"/>
-        <c:grouping val="clustered"/>
-        <c:varyColors val="0"/>
-        <c:ser>
-          <c:idx val="0"/>
-          <c:order val="0"/>
-          <c:invertIfNegative val="0"/>
-          <c:cat>
-            <c:strRef>
-              <c:f>'Apego a Procesos'!$C$10:$C$12</c:f>
-              <c:strCache>
-                <c:ptCount val="3"/>
-                <c:pt idx="0">
-                  <c:v>Metricas </c:v>
-                </c:pt>
-                <c:pt idx="1">
-                  <c:v>Calidad</c:v>
-                </c:pt>
-                <c:pt idx="2">
-                  <c:v>Configuración</c:v>
-                </c:pt>
-              </c:strCache>
-            </c:strRef>
-          </c:cat>
-          <c:val>
-            <c:numRef>
-              <c:f>'Apego a Procesos'!$G$10:$G$12</c:f>
-              <c:numCache>
-                <c:formatCode>0%</c:formatCode>
-                <c:ptCount val="3"/>
-                <c:pt idx="0">
-                  <c:v>0</c:v>
-                </c:pt>
-                <c:pt idx="1">
-                  <c:v>0</c:v>
-                </c:pt>
-                <c:pt idx="2">
-                  <c:v>0</c:v>
-                </c:pt>
-              </c:numCache>
-            </c:numRef>
-          </c:val>
-          <c:extLst>
-            <c:ext xmlns:c16="http://schemas.microsoft.com/office/drawing/2014/chart" uri="{C3380CC4-5D6E-409C-BE32-E72D297353CC}">
-              <c16:uniqueId val="{00000000-0990-45A3-B614-F9841A457726}"/>
-            </c:ext>
-          </c:extLst>
-        </c:ser>
-        <c:dLbls>
-          <c:showLegendKey val="0"/>
-          <c:showVal val="0"/>
-          <c:showCatName val="0"/>
-          <c:showSerName val="0"/>
-          <c:showPercent val="0"/>
-          <c:showBubbleSize val="0"/>
-        </c:dLbls>
-        <c:gapWidth val="150"/>
-        <c:axId val="100059392"/>
-        <c:axId val="100059952"/>
-      </c:barChart>
-      <c:catAx>
-        <c:axId val="100059392"/>
-        <c:scaling>
-          <c:orientation val="minMax"/>
-        </c:scaling>
-        <c:delete val="0"/>
-        <c:axPos val="b"/>
-        <c:numFmt formatCode="General" sourceLinked="0"/>
-        <c:majorTickMark val="none"/>
-        <c:minorTickMark val="none"/>
-        <c:tickLblPos val="nextTo"/>
-        <c:crossAx val="100059952"/>
-        <c:crosses val="autoZero"/>
-        <c:auto val="1"/>
-        <c:lblAlgn val="ctr"/>
-        <c:lblOffset val="100"/>
-        <c:noMultiLvlLbl val="0"/>
-      </c:catAx>
-      <c:valAx>
-        <c:axId val="100059952"/>
-        <c:scaling>
-          <c:orientation val="minMax"/>
-          <c:max val="1"/>
-        </c:scaling>
-        <c:delete val="0"/>
-        <c:axPos val="l"/>
-        <c:majorGridlines/>
-        <c:numFmt formatCode="0%" sourceLinked="1"/>
-        <c:majorTickMark val="none"/>
-        <c:minorTickMark val="none"/>
-        <c:tickLblPos val="nextTo"/>
-        <c:crossAx val="100059392"/>
+        <c:crossAx val="142021552"/>
         <c:crosses val="autoZero"/>
         <c:crossBetween val="between"/>
       </c:valAx>
@@ -5749,36 +6087,13 @@
             </a:r>
             <a:r>
               <a:rPr lang="es-MX" dirty="0" smtClean="0"/>
-              <a:t>Coordinador</a:t>
-            </a:r>
-            <a:r>
-              <a:rPr lang="en-US" dirty="0" smtClean="0"/>
-              <a:t> de </a:t>
-            </a:r>
-            <a:r>
-              <a:rPr lang="en-US" dirty="0" err="1" smtClean="0"/>
-              <a:t>proyecto</a:t>
-            </a:r>
-            <a:r>
-              <a:rPr lang="en-US" dirty="0" smtClean="0"/>
-              <a:t> , </a:t>
-            </a:r>
-            <a:r>
-              <a:rPr lang="en-US" dirty="0" err="1" smtClean="0"/>
-              <a:t>creador</a:t>
-            </a:r>
-            <a:r>
-              <a:rPr lang="en-US" dirty="0" smtClean="0"/>
-              <a:t> de </a:t>
-            </a:r>
-            <a:r>
-              <a:rPr lang="en-US" dirty="0" err="1" smtClean="0"/>
-              <a:t>repositorio</a:t>
+              <a:t>Dirección</a:t>
             </a:r>
             <a:r>
               <a:rPr lang="en-US" dirty="0" smtClean="0"/>
               <a:t>.</a:t>
             </a:r>
+            <a:endParaRPr lang="en-US" dirty="0" smtClean="0"/>
           </a:p>
           <a:p>
             <a:pPr>
@@ -5793,8 +6108,8 @@
               <a:t> Samuel Reyna    – </a:t>
             </a:r>
             <a:r>
-              <a:rPr lang="en-US" dirty="0" err="1" smtClean="0"/>
-              <a:t>Colaborador</a:t>
+              <a:rPr lang="es-MX" dirty="0" smtClean="0"/>
+              <a:t>Técnico</a:t>
             </a:r>
             <a:r>
               <a:rPr lang="en-US" dirty="0" smtClean="0"/>
@@ -5803,6 +6118,10 @@
             <a:r>
               <a:rPr lang="en-US" dirty="0" err="1" smtClean="0"/>
               <a:t>soporte</a:t>
+            </a:r>
+            <a:r>
+              <a:rPr lang="en-US" dirty="0" smtClean="0"/>
+              <a:t>.</a:t>
             </a:r>
             <a:endParaRPr lang="en-US" dirty="0" smtClean="0"/>
           </a:p>
@@ -5823,16 +6142,8 @@
               <a:t>Mayra Tejeda      – </a:t>
             </a:r>
             <a:r>
-              <a:rPr lang="en-US" dirty="0" err="1" smtClean="0"/>
-              <a:t>Auditora</a:t>
-            </a:r>
-            <a:r>
               <a:rPr lang="en-US" dirty="0" smtClean="0"/>
-              <a:t> de </a:t>
-            </a:r>
-            <a:r>
-              <a:rPr lang="en-US" dirty="0" err="1" smtClean="0"/>
-              <a:t>procesos</a:t>
+              <a:t>Auditor.</a:t>
             </a:r>
             <a:endParaRPr lang="en-US" dirty="0" smtClean="0"/>
           </a:p>
@@ -5853,8 +6164,24 @@
               <a:t>Jovanny Zepeda – </a:t>
             </a:r>
             <a:r>
+              <a:rPr lang="es-MX" dirty="0"/>
+              <a:t>Técnico</a:t>
+            </a:r>
+            <a:r>
+              <a:rPr lang="en-US" dirty="0"/>
+              <a:t> de </a:t>
+            </a:r>
+            <a:r>
               <a:rPr lang="en-US" dirty="0" err="1" smtClean="0"/>
-              <a:t>Colaborador</a:t>
+              <a:t>sorporte</a:t>
+            </a:r>
+            <a:r>
+              <a:rPr lang="en-US" dirty="0" smtClean="0"/>
+              <a:t> y </a:t>
+            </a:r>
+            <a:r>
+              <a:rPr lang="es-MX" dirty="0" smtClean="0"/>
+              <a:t>coordinador</a:t>
             </a:r>
             <a:r>
               <a:rPr lang="en-US" dirty="0" smtClean="0"/>
@@ -5864,7 +6191,11 @@
               <a:rPr lang="en-US" dirty="0" err="1" smtClean="0"/>
               <a:t>soporte</a:t>
             </a:r>
-            <a:endParaRPr lang="en-US" dirty="0" smtClean="0"/>
+            <a:r>
+              <a:rPr lang="en-US" dirty="0" smtClean="0"/>
+              <a:t>.</a:t>
+            </a:r>
+            <a:endParaRPr lang="en-US" dirty="0"/>
           </a:p>
           <a:p>
             <a:pPr>
@@ -5874,16 +6205,6 @@
               <a:buFont typeface="Arial"/>
               <a:buChar char="•"/>
             </a:pPr>
-            <a:endParaRPr lang="en-US" dirty="0"/>
-          </a:p>
-          <a:p>
-            <a:pPr>
-              <a:lnSpc>
-                <a:spcPct val="100000"/>
-              </a:lnSpc>
-              <a:buFont typeface="Arial"/>
-              <a:buChar char="•"/>
-            </a:pPr>
             <a:r>
               <a:rPr lang="en-US" dirty="0" smtClean="0"/>
               <a:t> </a:t>
@@ -5961,7 +6282,7 @@
               <a:t> </a:t>
             </a:r>
             <a:r>
-              <a:rPr lang="en-US" dirty="0" err="1" smtClean="0"/>
+              <a:rPr lang="es-MX" dirty="0" smtClean="0"/>
               <a:t>es</a:t>
             </a:r>
             <a:r>
@@ -6143,7 +6464,7 @@
           <p:cNvPr id="6" name="1 Gráfico">
             <a:extLst>
               <a:ext uri="{FF2B5EF4-FFF2-40B4-BE49-F238E27FC236}">
-                <a16:creationId xmlns:lc="http://schemas.openxmlformats.org/drawingml/2006/lockedCanvas" xmlns="" xmlns:a16="http://schemas.microsoft.com/office/drawing/2014/main" xmlns:xdr="http://schemas.openxmlformats.org/drawingml/2006/spreadsheetDrawing" id="{00000000-0008-0000-0200-000002000000}"/>
+                <a16:creationId xmlns:xdr="http://schemas.openxmlformats.org/drawingml/2006/spreadsheetDrawing" xmlns:a16="http://schemas.microsoft.com/office/drawing/2014/main" xmlns="" xmlns:lc="http://schemas.openxmlformats.org/drawingml/2006/lockedCanvas" id="{00000000-0008-0000-0200-000002000000}"/>
               </a:ext>
             </a:extLst>
           </p:cNvPr>
@@ -6165,6 +6486,36 @@
         <a:graphic>
           <a:graphicData uri="http://schemas.openxmlformats.org/drawingml/2006/chart">
             <c:chart xmlns:c="http://schemas.openxmlformats.org/drawingml/2006/chart" xmlns:r="http://schemas.openxmlformats.org/officeDocument/2006/relationships" r:id="rId2"/>
+          </a:graphicData>
+        </a:graphic>
+      </p:graphicFrame>
+      <p:graphicFrame>
+        <p:nvGraphicFramePr>
+          <p:cNvPr id="7" name="2 Gráfico">
+            <a:extLst>
+              <a:ext uri="{FF2B5EF4-FFF2-40B4-BE49-F238E27FC236}">
+                <a16:creationId xmlns:xdr="http://schemas.openxmlformats.org/drawingml/2006/spreadsheetDrawing" xmlns="" xmlns:a16="http://schemas.microsoft.com/office/drawing/2014/main" xmlns:lc="http://schemas.openxmlformats.org/drawingml/2006/lockedCanvas" id="{00000000-0008-0000-0200-000003000000}"/>
+              </a:ext>
+            </a:extLst>
+          </p:cNvPr>
+          <p:cNvGraphicFramePr>
+            <a:graphicFrameLocks/>
+          </p:cNvGraphicFramePr>
+          <p:nvPr>
+            <p:extLst>
+              <p:ext uri="{D42A27DB-BD31-4B8C-83A1-F6EECF244321}">
+                <p14:modId xmlns:p14="http://schemas.microsoft.com/office/powerpoint/2010/main" val="3125865712"/>
+              </p:ext>
+            </p:extLst>
+          </p:nvPr>
+        </p:nvGraphicFramePr>
+        <p:xfrm>
+          <a:off x="457200" y="3717032"/>
+          <a:ext cx="4565650" cy="2800350"/>
+        </p:xfrm>
+        <a:graphic>
+          <a:graphicData uri="http://schemas.openxmlformats.org/drawingml/2006/chart">
+            <c:chart xmlns:c="http://schemas.openxmlformats.org/drawingml/2006/chart" xmlns:r="http://schemas.openxmlformats.org/officeDocument/2006/relationships" r:id="rId3"/>
           </a:graphicData>
         </a:graphic>
       </p:graphicFrame>
@@ -6299,8 +6650,8 @@
         </p:nvSpPr>
         <p:spPr>
           <a:xfrm>
-            <a:off x="5292080" y="1416240"/>
-            <a:ext cx="3393280" cy="923330"/>
+            <a:off x="683568" y="1416240"/>
+            <a:ext cx="8001792" cy="369332"/>
           </a:xfrm>
           <a:prstGeom prst="rect">
             <a:avLst/>
@@ -6323,946 +6674,61 @@
       </p:sp>
       <p:graphicFrame>
         <p:nvGraphicFramePr>
-          <p:cNvPr id="3" name="Tabla 2"/>
+          <p:cNvPr id="6" name="2 Gráfico">
+            <a:extLst>
+              <a:ext uri="{FF2B5EF4-FFF2-40B4-BE49-F238E27FC236}">
+                <a16:creationId xmlns:xdr="http://schemas.openxmlformats.org/drawingml/2006/spreadsheetDrawing" xmlns="" xmlns:a16="http://schemas.microsoft.com/office/drawing/2014/main" xmlns:lc="http://schemas.openxmlformats.org/drawingml/2006/lockedCanvas" id="{00000000-0008-0000-0100-000003000000}"/>
+              </a:ext>
+            </a:extLst>
+          </p:cNvPr>
           <p:cNvGraphicFramePr>
-            <a:graphicFrameLocks noGrp="1"/>
+            <a:graphicFrameLocks/>
           </p:cNvGraphicFramePr>
           <p:nvPr>
             <p:extLst>
               <p:ext uri="{D42A27DB-BD31-4B8C-83A1-F6EECF244321}">
-                <p14:modId xmlns:p14="http://schemas.microsoft.com/office/powerpoint/2010/main" val="720612802"/>
+                <p14:modId xmlns:p14="http://schemas.microsoft.com/office/powerpoint/2010/main" val="1665211760"/>
               </p:ext>
             </p:extLst>
           </p:nvPr>
         </p:nvGraphicFramePr>
         <p:xfrm>
-          <a:off x="2058988" y="2481263"/>
-          <a:ext cx="5825379" cy="2747939"/>
+          <a:off x="683568" y="1600200"/>
+          <a:ext cx="7848872" cy="2745317"/>
         </p:xfrm>
         <a:graphic>
-          <a:graphicData uri="http://schemas.openxmlformats.org/drawingml/2006/table">
-            <a:tbl>
-              <a:tblPr>
-                <a:tableStyleId>{5C22544A-7EE6-4342-B048-85BDC9FD1C3A}</a:tableStyleId>
-              </a:tblPr>
-              <a:tblGrid>
-                <a:gridCol w="2659253"/>
-                <a:gridCol w="782349"/>
-                <a:gridCol w="749292"/>
-                <a:gridCol w="782349"/>
-                <a:gridCol w="852136"/>
-              </a:tblGrid>
-              <a:tr h="367312">
-                <a:tc>
-                  <a:txBody>
-                    <a:bodyPr/>
-                    <a:lstStyle/>
-                    <a:p>
-                      <a:pPr algn="ctr" fontAlgn="ctr"/>
-                      <a:r>
-                        <a:rPr lang="es-MX" sz="1600" u="none" strike="noStrike" dirty="0">
-                          <a:effectLst/>
-                        </a:rPr>
-                        <a:t>Febrero</a:t>
-                      </a:r>
-                      <a:endParaRPr lang="es-MX" sz="1600" b="1" i="0" u="none" strike="noStrike" dirty="0">
-                        <a:solidFill>
-                          <a:srgbClr val="000000"/>
-                        </a:solidFill>
-                        <a:effectLst/>
-                        <a:latin typeface="Calibri" panose="020F0502020204030204" pitchFamily="34" charset="0"/>
-                      </a:endParaRPr>
-                    </a:p>
-                  </a:txBody>
-                  <a:tcPr marL="9525" marR="9525" marT="9525" marB="0" anchor="ctr"/>
-                </a:tc>
-                <a:tc>
-                  <a:txBody>
-                    <a:bodyPr/>
-                    <a:lstStyle/>
-                    <a:p>
-                      <a:pPr algn="l" fontAlgn="b"/>
-                      <a:r>
-                        <a:rPr lang="es-MX" sz="1100" u="none" strike="noStrike" dirty="0">
-                          <a:effectLst/>
-                        </a:rPr>
-                        <a:t> </a:t>
-                      </a:r>
-                      <a:endParaRPr lang="es-MX" sz="1100" b="0" i="0" u="none" strike="noStrike" dirty="0">
-                        <a:solidFill>
-                          <a:srgbClr val="000000"/>
-                        </a:solidFill>
-                        <a:effectLst/>
-                        <a:latin typeface="Calibri" panose="020F0502020204030204" pitchFamily="34" charset="0"/>
-                      </a:endParaRPr>
-                    </a:p>
-                  </a:txBody>
-                  <a:tcPr marL="9525" marR="9525" marT="9525" marB="0" anchor="b"/>
-                </a:tc>
-                <a:tc>
-                  <a:txBody>
-                    <a:bodyPr/>
-                    <a:lstStyle/>
-                    <a:p>
-                      <a:pPr algn="l" fontAlgn="b"/>
-                      <a:r>
-                        <a:rPr lang="es-MX" sz="1100" u="none" strike="noStrike">
-                          <a:effectLst/>
-                        </a:rPr>
-                        <a:t>Planeado</a:t>
-                      </a:r>
-                      <a:endParaRPr lang="es-MX" sz="1100" b="0" i="0" u="none" strike="noStrike">
-                        <a:solidFill>
-                          <a:srgbClr val="000000"/>
-                        </a:solidFill>
-                        <a:effectLst/>
-                        <a:latin typeface="Calibri" panose="020F0502020204030204" pitchFamily="34" charset="0"/>
-                      </a:endParaRPr>
-                    </a:p>
-                  </a:txBody>
-                  <a:tcPr marL="9525" marR="9525" marT="9525" marB="0" anchor="b"/>
-                </a:tc>
-                <a:tc>
-                  <a:txBody>
-                    <a:bodyPr/>
-                    <a:lstStyle/>
-                    <a:p>
-                      <a:pPr algn="l" fontAlgn="b"/>
-                      <a:r>
-                        <a:rPr lang="es-MX" sz="1100" u="none" strike="noStrike">
-                          <a:effectLst/>
-                        </a:rPr>
-                        <a:t>Real </a:t>
-                      </a:r>
-                      <a:endParaRPr lang="es-MX" sz="1100" b="0" i="0" u="none" strike="noStrike">
-                        <a:solidFill>
-                          <a:srgbClr val="000000"/>
-                        </a:solidFill>
-                        <a:effectLst/>
-                        <a:latin typeface="Calibri" panose="020F0502020204030204" pitchFamily="34" charset="0"/>
-                      </a:endParaRPr>
-                    </a:p>
-                  </a:txBody>
-                  <a:tcPr marL="9525" marR="9525" marT="9525" marB="0" anchor="b"/>
-                </a:tc>
-                <a:tc>
-                  <a:txBody>
-                    <a:bodyPr/>
-                    <a:lstStyle/>
-                    <a:p>
-                      <a:pPr algn="l" fontAlgn="b"/>
-                      <a:r>
-                        <a:rPr lang="es-MX" sz="1100" u="none" strike="noStrike">
-                          <a:effectLst/>
-                        </a:rPr>
-                        <a:t>Desviación</a:t>
-                      </a:r>
-                      <a:endParaRPr lang="es-MX" sz="1100" b="0" i="0" u="none" strike="noStrike">
-                        <a:solidFill>
-                          <a:srgbClr val="000000"/>
-                        </a:solidFill>
-                        <a:effectLst/>
-                        <a:latin typeface="Calibri" panose="020F0502020204030204" pitchFamily="34" charset="0"/>
-                      </a:endParaRPr>
-                    </a:p>
-                  </a:txBody>
-                  <a:tcPr marL="9525" marR="9525" marT="9525" marB="0" anchor="b"/>
-                </a:tc>
-              </a:tr>
-              <a:tr h="499876">
-                <a:tc rowSpan="2">
-                  <a:txBody>
-                    <a:bodyPr/>
-                    <a:lstStyle/>
-                    <a:p>
-                      <a:pPr algn="ctr" fontAlgn="ctr"/>
-                      <a:r>
-                        <a:rPr lang="es-MX" sz="1100" u="none" strike="noStrike">
-                          <a:effectLst/>
-                        </a:rPr>
-                        <a:t>Entrega de Servicio</a:t>
-                      </a:r>
-                      <a:endParaRPr lang="es-MX" sz="1100" b="0" i="0" u="none" strike="noStrike">
-                        <a:solidFill>
-                          <a:srgbClr val="000000"/>
-                        </a:solidFill>
-                        <a:effectLst/>
-                        <a:latin typeface="Calibri" panose="020F0502020204030204" pitchFamily="34" charset="0"/>
-                      </a:endParaRPr>
-                    </a:p>
-                  </a:txBody>
-                  <a:tcPr marL="9525" marR="9525" marT="9525" marB="0" anchor="ctr"/>
-                </a:tc>
-                <a:tc>
-                  <a:txBody>
-                    <a:bodyPr/>
-                    <a:lstStyle/>
-                    <a:p>
-                      <a:pPr algn="l" fontAlgn="b"/>
-                      <a:r>
-                        <a:rPr lang="es-MX" sz="1100" u="none" strike="noStrike">
-                          <a:effectLst/>
-                        </a:rPr>
-                        <a:t>Preventivo</a:t>
-                      </a:r>
-                      <a:endParaRPr lang="es-MX" sz="1100" b="0" i="0" u="none" strike="noStrike">
-                        <a:solidFill>
-                          <a:srgbClr val="000000"/>
-                        </a:solidFill>
-                        <a:effectLst/>
-                        <a:latin typeface="Calibri" panose="020F0502020204030204" pitchFamily="34" charset="0"/>
-                      </a:endParaRPr>
-                    </a:p>
-                  </a:txBody>
-                  <a:tcPr marL="9525" marR="9525" marT="9525" marB="0" anchor="b"/>
-                </a:tc>
-                <a:tc>
-                  <a:txBody>
-                    <a:bodyPr/>
-                    <a:lstStyle/>
-                    <a:p>
-                      <a:pPr algn="ctr" fontAlgn="b"/>
-                      <a:r>
-                        <a:rPr lang="es-MX" sz="1100" u="none" strike="noStrike">
-                          <a:effectLst/>
-                        </a:rPr>
-                        <a:t>140</a:t>
-                      </a:r>
-                      <a:endParaRPr lang="es-MX" sz="1100" b="0" i="0" u="none" strike="noStrike">
-                        <a:solidFill>
-                          <a:srgbClr val="000000"/>
-                        </a:solidFill>
-                        <a:effectLst/>
-                        <a:latin typeface="Calibri" panose="020F0502020204030204" pitchFamily="34" charset="0"/>
-                      </a:endParaRPr>
-                    </a:p>
-                  </a:txBody>
-                  <a:tcPr marL="9525" marR="9525" marT="9525" marB="0" anchor="b"/>
-                </a:tc>
-                <a:tc>
-                  <a:txBody>
-                    <a:bodyPr/>
-                    <a:lstStyle/>
-                    <a:p>
-                      <a:pPr algn="ctr" fontAlgn="b"/>
-                      <a:r>
-                        <a:rPr lang="es-MX" sz="1100" u="none" strike="noStrike">
-                          <a:effectLst/>
-                        </a:rPr>
-                        <a:t>0</a:t>
-                      </a:r>
-                      <a:endParaRPr lang="es-MX" sz="1100" b="0" i="0" u="none" strike="noStrike">
-                        <a:solidFill>
-                          <a:srgbClr val="000000"/>
-                        </a:solidFill>
-                        <a:effectLst/>
-                        <a:latin typeface="Calibri" panose="020F0502020204030204" pitchFamily="34" charset="0"/>
-                      </a:endParaRPr>
-                    </a:p>
-                  </a:txBody>
-                  <a:tcPr marL="9525" marR="9525" marT="9525" marB="0" anchor="b"/>
-                </a:tc>
-                <a:tc>
-                  <a:txBody>
-                    <a:bodyPr/>
-                    <a:lstStyle/>
-                    <a:p>
-                      <a:pPr algn="r" fontAlgn="b"/>
-                      <a:r>
-                        <a:rPr lang="es-MX" sz="1100" u="none" strike="noStrike">
-                          <a:effectLst/>
-                        </a:rPr>
-                        <a:t>100%</a:t>
-                      </a:r>
-                      <a:endParaRPr lang="es-MX" sz="1100" b="0" i="0" u="none" strike="noStrike">
-                        <a:solidFill>
-                          <a:srgbClr val="000000"/>
-                        </a:solidFill>
-                        <a:effectLst/>
-                        <a:latin typeface="Calibri" panose="020F0502020204030204" pitchFamily="34" charset="0"/>
-                      </a:endParaRPr>
-                    </a:p>
-                  </a:txBody>
-                  <a:tcPr marL="9525" marR="9525" marT="9525" marB="0" anchor="b"/>
-                </a:tc>
-              </a:tr>
-              <a:tr h="276175">
-                <a:tc vMerge="1">
-                  <a:txBody>
-                    <a:bodyPr/>
-                    <a:lstStyle/>
-                    <a:p>
-                      <a:endParaRPr lang="es-MX"/>
-                    </a:p>
-                  </a:txBody>
-                  <a:tcPr/>
-                </a:tc>
-                <a:tc>
-                  <a:txBody>
-                    <a:bodyPr/>
-                    <a:lstStyle/>
-                    <a:p>
-                      <a:pPr algn="l" fontAlgn="b"/>
-                      <a:r>
-                        <a:rPr lang="es-MX" sz="1100" u="none" strike="noStrike">
-                          <a:effectLst/>
-                        </a:rPr>
-                        <a:t>Correctivo</a:t>
-                      </a:r>
-                      <a:endParaRPr lang="es-MX" sz="1100" b="0" i="0" u="none" strike="noStrike">
-                        <a:solidFill>
-                          <a:srgbClr val="000000"/>
-                        </a:solidFill>
-                        <a:effectLst/>
-                        <a:latin typeface="Calibri" panose="020F0502020204030204" pitchFamily="34" charset="0"/>
-                      </a:endParaRPr>
-                    </a:p>
-                  </a:txBody>
-                  <a:tcPr marL="9525" marR="9525" marT="9525" marB="0" anchor="b"/>
-                </a:tc>
-                <a:tc>
-                  <a:txBody>
-                    <a:bodyPr/>
-                    <a:lstStyle/>
-                    <a:p>
-                      <a:pPr algn="ctr" fontAlgn="b"/>
-                      <a:r>
-                        <a:rPr lang="es-MX" sz="1100" u="none" strike="noStrike">
-                          <a:effectLst/>
-                        </a:rPr>
-                        <a:t>140</a:t>
-                      </a:r>
-                      <a:endParaRPr lang="es-MX" sz="1100" b="0" i="0" u="none" strike="noStrike">
-                        <a:solidFill>
-                          <a:srgbClr val="000000"/>
-                        </a:solidFill>
-                        <a:effectLst/>
-                        <a:latin typeface="Calibri" panose="020F0502020204030204" pitchFamily="34" charset="0"/>
-                      </a:endParaRPr>
-                    </a:p>
-                  </a:txBody>
-                  <a:tcPr marL="9525" marR="9525" marT="9525" marB="0" anchor="b"/>
-                </a:tc>
-                <a:tc>
-                  <a:txBody>
-                    <a:bodyPr/>
-                    <a:lstStyle/>
-                    <a:p>
-                      <a:pPr algn="ctr" fontAlgn="b"/>
-                      <a:r>
-                        <a:rPr lang="es-MX" sz="1100" u="none" strike="noStrike">
-                          <a:effectLst/>
-                        </a:rPr>
-                        <a:t>0</a:t>
-                      </a:r>
-                      <a:endParaRPr lang="es-MX" sz="1100" b="0" i="0" u="none" strike="noStrike">
-                        <a:solidFill>
-                          <a:srgbClr val="000000"/>
-                        </a:solidFill>
-                        <a:effectLst/>
-                        <a:latin typeface="Calibri" panose="020F0502020204030204" pitchFamily="34" charset="0"/>
-                      </a:endParaRPr>
-                    </a:p>
-                  </a:txBody>
-                  <a:tcPr marL="9525" marR="9525" marT="9525" marB="0" anchor="b"/>
-                </a:tc>
-                <a:tc>
-                  <a:txBody>
-                    <a:bodyPr/>
-                    <a:lstStyle/>
-                    <a:p>
-                      <a:pPr algn="r" fontAlgn="b"/>
-                      <a:r>
-                        <a:rPr lang="es-MX" sz="1100" u="none" strike="noStrike">
-                          <a:effectLst/>
-                        </a:rPr>
-                        <a:t>100%</a:t>
-                      </a:r>
-                      <a:endParaRPr lang="es-MX" sz="1100" b="0" i="0" u="none" strike="noStrike">
-                        <a:solidFill>
-                          <a:srgbClr val="000000"/>
-                        </a:solidFill>
-                        <a:effectLst/>
-                        <a:latin typeface="Calibri" panose="020F0502020204030204" pitchFamily="34" charset="0"/>
-                      </a:endParaRPr>
-                    </a:p>
-                  </a:txBody>
-                  <a:tcPr marL="9525" marR="9525" marT="9525" marB="0" anchor="b"/>
-                </a:tc>
-              </a:tr>
-              <a:tr h="499876">
-                <a:tc rowSpan="2">
-                  <a:txBody>
-                    <a:bodyPr/>
-                    <a:lstStyle/>
-                    <a:p>
-                      <a:pPr algn="ctr" fontAlgn="ctr"/>
-                      <a:r>
-                        <a:rPr lang="es-MX" sz="1100" u="none" strike="noStrike">
-                          <a:effectLst/>
-                        </a:rPr>
-                        <a:t>Planeación</a:t>
-                      </a:r>
-                      <a:endParaRPr lang="es-MX" sz="1100" b="0" i="0" u="none" strike="noStrike">
-                        <a:solidFill>
-                          <a:srgbClr val="000000"/>
-                        </a:solidFill>
-                        <a:effectLst/>
-                        <a:latin typeface="Calibri" panose="020F0502020204030204" pitchFamily="34" charset="0"/>
-                      </a:endParaRPr>
-                    </a:p>
-                  </a:txBody>
-                  <a:tcPr marL="9525" marR="9525" marT="9525" marB="0" anchor="ctr"/>
-                </a:tc>
-                <a:tc>
-                  <a:txBody>
-                    <a:bodyPr/>
-                    <a:lstStyle/>
-                    <a:p>
-                      <a:pPr algn="l" fontAlgn="b"/>
-                      <a:r>
-                        <a:rPr lang="es-MX" sz="1100" u="none" strike="noStrike">
-                          <a:effectLst/>
-                        </a:rPr>
-                        <a:t>Preventivo</a:t>
-                      </a:r>
-                      <a:endParaRPr lang="es-MX" sz="1100" b="0" i="0" u="none" strike="noStrike">
-                        <a:solidFill>
-                          <a:srgbClr val="000000"/>
-                        </a:solidFill>
-                        <a:effectLst/>
-                        <a:latin typeface="Calibri" panose="020F0502020204030204" pitchFamily="34" charset="0"/>
-                      </a:endParaRPr>
-                    </a:p>
-                  </a:txBody>
-                  <a:tcPr marL="9525" marR="9525" marT="9525" marB="0" anchor="b"/>
-                </a:tc>
-                <a:tc>
-                  <a:txBody>
-                    <a:bodyPr/>
-                    <a:lstStyle/>
-                    <a:p>
-                      <a:pPr algn="ctr" fontAlgn="b"/>
-                      <a:r>
-                        <a:rPr lang="es-MX" sz="1100" u="none" strike="noStrike">
-                          <a:effectLst/>
-                        </a:rPr>
-                        <a:t>45,6</a:t>
-                      </a:r>
-                      <a:endParaRPr lang="es-MX" sz="1100" b="0" i="0" u="none" strike="noStrike">
-                        <a:solidFill>
-                          <a:srgbClr val="000000"/>
-                        </a:solidFill>
-                        <a:effectLst/>
-                        <a:latin typeface="Calibri" panose="020F0502020204030204" pitchFamily="34" charset="0"/>
-                      </a:endParaRPr>
-                    </a:p>
-                  </a:txBody>
-                  <a:tcPr marL="9525" marR="9525" marT="9525" marB="0" anchor="b"/>
-                </a:tc>
-                <a:tc>
-                  <a:txBody>
-                    <a:bodyPr/>
-                    <a:lstStyle/>
-                    <a:p>
-                      <a:pPr algn="ctr" fontAlgn="b"/>
-                      <a:r>
-                        <a:rPr lang="es-MX" sz="1100" u="none" strike="noStrike">
-                          <a:effectLst/>
-                        </a:rPr>
-                        <a:t>25</a:t>
-                      </a:r>
-                      <a:endParaRPr lang="es-MX" sz="1100" b="0" i="0" u="none" strike="noStrike">
-                        <a:solidFill>
-                          <a:srgbClr val="000000"/>
-                        </a:solidFill>
-                        <a:effectLst/>
-                        <a:latin typeface="Calibri" panose="020F0502020204030204" pitchFamily="34" charset="0"/>
-                      </a:endParaRPr>
-                    </a:p>
-                  </a:txBody>
-                  <a:tcPr marL="9525" marR="9525" marT="9525" marB="0" anchor="b"/>
-                </a:tc>
-                <a:tc>
-                  <a:txBody>
-                    <a:bodyPr/>
-                    <a:lstStyle/>
-                    <a:p>
-                      <a:pPr algn="r" fontAlgn="b"/>
-                      <a:r>
-                        <a:rPr lang="es-MX" sz="1100" u="none" strike="noStrike">
-                          <a:effectLst/>
-                        </a:rPr>
-                        <a:t>45%</a:t>
-                      </a:r>
-                      <a:endParaRPr lang="es-MX" sz="1100" b="0" i="0" u="none" strike="noStrike">
-                        <a:solidFill>
-                          <a:srgbClr val="000000"/>
-                        </a:solidFill>
-                        <a:effectLst/>
-                        <a:latin typeface="Calibri" panose="020F0502020204030204" pitchFamily="34" charset="0"/>
-                      </a:endParaRPr>
-                    </a:p>
-                  </a:txBody>
-                  <a:tcPr marL="9525" marR="9525" marT="9525" marB="0" anchor="b"/>
-                </a:tc>
-              </a:tr>
-              <a:tr h="276175">
-                <a:tc vMerge="1">
-                  <a:txBody>
-                    <a:bodyPr/>
-                    <a:lstStyle/>
-                    <a:p>
-                      <a:endParaRPr lang="es-MX"/>
-                    </a:p>
-                  </a:txBody>
-                  <a:tcPr/>
-                </a:tc>
-                <a:tc>
-                  <a:txBody>
-                    <a:bodyPr/>
-                    <a:lstStyle/>
-                    <a:p>
-                      <a:pPr algn="l" fontAlgn="b"/>
-                      <a:r>
-                        <a:rPr lang="es-MX" sz="1100" u="none" strike="noStrike">
-                          <a:effectLst/>
-                        </a:rPr>
-                        <a:t>Correctivo</a:t>
-                      </a:r>
-                      <a:endParaRPr lang="es-MX" sz="1100" b="0" i="0" u="none" strike="noStrike">
-                        <a:solidFill>
-                          <a:srgbClr val="000000"/>
-                        </a:solidFill>
-                        <a:effectLst/>
-                        <a:latin typeface="Calibri" panose="020F0502020204030204" pitchFamily="34" charset="0"/>
-                      </a:endParaRPr>
-                    </a:p>
-                  </a:txBody>
-                  <a:tcPr marL="9525" marR="9525" marT="9525" marB="0" anchor="b"/>
-                </a:tc>
-                <a:tc>
-                  <a:txBody>
-                    <a:bodyPr/>
-                    <a:lstStyle/>
-                    <a:p>
-                      <a:pPr algn="ctr" fontAlgn="b"/>
-                      <a:r>
-                        <a:rPr lang="es-MX" sz="1100" u="none" strike="noStrike">
-                          <a:effectLst/>
-                        </a:rPr>
-                        <a:t>91,2</a:t>
-                      </a:r>
-                      <a:endParaRPr lang="es-MX" sz="1100" b="0" i="0" u="none" strike="noStrike">
-                        <a:solidFill>
-                          <a:srgbClr val="000000"/>
-                        </a:solidFill>
-                        <a:effectLst/>
-                        <a:latin typeface="Calibri" panose="020F0502020204030204" pitchFamily="34" charset="0"/>
-                      </a:endParaRPr>
-                    </a:p>
-                  </a:txBody>
-                  <a:tcPr marL="9525" marR="9525" marT="9525" marB="0" anchor="b"/>
-                </a:tc>
-                <a:tc>
-                  <a:txBody>
-                    <a:bodyPr/>
-                    <a:lstStyle/>
-                    <a:p>
-                      <a:pPr algn="ctr" fontAlgn="b"/>
-                      <a:r>
-                        <a:rPr lang="es-MX" sz="1100" u="none" strike="noStrike">
-                          <a:effectLst/>
-                        </a:rPr>
-                        <a:t>80</a:t>
-                      </a:r>
-                      <a:endParaRPr lang="es-MX" sz="1100" b="0" i="0" u="none" strike="noStrike">
-                        <a:solidFill>
-                          <a:srgbClr val="000000"/>
-                        </a:solidFill>
-                        <a:effectLst/>
-                        <a:latin typeface="Calibri" panose="020F0502020204030204" pitchFamily="34" charset="0"/>
-                      </a:endParaRPr>
-                    </a:p>
-                  </a:txBody>
-                  <a:tcPr marL="9525" marR="9525" marT="9525" marB="0" anchor="b"/>
-                </a:tc>
-                <a:tc>
-                  <a:txBody>
-                    <a:bodyPr/>
-                    <a:lstStyle/>
-                    <a:p>
-                      <a:pPr algn="r" fontAlgn="b"/>
-                      <a:r>
-                        <a:rPr lang="es-MX" sz="1100" u="none" strike="noStrike">
-                          <a:effectLst/>
-                        </a:rPr>
-                        <a:t>12%</a:t>
-                      </a:r>
-                      <a:endParaRPr lang="es-MX" sz="1100" b="0" i="0" u="none" strike="noStrike">
-                        <a:solidFill>
-                          <a:srgbClr val="000000"/>
-                        </a:solidFill>
-                        <a:effectLst/>
-                        <a:latin typeface="Calibri" panose="020F0502020204030204" pitchFamily="34" charset="0"/>
-                      </a:endParaRPr>
-                    </a:p>
-                  </a:txBody>
-                  <a:tcPr marL="9525" marR="9525" marT="9525" marB="0" anchor="b"/>
-                </a:tc>
-              </a:tr>
-              <a:tr h="276175">
-                <a:tc>
-                  <a:txBody>
-                    <a:bodyPr/>
-                    <a:lstStyle/>
-                    <a:p>
-                      <a:pPr algn="ctr" fontAlgn="b"/>
-                      <a:r>
-                        <a:rPr lang="es-MX" sz="1100" u="none" strike="noStrike">
-                          <a:effectLst/>
-                        </a:rPr>
-                        <a:t>Medicion-Monitoreo</a:t>
-                      </a:r>
-                      <a:endParaRPr lang="es-MX" sz="1100" b="0" i="0" u="none" strike="noStrike">
-                        <a:solidFill>
-                          <a:srgbClr val="000000"/>
-                        </a:solidFill>
-                        <a:effectLst/>
-                        <a:latin typeface="Calibri" panose="020F0502020204030204" pitchFamily="34" charset="0"/>
-                      </a:endParaRPr>
-                    </a:p>
-                  </a:txBody>
-                  <a:tcPr marL="9525" marR="9525" marT="9525" marB="0" anchor="b"/>
-                </a:tc>
-                <a:tc>
-                  <a:txBody>
-                    <a:bodyPr/>
-                    <a:lstStyle/>
-                    <a:p>
-                      <a:pPr algn="ctr" fontAlgn="b"/>
-                      <a:r>
-                        <a:rPr lang="es-MX" sz="1100" u="none" strike="noStrike">
-                          <a:effectLst/>
-                        </a:rPr>
-                        <a:t> </a:t>
-                      </a:r>
-                      <a:endParaRPr lang="es-MX" sz="1100" b="0" i="0" u="none" strike="noStrike">
-                        <a:solidFill>
-                          <a:srgbClr val="000000"/>
-                        </a:solidFill>
-                        <a:effectLst/>
-                        <a:latin typeface="Calibri" panose="020F0502020204030204" pitchFamily="34" charset="0"/>
-                      </a:endParaRPr>
-                    </a:p>
-                  </a:txBody>
-                  <a:tcPr marL="9525" marR="9525" marT="9525" marB="0" anchor="b"/>
-                </a:tc>
-                <a:tc>
-                  <a:txBody>
-                    <a:bodyPr/>
-                    <a:lstStyle/>
-                    <a:p>
-                      <a:pPr algn="ctr" fontAlgn="b"/>
-                      <a:r>
-                        <a:rPr lang="es-MX" sz="1100" u="none" strike="noStrike">
-                          <a:effectLst/>
-                        </a:rPr>
-                        <a:t>1</a:t>
-                      </a:r>
-                      <a:endParaRPr lang="es-MX" sz="1100" b="0" i="0" u="none" strike="noStrike">
-                        <a:solidFill>
-                          <a:srgbClr val="000000"/>
-                        </a:solidFill>
-                        <a:effectLst/>
-                        <a:latin typeface="Calibri" panose="020F0502020204030204" pitchFamily="34" charset="0"/>
-                      </a:endParaRPr>
-                    </a:p>
-                  </a:txBody>
-                  <a:tcPr marL="9525" marR="9525" marT="9525" marB="0" anchor="b"/>
-                </a:tc>
-                <a:tc>
-                  <a:txBody>
-                    <a:bodyPr/>
-                    <a:lstStyle/>
-                    <a:p>
-                      <a:pPr algn="ctr" fontAlgn="b"/>
-                      <a:r>
-                        <a:rPr lang="es-MX" sz="1100" u="none" strike="noStrike">
-                          <a:effectLst/>
-                        </a:rPr>
-                        <a:t>1</a:t>
-                      </a:r>
-                      <a:endParaRPr lang="es-MX" sz="1100" b="0" i="0" u="none" strike="noStrike">
-                        <a:solidFill>
-                          <a:srgbClr val="000000"/>
-                        </a:solidFill>
-                        <a:effectLst/>
-                        <a:latin typeface="Calibri" panose="020F0502020204030204" pitchFamily="34" charset="0"/>
-                      </a:endParaRPr>
-                    </a:p>
-                  </a:txBody>
-                  <a:tcPr marL="9525" marR="9525" marT="9525" marB="0" anchor="b"/>
-                </a:tc>
-                <a:tc>
-                  <a:txBody>
-                    <a:bodyPr/>
-                    <a:lstStyle/>
-                    <a:p>
-                      <a:pPr algn="r" fontAlgn="b"/>
-                      <a:r>
-                        <a:rPr lang="es-MX" sz="1100" u="none" strike="noStrike">
-                          <a:effectLst/>
-                        </a:rPr>
-                        <a:t>0%</a:t>
-                      </a:r>
-                      <a:endParaRPr lang="es-MX" sz="1100" b="0" i="0" u="none" strike="noStrike">
-                        <a:solidFill>
-                          <a:srgbClr val="000000"/>
-                        </a:solidFill>
-                        <a:effectLst/>
-                        <a:latin typeface="Calibri" panose="020F0502020204030204" pitchFamily="34" charset="0"/>
-                      </a:endParaRPr>
-                    </a:p>
-                  </a:txBody>
-                  <a:tcPr marL="9525" marR="9525" marT="9525" marB="0" anchor="b"/>
-                </a:tc>
-              </a:tr>
-              <a:tr h="276175">
-                <a:tc>
-                  <a:txBody>
-                    <a:bodyPr/>
-                    <a:lstStyle/>
-                    <a:p>
-                      <a:pPr algn="ctr" fontAlgn="b"/>
-                      <a:r>
-                        <a:rPr lang="es-MX" sz="1100" u="none" strike="noStrike">
-                          <a:effectLst/>
-                        </a:rPr>
-                        <a:t>Calidad</a:t>
-                      </a:r>
-                      <a:endParaRPr lang="es-MX" sz="1100" b="0" i="0" u="none" strike="noStrike">
-                        <a:solidFill>
-                          <a:srgbClr val="000000"/>
-                        </a:solidFill>
-                        <a:effectLst/>
-                        <a:latin typeface="Calibri" panose="020F0502020204030204" pitchFamily="34" charset="0"/>
-                      </a:endParaRPr>
-                    </a:p>
-                  </a:txBody>
-                  <a:tcPr marL="9525" marR="9525" marT="9525" marB="0" anchor="b"/>
-                </a:tc>
-                <a:tc>
-                  <a:txBody>
-                    <a:bodyPr/>
-                    <a:lstStyle/>
-                    <a:p>
-                      <a:pPr algn="ctr" fontAlgn="b"/>
-                      <a:r>
-                        <a:rPr lang="es-MX" sz="1100" u="none" strike="noStrike">
-                          <a:effectLst/>
-                        </a:rPr>
-                        <a:t> </a:t>
-                      </a:r>
-                      <a:endParaRPr lang="es-MX" sz="1100" b="0" i="0" u="none" strike="noStrike">
-                        <a:solidFill>
-                          <a:srgbClr val="000000"/>
-                        </a:solidFill>
-                        <a:effectLst/>
-                        <a:latin typeface="Calibri" panose="020F0502020204030204" pitchFamily="34" charset="0"/>
-                      </a:endParaRPr>
-                    </a:p>
-                  </a:txBody>
-                  <a:tcPr marL="9525" marR="9525" marT="9525" marB="0" anchor="b"/>
-                </a:tc>
-                <a:tc>
-                  <a:txBody>
-                    <a:bodyPr/>
-                    <a:lstStyle/>
-                    <a:p>
-                      <a:pPr algn="ctr" fontAlgn="b"/>
-                      <a:r>
-                        <a:rPr lang="es-MX" sz="1100" u="none" strike="noStrike">
-                          <a:effectLst/>
-                        </a:rPr>
-                        <a:t>2</a:t>
-                      </a:r>
-                      <a:endParaRPr lang="es-MX" sz="1100" b="0" i="0" u="none" strike="noStrike">
-                        <a:solidFill>
-                          <a:srgbClr val="000000"/>
-                        </a:solidFill>
-                        <a:effectLst/>
-                        <a:latin typeface="Calibri" panose="020F0502020204030204" pitchFamily="34" charset="0"/>
-                      </a:endParaRPr>
-                    </a:p>
-                  </a:txBody>
-                  <a:tcPr marL="9525" marR="9525" marT="9525" marB="0" anchor="b"/>
-                </a:tc>
-                <a:tc>
-                  <a:txBody>
-                    <a:bodyPr/>
-                    <a:lstStyle/>
-                    <a:p>
-                      <a:pPr algn="ctr" fontAlgn="b"/>
-                      <a:r>
-                        <a:rPr lang="es-MX" sz="1100" u="none" strike="noStrike">
-                          <a:effectLst/>
-                        </a:rPr>
-                        <a:t>2,4</a:t>
-                      </a:r>
-                      <a:endParaRPr lang="es-MX" sz="1100" b="0" i="0" u="none" strike="noStrike">
-                        <a:solidFill>
-                          <a:srgbClr val="000000"/>
-                        </a:solidFill>
-                        <a:effectLst/>
-                        <a:latin typeface="Calibri" panose="020F0502020204030204" pitchFamily="34" charset="0"/>
-                      </a:endParaRPr>
-                    </a:p>
-                  </a:txBody>
-                  <a:tcPr marL="9525" marR="9525" marT="9525" marB="0" anchor="b"/>
-                </a:tc>
-                <a:tc>
-                  <a:txBody>
-                    <a:bodyPr/>
-                    <a:lstStyle/>
-                    <a:p>
-                      <a:pPr algn="r" fontAlgn="b"/>
-                      <a:r>
-                        <a:rPr lang="es-MX" sz="1100" u="none" strike="noStrike">
-                          <a:effectLst/>
-                        </a:rPr>
-                        <a:t>-20%</a:t>
-                      </a:r>
-                      <a:endParaRPr lang="es-MX" sz="1100" b="0" i="0" u="none" strike="noStrike">
-                        <a:solidFill>
-                          <a:srgbClr val="000000"/>
-                        </a:solidFill>
-                        <a:effectLst/>
-                        <a:latin typeface="Calibri" panose="020F0502020204030204" pitchFamily="34" charset="0"/>
-                      </a:endParaRPr>
-                    </a:p>
-                  </a:txBody>
-                  <a:tcPr marL="9525" marR="9525" marT="9525" marB="0" anchor="b"/>
-                </a:tc>
-              </a:tr>
-              <a:tr h="276175">
-                <a:tc>
-                  <a:txBody>
-                    <a:bodyPr/>
-                    <a:lstStyle/>
-                    <a:p>
-                      <a:pPr algn="ctr" fontAlgn="b"/>
-                      <a:r>
-                        <a:rPr lang="es-MX" sz="1100" u="none" strike="noStrike">
-                          <a:effectLst/>
-                        </a:rPr>
-                        <a:t>Configuracion</a:t>
-                      </a:r>
-                      <a:endParaRPr lang="es-MX" sz="1100" b="0" i="0" u="none" strike="noStrike">
-                        <a:solidFill>
-                          <a:srgbClr val="000000"/>
-                        </a:solidFill>
-                        <a:effectLst/>
-                        <a:latin typeface="Calibri" panose="020F0502020204030204" pitchFamily="34" charset="0"/>
-                      </a:endParaRPr>
-                    </a:p>
-                  </a:txBody>
-                  <a:tcPr marL="9525" marR="9525" marT="9525" marB="0" anchor="b"/>
-                </a:tc>
-                <a:tc>
-                  <a:txBody>
-                    <a:bodyPr/>
-                    <a:lstStyle/>
-                    <a:p>
-                      <a:pPr algn="ctr" fontAlgn="b"/>
-                      <a:r>
-                        <a:rPr lang="es-MX" sz="1100" u="none" strike="noStrike">
-                          <a:effectLst/>
-                        </a:rPr>
-                        <a:t> </a:t>
-                      </a:r>
-                      <a:endParaRPr lang="es-MX" sz="1100" b="0" i="0" u="none" strike="noStrike">
-                        <a:solidFill>
-                          <a:srgbClr val="000000"/>
-                        </a:solidFill>
-                        <a:effectLst/>
-                        <a:latin typeface="Calibri" panose="020F0502020204030204" pitchFamily="34" charset="0"/>
-                      </a:endParaRPr>
-                    </a:p>
-                  </a:txBody>
-                  <a:tcPr marL="9525" marR="9525" marT="9525" marB="0" anchor="b"/>
-                </a:tc>
-                <a:tc>
-                  <a:txBody>
-                    <a:bodyPr/>
-                    <a:lstStyle/>
-                    <a:p>
-                      <a:pPr algn="ctr" fontAlgn="b"/>
-                      <a:r>
-                        <a:rPr lang="es-MX" sz="1100" u="none" strike="noStrike">
-                          <a:effectLst/>
-                        </a:rPr>
-                        <a:t>0,5</a:t>
-                      </a:r>
-                      <a:endParaRPr lang="es-MX" sz="1100" b="0" i="0" u="none" strike="noStrike">
-                        <a:solidFill>
-                          <a:srgbClr val="000000"/>
-                        </a:solidFill>
-                        <a:effectLst/>
-                        <a:latin typeface="Calibri" panose="020F0502020204030204" pitchFamily="34" charset="0"/>
-                      </a:endParaRPr>
-                    </a:p>
-                  </a:txBody>
-                  <a:tcPr marL="9525" marR="9525" marT="9525" marB="0" anchor="b"/>
-                </a:tc>
-                <a:tc>
-                  <a:txBody>
-                    <a:bodyPr/>
-                    <a:lstStyle/>
-                    <a:p>
-                      <a:pPr algn="ctr" fontAlgn="b"/>
-                      <a:r>
-                        <a:rPr lang="es-MX" sz="1100" u="none" strike="noStrike">
-                          <a:effectLst/>
-                        </a:rPr>
-                        <a:t>0,17</a:t>
-                      </a:r>
-                      <a:endParaRPr lang="es-MX" sz="1100" b="0" i="0" u="none" strike="noStrike">
-                        <a:solidFill>
-                          <a:srgbClr val="000000"/>
-                        </a:solidFill>
-                        <a:effectLst/>
-                        <a:latin typeface="Calibri" panose="020F0502020204030204" pitchFamily="34" charset="0"/>
-                      </a:endParaRPr>
-                    </a:p>
-                  </a:txBody>
-                  <a:tcPr marL="9525" marR="9525" marT="9525" marB="0" anchor="b"/>
-                </a:tc>
-                <a:tc>
-                  <a:txBody>
-                    <a:bodyPr/>
-                    <a:lstStyle/>
-                    <a:p>
-                      <a:pPr algn="r" fontAlgn="b"/>
-                      <a:r>
-                        <a:rPr lang="es-MX" sz="1100" u="none" strike="noStrike" dirty="0">
-                          <a:effectLst/>
-                        </a:rPr>
-                        <a:t>66%</a:t>
-                      </a:r>
-                      <a:endParaRPr lang="es-MX" sz="1100" b="0" i="0" u="none" strike="noStrike" dirty="0">
-                        <a:solidFill>
-                          <a:srgbClr val="000000"/>
-                        </a:solidFill>
-                        <a:effectLst/>
-                        <a:latin typeface="Calibri" panose="020F0502020204030204" pitchFamily="34" charset="0"/>
-                      </a:endParaRPr>
-                    </a:p>
-                  </a:txBody>
-                  <a:tcPr marL="9525" marR="9525" marT="9525" marB="0" anchor="b"/>
-                </a:tc>
-              </a:tr>
-            </a:tbl>
+          <a:graphicData uri="http://schemas.openxmlformats.org/drawingml/2006/chart">
+            <c:chart xmlns:c="http://schemas.openxmlformats.org/drawingml/2006/chart" xmlns:r="http://schemas.openxmlformats.org/officeDocument/2006/relationships" r:id="rId2"/>
+          </a:graphicData>
+        </a:graphic>
+      </p:graphicFrame>
+      <p:graphicFrame>
+        <p:nvGraphicFramePr>
+          <p:cNvPr id="7" name="4 Gráfico">
+            <a:extLst>
+              <a:ext uri="{FF2B5EF4-FFF2-40B4-BE49-F238E27FC236}">
+                <a16:creationId xmlns:xdr="http://schemas.openxmlformats.org/drawingml/2006/spreadsheetDrawing" xmlns="" xmlns:a16="http://schemas.microsoft.com/office/drawing/2014/main" xmlns:lc="http://schemas.openxmlformats.org/drawingml/2006/lockedCanvas" id="{00000000-0008-0000-0100-000005000000}"/>
+              </a:ext>
+            </a:extLst>
+          </p:cNvPr>
+          <p:cNvGraphicFramePr>
+            <a:graphicFrameLocks/>
+          </p:cNvGraphicFramePr>
+          <p:nvPr>
+            <p:extLst>
+              <p:ext uri="{D42A27DB-BD31-4B8C-83A1-F6EECF244321}">
+                <p14:modId xmlns:p14="http://schemas.microsoft.com/office/powerpoint/2010/main" val="2566341572"/>
+              </p:ext>
+            </p:extLst>
+          </p:nvPr>
+        </p:nvGraphicFramePr>
+        <p:xfrm>
+          <a:off x="899592" y="4509120"/>
+          <a:ext cx="7488832" cy="2339036"/>
+        </p:xfrm>
+        <a:graphic>
+          <a:graphicData uri="http://schemas.openxmlformats.org/drawingml/2006/chart">
+            <c:chart xmlns:c="http://schemas.openxmlformats.org/drawingml/2006/chart" xmlns:r="http://schemas.openxmlformats.org/officeDocument/2006/relationships" r:id="rId3"/>
           </a:graphicData>
         </a:graphic>
       </p:graphicFrame>
@@ -7394,7 +6860,7 @@
           <p:cNvPr id="4" name="1 Gráfico">
             <a:extLst>
               <a:ext uri="{FF2B5EF4-FFF2-40B4-BE49-F238E27FC236}">
-                <a16:creationId xmlns:lc="http://schemas.openxmlformats.org/drawingml/2006/lockedCanvas" xmlns:a16="http://schemas.microsoft.com/office/drawing/2014/main" xmlns="" xmlns:xdr="http://schemas.openxmlformats.org/drawingml/2006/spreadsheetDrawing" id="{00000000-0008-0000-0500-000002000000}"/>
+                <a16:creationId xmlns:xdr="http://schemas.openxmlformats.org/drawingml/2006/spreadsheetDrawing" xmlns="" xmlns:a16="http://schemas.microsoft.com/office/drawing/2014/main" xmlns:lc="http://schemas.openxmlformats.org/drawingml/2006/lockedCanvas" id="{00000000-0008-0000-0500-000002000000}"/>
               </a:ext>
             </a:extLst>
           </p:cNvPr>
@@ -7577,7 +7043,7 @@
           <p:cNvPr id="4" name="1 Gráfico">
             <a:extLst>
               <a:ext uri="{FF2B5EF4-FFF2-40B4-BE49-F238E27FC236}">
-                <a16:creationId xmlns:lc="http://schemas.openxmlformats.org/drawingml/2006/lockedCanvas" xmlns:a16="http://schemas.microsoft.com/office/drawing/2014/main" xmlns="" xmlns:xdr="http://schemas.openxmlformats.org/drawingml/2006/spreadsheetDrawing" id="{00000000-0008-0000-0600-000002000000}"/>
+                <a16:creationId xmlns:xdr="http://schemas.openxmlformats.org/drawingml/2006/spreadsheetDrawing" xmlns="" xmlns:a16="http://schemas.microsoft.com/office/drawing/2014/main" xmlns:lc="http://schemas.openxmlformats.org/drawingml/2006/lockedCanvas" id="{00000000-0008-0000-0600-000002000000}"/>
               </a:ext>
             </a:extLst>
           </p:cNvPr>
@@ -7755,50 +7221,12 @@
           </a:p>
         </p:txBody>
       </p:sp>
-      <p:sp>
-        <p:nvSpPr>
-          <p:cNvPr id="2" name="CuadroTexto 1"/>
-          <p:cNvSpPr txBox="1"/>
-          <p:nvPr/>
-        </p:nvSpPr>
-        <p:spPr>
-          <a:xfrm>
-            <a:off x="1115616" y="4077072"/>
-            <a:ext cx="7056784" cy="646331"/>
-          </a:xfrm>
-          <a:prstGeom prst="rect">
-            <a:avLst/>
-          </a:prstGeom>
-          <a:noFill/>
-        </p:spPr>
-        <p:txBody>
-          <a:bodyPr wrap="square" rtlCol="0">
-            <a:spAutoFit/>
-          </a:bodyPr>
-          <a:lstStyle/>
-          <a:p>
-            <a:r>
-              <a:rPr lang="es-MX" dirty="0" smtClean="0"/>
-              <a:t>Actualmente no se han generado </a:t>
-            </a:r>
-            <a:r>
-              <a:rPr lang="es-MX" dirty="0" err="1" smtClean="0"/>
-              <a:t>evaluaciónes</a:t>
-            </a:r>
-            <a:r>
-              <a:rPr lang="es-MX" dirty="0" smtClean="0"/>
-              <a:t> sobre métricas , plan de configuración y plan de auditorias</a:t>
-            </a:r>
-            <a:endParaRPr lang="es-MX" dirty="0"/>
-          </a:p>
-        </p:txBody>
-      </p:sp>
       <p:graphicFrame>
         <p:nvGraphicFramePr>
           <p:cNvPr id="8" name="1 Gráfico">
             <a:extLst>
               <a:ext uri="{FF2B5EF4-FFF2-40B4-BE49-F238E27FC236}">
-                <a16:creationId xmlns:lc="http://schemas.openxmlformats.org/drawingml/2006/lockedCanvas" xmlns="" xmlns:a16="http://schemas.microsoft.com/office/drawing/2014/main" xmlns:xdr="http://schemas.openxmlformats.org/drawingml/2006/spreadsheetDrawing" id="{00000000-0008-0000-0400-000002000000}"/>
+                <a16:creationId xmlns:xdr="http://schemas.openxmlformats.org/drawingml/2006/spreadsheetDrawing" xmlns:a16="http://schemas.microsoft.com/office/drawing/2014/main" xmlns="" xmlns:lc="http://schemas.openxmlformats.org/drawingml/2006/lockedCanvas" id="{00000000-0008-0000-0400-000002000000}"/>
               </a:ext>
             </a:extLst>
           </p:cNvPr>
@@ -7808,48 +7236,18 @@
           <p:nvPr>
             <p:extLst>
               <p:ext uri="{D42A27DB-BD31-4B8C-83A1-F6EECF244321}">
-                <p14:modId xmlns:p14="http://schemas.microsoft.com/office/powerpoint/2010/main" val="2012074757"/>
+                <p14:modId xmlns:p14="http://schemas.microsoft.com/office/powerpoint/2010/main" val="908670084"/>
               </p:ext>
             </p:extLst>
           </p:nvPr>
         </p:nvGraphicFramePr>
         <p:xfrm>
-          <a:off x="251520" y="908720"/>
+          <a:off x="2339752" y="2204864"/>
           <a:ext cx="4457700" cy="2857500"/>
         </p:xfrm>
         <a:graphic>
           <a:graphicData uri="http://schemas.openxmlformats.org/drawingml/2006/chart">
             <c:chart xmlns:c="http://schemas.openxmlformats.org/drawingml/2006/chart" xmlns:r="http://schemas.openxmlformats.org/officeDocument/2006/relationships" r:id="rId2"/>
-          </a:graphicData>
-        </a:graphic>
-      </p:graphicFrame>
-      <p:graphicFrame>
-        <p:nvGraphicFramePr>
-          <p:cNvPr id="9" name="4 Gráfico">
-            <a:extLst>
-              <a:ext uri="{FF2B5EF4-FFF2-40B4-BE49-F238E27FC236}">
-                <a16:creationId xmlns:lc="http://schemas.openxmlformats.org/drawingml/2006/lockedCanvas" xmlns="" xmlns:a16="http://schemas.microsoft.com/office/drawing/2014/main" xmlns:xdr="http://schemas.openxmlformats.org/drawingml/2006/spreadsheetDrawing" id="{00000000-0008-0000-0400-000005000000}"/>
-              </a:ext>
-            </a:extLst>
-          </p:cNvPr>
-          <p:cNvGraphicFramePr>
-            <a:graphicFrameLocks/>
-          </p:cNvGraphicFramePr>
-          <p:nvPr>
-            <p:extLst>
-              <p:ext uri="{D42A27DB-BD31-4B8C-83A1-F6EECF244321}">
-                <p14:modId xmlns:p14="http://schemas.microsoft.com/office/powerpoint/2010/main" val="2743471965"/>
-              </p:ext>
-            </p:extLst>
-          </p:nvPr>
-        </p:nvGraphicFramePr>
-        <p:xfrm>
-          <a:off x="4427984" y="908720"/>
-          <a:ext cx="4867275" cy="2857500"/>
-        </p:xfrm>
-        <a:graphic>
-          <a:graphicData uri="http://schemas.openxmlformats.org/drawingml/2006/chart">
-            <c:chart xmlns:c="http://schemas.openxmlformats.org/drawingml/2006/chart" xmlns:r="http://schemas.openxmlformats.org/officeDocument/2006/relationships" r:id="rId3"/>
           </a:graphicData>
         </a:graphic>
       </p:graphicFrame>
@@ -7984,7 +7382,7 @@
         </p:nvSpPr>
         <p:spPr>
           <a:xfrm>
-            <a:off x="1547664" y="4149080"/>
+            <a:off x="1474936" y="5013176"/>
             <a:ext cx="6192688" cy="923330"/>
           </a:xfrm>
           <a:prstGeom prst="rect">
@@ -8011,7 +7409,7 @@
           <p:cNvPr id="7" name="4 Gráfico">
             <a:extLst>
               <a:ext uri="{FF2B5EF4-FFF2-40B4-BE49-F238E27FC236}">
-                <a16:creationId xmlns:lc="http://schemas.openxmlformats.org/drawingml/2006/lockedCanvas" xmlns="" xmlns:a16="http://schemas.microsoft.com/office/drawing/2014/main" xmlns:xdr="http://schemas.openxmlformats.org/drawingml/2006/spreadsheetDrawing" id="{00000000-0008-0000-0300-000005000000}"/>
+                <a16:creationId xmlns:xdr="http://schemas.openxmlformats.org/drawingml/2006/spreadsheetDrawing" xmlns:a16="http://schemas.microsoft.com/office/drawing/2014/main" xmlns="" xmlns:lc="http://schemas.openxmlformats.org/drawingml/2006/lockedCanvas" id="{00000000-0008-0000-0300-000005000000}"/>
               </a:ext>
             </a:extLst>
           </p:cNvPr>
@@ -8021,48 +7419,18 @@
           <p:nvPr>
             <p:extLst>
               <p:ext uri="{D42A27DB-BD31-4B8C-83A1-F6EECF244321}">
-                <p14:modId xmlns:p14="http://schemas.microsoft.com/office/powerpoint/2010/main" val="575854914"/>
+                <p14:modId xmlns:p14="http://schemas.microsoft.com/office/powerpoint/2010/main" val="902316250"/>
               </p:ext>
             </p:extLst>
           </p:nvPr>
         </p:nvGraphicFramePr>
         <p:xfrm>
-          <a:off x="251520" y="980728"/>
+          <a:off x="1835696" y="1744343"/>
           <a:ext cx="4448175" cy="2857500"/>
         </p:xfrm>
         <a:graphic>
           <a:graphicData uri="http://schemas.openxmlformats.org/drawingml/2006/chart">
             <c:chart xmlns:c="http://schemas.openxmlformats.org/drawingml/2006/chart" xmlns:r="http://schemas.openxmlformats.org/officeDocument/2006/relationships" r:id="rId2"/>
-          </a:graphicData>
-        </a:graphic>
-      </p:graphicFrame>
-      <p:graphicFrame>
-        <p:nvGraphicFramePr>
-          <p:cNvPr id="8" name="6 Gráfico">
-            <a:extLst>
-              <a:ext uri="{FF2B5EF4-FFF2-40B4-BE49-F238E27FC236}">
-                <a16:creationId xmlns:lc="http://schemas.openxmlformats.org/drawingml/2006/lockedCanvas" xmlns="" xmlns:a16="http://schemas.microsoft.com/office/drawing/2014/main" xmlns:xdr="http://schemas.openxmlformats.org/drawingml/2006/spreadsheetDrawing" id="{00000000-0008-0000-0300-000007000000}"/>
-              </a:ext>
-            </a:extLst>
-          </p:cNvPr>
-          <p:cNvGraphicFramePr>
-            <a:graphicFrameLocks/>
-          </p:cNvGraphicFramePr>
-          <p:nvPr>
-            <p:extLst>
-              <p:ext uri="{D42A27DB-BD31-4B8C-83A1-F6EECF244321}">
-                <p14:modId xmlns:p14="http://schemas.microsoft.com/office/powerpoint/2010/main" val="2566418046"/>
-              </p:ext>
-            </p:extLst>
-          </p:nvPr>
-        </p:nvGraphicFramePr>
-        <p:xfrm>
-          <a:off x="4499992" y="980728"/>
-          <a:ext cx="4448175" cy="2847975"/>
-        </p:xfrm>
-        <a:graphic>
-          <a:graphicData uri="http://schemas.openxmlformats.org/drawingml/2006/chart">
-            <c:chart xmlns:c="http://schemas.openxmlformats.org/drawingml/2006/chart" xmlns:r="http://schemas.openxmlformats.org/officeDocument/2006/relationships" r:id="rId3"/>
           </a:graphicData>
         </a:graphic>
       </p:graphicFrame>

</xml_diff>

<commit_message>
Modificaciones Reporte de monitoreo Febrero
</commit_message>
<xml_diff>
--- a/qualtcom/Organizacional/Medicion y Monitoreo/Reporte Monitoreo-150227.pptx
+++ b/qualtcom/Organizacional/Medicion y Monitoreo/Reporte Monitoreo-150227.pptx
@@ -165,7 +165,6 @@
           </a:p>
         </c:rich>
       </c:tx>
-      <c:layout/>
       <c:overlay val="0"/>
     </c:title>
     <c:autoTitleDeleted val="0"/>
@@ -211,7 +210,7 @@
                 <c:formatCode>_-"$"* #,##0.00_-;\-"$"* #,##0.00_-;_-"$"* "-"??_-;_-@_-</c:formatCode>
                 <c:ptCount val="2"/>
                 <c:pt idx="0">
-                  <c:v>11653</c:v>
+                  <c:v>9989</c:v>
                 </c:pt>
                 <c:pt idx="1">
                   <c:v>5693.7300000000005</c:v>
@@ -264,7 +263,7 @@
                   <c:v>0</c:v>
                 </c:pt>
                 <c:pt idx="1">
-                  <c:v>4000</c:v>
+                  <c:v>4685.1000000000004</c:v>
                 </c:pt>
               </c:numCache>
             </c:numRef>
@@ -284,11 +283,11 @@
           <c:showBubbleSize val="0"/>
         </c:dLbls>
         <c:gapWidth val="150"/>
-        <c:axId val="139399360"/>
-        <c:axId val="139397680"/>
+        <c:axId val="94994176"/>
+        <c:axId val="182232704"/>
       </c:barChart>
       <c:catAx>
-        <c:axId val="139399360"/>
+        <c:axId val="94994176"/>
         <c:scaling>
           <c:orientation val="minMax"/>
         </c:scaling>
@@ -298,7 +297,7 @@
         <c:majorTickMark val="none"/>
         <c:minorTickMark val="none"/>
         <c:tickLblPos val="nextTo"/>
-        <c:crossAx val="139397680"/>
+        <c:crossAx val="182232704"/>
         <c:crosses val="autoZero"/>
         <c:auto val="1"/>
         <c:lblAlgn val="ctr"/>
@@ -306,7 +305,7 @@
         <c:noMultiLvlLbl val="0"/>
       </c:catAx>
       <c:valAx>
-        <c:axId val="139397680"/>
+        <c:axId val="182232704"/>
         <c:scaling>
           <c:orientation val="minMax"/>
         </c:scaling>
@@ -317,14 +316,13 @@
         <c:majorTickMark val="none"/>
         <c:minorTickMark val="none"/>
         <c:tickLblPos val="nextTo"/>
-        <c:crossAx val="139399360"/>
+        <c:crossAx val="94994176"/>
         <c:crosses val="autoZero"/>
         <c:crossBetween val="between"/>
       </c:valAx>
     </c:plotArea>
     <c:legend>
       <c:legendPos val="r"/>
-      <c:layout/>
       <c:overlay val="0"/>
     </c:legend>
     <c:plotVisOnly val="1"/>
@@ -367,7 +365,6 @@
           </a:p>
         </c:rich>
       </c:tx>
-      <c:layout/>
       <c:overlay val="0"/>
     </c:title>
     <c:autoTitleDeleted val="0"/>
@@ -436,11 +433,11 @@
           <c:showBubbleSize val="0"/>
         </c:dLbls>
         <c:gapWidth val="150"/>
-        <c:axId val="183132304"/>
-        <c:axId val="183135664"/>
+        <c:axId val="182234944"/>
+        <c:axId val="182235504"/>
       </c:barChart>
       <c:catAx>
-        <c:axId val="183132304"/>
+        <c:axId val="182234944"/>
         <c:scaling>
           <c:orientation val="minMax"/>
         </c:scaling>
@@ -450,7 +447,7 @@
         <c:majorTickMark val="out"/>
         <c:minorTickMark val="none"/>
         <c:tickLblPos val="nextTo"/>
-        <c:crossAx val="183135664"/>
+        <c:crossAx val="182235504"/>
         <c:crosses val="autoZero"/>
         <c:auto val="1"/>
         <c:lblAlgn val="ctr"/>
@@ -458,7 +455,7 @@
         <c:noMultiLvlLbl val="0"/>
       </c:catAx>
       <c:valAx>
-        <c:axId val="183135664"/>
+        <c:axId val="182235504"/>
         <c:scaling>
           <c:orientation val="minMax"/>
           <c:max val="1"/>
@@ -471,7 +468,7 @@
         <c:majorTickMark val="out"/>
         <c:minorTickMark val="none"/>
         <c:tickLblPos val="nextTo"/>
-        <c:crossAx val="183132304"/>
+        <c:crossAx val="182234944"/>
         <c:crosses val="autoZero"/>
         <c:crossBetween val="between"/>
       </c:valAx>
@@ -516,12 +513,21 @@
           </a:p>
         </c:rich>
       </c:tx>
-      <c:layout/>
       <c:overlay val="0"/>
     </c:title>
     <c:autoTitleDeleted val="0"/>
     <c:plotArea>
-      <c:layout/>
+      <c:layout>
+        <c:manualLayout>
+          <c:layoutTarget val="inner"/>
+          <c:xMode val="edge"/>
+          <c:yMode val="edge"/>
+          <c:x val="6.2818398054720295E-2"/>
+          <c:y val="0.17902850563341138"/>
+          <c:w val="0.80088011345610555"/>
+          <c:h val="0.62240499002483141"/>
+        </c:manualLayout>
+      </c:layout>
       <c:barChart>
         <c:barDir val="col"/>
         <c:grouping val="clustered"/>
@@ -587,10 +593,10 @@
                 <c:formatCode>General</c:formatCode>
                 <c:ptCount val="7"/>
                 <c:pt idx="0">
-                  <c:v>140</c:v>
+                  <c:v>91.2</c:v>
                 </c:pt>
                 <c:pt idx="1">
-                  <c:v>140</c:v>
+                  <c:v>45.6</c:v>
                 </c:pt>
                 <c:pt idx="2">
                   <c:v>45.600000000000009</c:v>
@@ -715,11 +721,11 @@
           <c:showBubbleSize val="0"/>
         </c:dLbls>
         <c:gapWidth val="150"/>
-        <c:axId val="189317344"/>
-        <c:axId val="189319024"/>
+        <c:axId val="186699072"/>
+        <c:axId val="186699632"/>
       </c:barChart>
       <c:catAx>
-        <c:axId val="189317344"/>
+        <c:axId val="186699072"/>
         <c:scaling>
           <c:orientation val="minMax"/>
         </c:scaling>
@@ -729,7 +735,7 @@
         <c:majorTickMark val="none"/>
         <c:minorTickMark val="none"/>
         <c:tickLblPos val="nextTo"/>
-        <c:crossAx val="189319024"/>
+        <c:crossAx val="186699632"/>
         <c:crosses val="autoZero"/>
         <c:auto val="1"/>
         <c:lblAlgn val="ctr"/>
@@ -737,7 +743,7 @@
         <c:noMultiLvlLbl val="0"/>
       </c:catAx>
       <c:valAx>
-        <c:axId val="189319024"/>
+        <c:axId val="186699632"/>
         <c:scaling>
           <c:orientation val="minMax"/>
         </c:scaling>
@@ -748,14 +754,13 @@
         <c:majorTickMark val="none"/>
         <c:minorTickMark val="none"/>
         <c:tickLblPos val="nextTo"/>
-        <c:crossAx val="189317344"/>
+        <c:crossAx val="186699072"/>
         <c:crosses val="autoZero"/>
         <c:crossBetween val="between"/>
       </c:valAx>
     </c:plotArea>
     <c:legend>
       <c:legendPos val="r"/>
-      <c:layout/>
       <c:overlay val="0"/>
     </c:legend>
     <c:plotVisOnly val="1"/>
@@ -798,7 +803,14 @@
           </a:p>
         </c:rich>
       </c:tx>
-      <c:layout/>
+      <c:layout>
+        <c:manualLayout>
+          <c:xMode val="edge"/>
+          <c:yMode val="edge"/>
+          <c:x val="0.36064508533328021"/>
+          <c:y val="0.10368141798980862"/>
+        </c:manualLayout>
+      </c:layout>
       <c:overlay val="0"/>
     </c:title>
     <c:autoTitleDeleted val="0"/>
@@ -907,11 +919,11 @@
           <c:showBubbleSize val="0"/>
         </c:dLbls>
         <c:gapWidth val="150"/>
-        <c:axId val="195310480"/>
-        <c:axId val="195307120"/>
+        <c:axId val="183867808"/>
+        <c:axId val="183868368"/>
       </c:barChart>
       <c:catAx>
-        <c:axId val="195310480"/>
+        <c:axId val="183867808"/>
         <c:scaling>
           <c:orientation val="minMax"/>
         </c:scaling>
@@ -921,7 +933,7 @@
         <c:majorTickMark val="out"/>
         <c:minorTickMark val="none"/>
         <c:tickLblPos val="nextTo"/>
-        <c:crossAx val="195307120"/>
+        <c:crossAx val="183868368"/>
         <c:crosses val="autoZero"/>
         <c:auto val="1"/>
         <c:lblAlgn val="ctr"/>
@@ -929,7 +941,7 @@
         <c:noMultiLvlLbl val="0"/>
       </c:catAx>
       <c:valAx>
-        <c:axId val="195307120"/>
+        <c:axId val="183868368"/>
         <c:scaling>
           <c:orientation val="minMax"/>
           <c:max val="1"/>
@@ -942,7 +954,7 @@
         <c:majorTickMark val="out"/>
         <c:minorTickMark val="none"/>
         <c:tickLblPos val="nextTo"/>
-        <c:crossAx val="195310480"/>
+        <c:crossAx val="183867808"/>
         <c:crosses val="autoZero"/>
         <c:crossBetween val="between"/>
       </c:valAx>
@@ -987,7 +999,6 @@
           </a:p>
         </c:rich>
       </c:tx>
-      <c:layout/>
       <c:overlay val="0"/>
     </c:title>
     <c:autoTitleDeleted val="0"/>
@@ -1051,11 +1062,11 @@
           <c:showBubbleSize val="0"/>
         </c:dLbls>
         <c:gapWidth val="150"/>
-        <c:axId val="139403280"/>
-        <c:axId val="56402512"/>
+        <c:axId val="183870608"/>
+        <c:axId val="183886000"/>
       </c:barChart>
       <c:catAx>
-        <c:axId val="139403280"/>
+        <c:axId val="183870608"/>
         <c:scaling>
           <c:orientation val="minMax"/>
         </c:scaling>
@@ -1065,7 +1076,7 @@
         <c:majorTickMark val="none"/>
         <c:minorTickMark val="none"/>
         <c:tickLblPos val="nextTo"/>
-        <c:crossAx val="56402512"/>
+        <c:crossAx val="183886000"/>
         <c:crosses val="autoZero"/>
         <c:auto val="1"/>
         <c:lblAlgn val="ctr"/>
@@ -1073,7 +1084,7 @@
         <c:noMultiLvlLbl val="0"/>
       </c:catAx>
       <c:valAx>
-        <c:axId val="56402512"/>
+        <c:axId val="183886000"/>
         <c:scaling>
           <c:orientation val="minMax"/>
           <c:max val="1"/>
@@ -1085,7 +1096,7 @@
         <c:majorTickMark val="none"/>
         <c:minorTickMark val="none"/>
         <c:tickLblPos val="nextTo"/>
-        <c:crossAx val="139403280"/>
+        <c:crossAx val="183870608"/>
         <c:crosses val="autoZero"/>
         <c:crossBetween val="between"/>
       </c:valAx>
@@ -1207,11 +1218,11 @@
           <c:showBubbleSize val="0"/>
         </c:dLbls>
         <c:gapWidth val="150"/>
-        <c:axId val="141398032"/>
-        <c:axId val="141398592"/>
+        <c:axId val="183888800"/>
+        <c:axId val="183889360"/>
       </c:barChart>
       <c:catAx>
-        <c:axId val="141398032"/>
+        <c:axId val="183888800"/>
         <c:scaling>
           <c:orientation val="minMax"/>
         </c:scaling>
@@ -1221,7 +1232,7 @@
         <c:majorTickMark val="none"/>
         <c:minorTickMark val="none"/>
         <c:tickLblPos val="nextTo"/>
-        <c:crossAx val="141398592"/>
+        <c:crossAx val="183889360"/>
         <c:crosses val="autoZero"/>
         <c:auto val="1"/>
         <c:lblAlgn val="ctr"/>
@@ -1229,7 +1240,7 @@
         <c:noMultiLvlLbl val="0"/>
       </c:catAx>
       <c:valAx>
-        <c:axId val="141398592"/>
+        <c:axId val="183889360"/>
         <c:scaling>
           <c:orientation val="minMax"/>
           <c:max val="1"/>
@@ -1241,7 +1252,7 @@
         <c:majorTickMark val="none"/>
         <c:minorTickMark val="none"/>
         <c:tickLblPos val="nextTo"/>
-        <c:crossAx val="141398032"/>
+        <c:crossAx val="183888800"/>
         <c:crosses val="autoZero"/>
         <c:crossBetween val="between"/>
       </c:valAx>
@@ -1292,7 +1303,6 @@
           </a:p>
         </c:rich>
       </c:tx>
-      <c:layout/>
       <c:overlay val="0"/>
     </c:title>
     <c:autoTitleDeleted val="0"/>
@@ -1366,11 +1376,11 @@
           <c:showBubbleSize val="0"/>
         </c:dLbls>
         <c:gapWidth val="150"/>
-        <c:axId val="141401392"/>
-        <c:axId val="141401952"/>
+        <c:axId val="184261840"/>
+        <c:axId val="184262400"/>
       </c:barChart>
       <c:catAx>
-        <c:axId val="141401392"/>
+        <c:axId val="184261840"/>
         <c:scaling>
           <c:orientation val="minMax"/>
         </c:scaling>
@@ -1380,7 +1390,7 @@
         <c:majorTickMark val="none"/>
         <c:minorTickMark val="none"/>
         <c:tickLblPos val="nextTo"/>
-        <c:crossAx val="141401952"/>
+        <c:crossAx val="184262400"/>
         <c:crosses val="autoZero"/>
         <c:auto val="1"/>
         <c:lblAlgn val="ctr"/>
@@ -1388,7 +1398,7 @@
         <c:noMultiLvlLbl val="0"/>
       </c:catAx>
       <c:valAx>
-        <c:axId val="141401952"/>
+        <c:axId val="184262400"/>
         <c:scaling>
           <c:orientation val="minMax"/>
           <c:max val="1"/>
@@ -1400,7 +1410,7 @@
         <c:majorTickMark val="none"/>
         <c:minorTickMark val="none"/>
         <c:tickLblPos val="nextTo"/>
-        <c:crossAx val="141401392"/>
+        <c:crossAx val="184261840"/>
         <c:crosses val="autoZero"/>
         <c:crossBetween val="between"/>
       </c:valAx>
@@ -1451,7 +1461,6 @@
           </a:p>
         </c:rich>
       </c:tx>
-      <c:layout/>
       <c:overlay val="0"/>
     </c:title>
     <c:autoTitleDeleted val="0"/>
@@ -1515,11 +1524,11 @@
           <c:showBubbleSize val="0"/>
         </c:dLbls>
         <c:gapWidth val="150"/>
-        <c:axId val="142021552"/>
-        <c:axId val="142022112"/>
+        <c:axId val="184269472"/>
+        <c:axId val="184270032"/>
       </c:barChart>
       <c:catAx>
-        <c:axId val="142021552"/>
+        <c:axId val="184269472"/>
         <c:scaling>
           <c:orientation val="minMax"/>
         </c:scaling>
@@ -1529,7 +1538,7 @@
         <c:majorTickMark val="none"/>
         <c:minorTickMark val="none"/>
         <c:tickLblPos val="nextTo"/>
-        <c:crossAx val="142022112"/>
+        <c:crossAx val="184270032"/>
         <c:crosses val="autoZero"/>
         <c:auto val="1"/>
         <c:lblAlgn val="ctr"/>
@@ -1537,7 +1546,7 @@
         <c:noMultiLvlLbl val="0"/>
       </c:catAx>
       <c:valAx>
-        <c:axId val="142022112"/>
+        <c:axId val="184270032"/>
         <c:scaling>
           <c:orientation val="minMax"/>
         </c:scaling>
@@ -1548,7 +1557,7 @@
         <c:majorTickMark val="none"/>
         <c:minorTickMark val="none"/>
         <c:tickLblPos val="nextTo"/>
-        <c:crossAx val="142021552"/>
+        <c:crossAx val="184269472"/>
         <c:crosses val="autoZero"/>
         <c:crossBetween val="between"/>
       </c:valAx>
@@ -4702,21 +4711,21 @@
       </p:sp>
       <p:graphicFrame>
         <p:nvGraphicFramePr>
-          <p:cNvPr id="2" name="Tabla 1"/>
+          <p:cNvPr id="5" name="Tabla 4"/>
           <p:cNvGraphicFramePr>
             <a:graphicFrameLocks noGrp="1"/>
           </p:cNvGraphicFramePr>
           <p:nvPr>
             <p:extLst>
               <p:ext uri="{D42A27DB-BD31-4B8C-83A1-F6EECF244321}">
-                <p14:modId xmlns:p14="http://schemas.microsoft.com/office/powerpoint/2010/main" val="3258885907"/>
+                <p14:modId xmlns:p14="http://schemas.microsoft.com/office/powerpoint/2010/main" val="2307832640"/>
               </p:ext>
             </p:extLst>
           </p:nvPr>
         </p:nvGraphicFramePr>
         <p:xfrm>
-          <a:off x="648920" y="1700808"/>
-          <a:ext cx="8482861" cy="2311369"/>
+          <a:off x="468901" y="1124744"/>
+          <a:ext cx="8686802" cy="4191224"/>
         </p:xfrm>
         <a:graphic>
           <a:graphicData uri="http://schemas.openxmlformats.org/drawingml/2006/table">
@@ -4725,18 +4734,18 @@
                 <a:tableStyleId>{5C22544A-7EE6-4342-B048-85BDC9FD1C3A}</a:tableStyleId>
               </a:tblPr>
               <a:tblGrid>
-                <a:gridCol w="131287"/>
-                <a:gridCol w="1703561"/>
-                <a:gridCol w="432048"/>
-                <a:gridCol w="720080"/>
-                <a:gridCol w="576064"/>
-                <a:gridCol w="576064"/>
-                <a:gridCol w="1512168"/>
-                <a:gridCol w="1679462"/>
-                <a:gridCol w="696802"/>
-                <a:gridCol w="455325"/>
+                <a:gridCol w="135335"/>
+                <a:gridCol w="1581725"/>
+                <a:gridCol w="634382"/>
+                <a:gridCol w="634382"/>
+                <a:gridCol w="634382"/>
+                <a:gridCol w="634382"/>
+                <a:gridCol w="1581725"/>
+                <a:gridCol w="1581725"/>
+                <a:gridCol w="634382"/>
+                <a:gridCol w="634382"/>
               </a:tblGrid>
-              <a:tr h="360040">
+              <a:tr h="228114">
                 <a:tc>
                   <a:txBody>
                     <a:bodyPr/>
@@ -4790,33 +4799,10 @@
                     <a:p>
                       <a:pPr algn="ctr" fontAlgn="ctr"/>
                       <a:r>
-                        <a:rPr lang="es-MX" sz="700" u="none" strike="noStrike" dirty="0">
+                        <a:rPr lang="es-MX" sz="700" u="none" strike="noStrike">
                           <a:effectLst/>
                         </a:rPr>
                         <a:t>IMPACTO</a:t>
-                      </a:r>
-                      <a:endParaRPr lang="es-MX" sz="700" b="1" i="0" u="none" strike="noStrike" dirty="0">
-                        <a:solidFill>
-                          <a:srgbClr val="000000"/>
-                        </a:solidFill>
-                        <a:effectLst/>
-                        <a:latin typeface="Calibri" panose="020F0502020204030204" pitchFamily="34" charset="0"/>
-                      </a:endParaRPr>
-                    </a:p>
-                  </a:txBody>
-                  <a:tcPr marL="0" marR="0" marT="0" marB="0" anchor="ctr"/>
-                </a:tc>
-                <a:tc>
-                  <a:txBody>
-                    <a:bodyPr/>
-                    <a:lstStyle/>
-                    <a:p>
-                      <a:pPr algn="ctr" fontAlgn="ctr"/>
-                      <a:r>
-                        <a:rPr lang="es-MX" sz="700" u="none" strike="noStrike">
-                          <a:effectLst/>
-                        </a:rPr>
-                        <a:t>PROBABILIDAD</a:t>
                       </a:r>
                       <a:endParaRPr lang="es-MX" sz="700" b="1" i="0" u="none" strike="noStrike">
                         <a:solidFill>
@@ -4839,7 +4825,7 @@
                         <a:rPr lang="es-MX" sz="700" u="none" strike="noStrike">
                           <a:effectLst/>
                         </a:rPr>
-                        <a:t>EXPOSICIÓN</a:t>
+                        <a:t>PROBABILIDAD</a:t>
                       </a:r>
                       <a:endParaRPr lang="es-MX" sz="700" b="1" i="0" u="none" strike="noStrike">
                         <a:solidFill>
@@ -4862,7 +4848,7 @@
                         <a:rPr lang="es-MX" sz="700" u="none" strike="noStrike">
                           <a:effectLst/>
                         </a:rPr>
-                        <a:t>PRIORIDAD</a:t>
+                        <a:t>EXPOSICIÓN</a:t>
                       </a:r>
                       <a:endParaRPr lang="es-MX" sz="700" b="1" i="0" u="none" strike="noStrike">
                         <a:solidFill>
@@ -4885,7 +4871,7 @@
                         <a:rPr lang="es-MX" sz="700" u="none" strike="noStrike">
                           <a:effectLst/>
                         </a:rPr>
-                        <a:t>PLAN DE MITIGACIÓN</a:t>
+                        <a:t>PRIORIDAD</a:t>
                       </a:r>
                       <a:endParaRPr lang="es-MX" sz="700" b="1" i="0" u="none" strike="noStrike">
                         <a:solidFill>
@@ -4908,7 +4894,7 @@
                         <a:rPr lang="es-MX" sz="700" u="none" strike="noStrike">
                           <a:effectLst/>
                         </a:rPr>
-                        <a:t>PLAN DE CONTINGENCIA</a:t>
+                        <a:t>PLAN DE MITIGACIÓN</a:t>
                       </a:r>
                       <a:endParaRPr lang="es-MX" sz="700" b="1" i="0" u="none" strike="noStrike">
                         <a:solidFill>
@@ -4931,7 +4917,7 @@
                         <a:rPr lang="es-MX" sz="700" u="none" strike="noStrike">
                           <a:effectLst/>
                         </a:rPr>
-                        <a:t>RESPONSABLE</a:t>
+                        <a:t>PLAN DE CONTINGENCIA</a:t>
                       </a:r>
                       <a:endParaRPr lang="es-MX" sz="700" b="1" i="0" u="none" strike="noStrike">
                         <a:solidFill>
@@ -4954,7 +4940,7 @@
                         <a:rPr lang="es-MX" sz="700" u="none" strike="noStrike">
                           <a:effectLst/>
                         </a:rPr>
-                        <a:t>STATUS</a:t>
+                        <a:t>RESPONSABLE</a:t>
                       </a:r>
                       <a:endParaRPr lang="es-MX" sz="700" b="1" i="0" u="none" strike="noStrike">
                         <a:solidFill>
@@ -4967,8 +4953,31 @@
                   </a:txBody>
                   <a:tcPr marL="0" marR="0" marT="0" marB="0" anchor="ctr"/>
                 </a:tc>
+                <a:tc>
+                  <a:txBody>
+                    <a:bodyPr/>
+                    <a:lstStyle/>
+                    <a:p>
+                      <a:pPr algn="ctr" fontAlgn="ctr"/>
+                      <a:r>
+                        <a:rPr lang="es-MX" sz="700" u="none" strike="noStrike">
+                          <a:effectLst/>
+                        </a:rPr>
+                        <a:t>STATUS</a:t>
+                      </a:r>
+                      <a:endParaRPr lang="es-MX" sz="700" b="1" i="0" u="none" strike="noStrike">
+                        <a:solidFill>
+                          <a:srgbClr val="000000"/>
+                        </a:solidFill>
+                        <a:effectLst/>
+                        <a:latin typeface="Calibri" panose="020F0502020204030204" pitchFamily="34" charset="0"/>
+                      </a:endParaRPr>
+                    </a:p>
+                  </a:txBody>
+                  <a:tcPr marL="0" marR="0" marT="0" marB="0" anchor="ctr"/>
+                </a:tc>
               </a:tr>
-              <a:tr h="1170797">
+              <a:tr h="753959">
                 <a:tc>
                   <a:txBody>
                     <a:bodyPr/>
@@ -5197,7 +5206,7 @@
                         <a:rPr lang="es-MX" sz="700" u="none" strike="noStrike">
                           <a:effectLst/>
                         </a:rPr>
-                        <a:t>Abierto</a:t>
+                        <a:t>Mitigado</a:t>
                       </a:r>
                       <a:endParaRPr lang="es-MX" sz="700" b="0" i="0" u="none" strike="noStrike">
                         <a:solidFill>
@@ -5211,7 +5220,7 @@
                   <a:tcPr marL="0" marR="0" marT="0" marB="0" anchor="ctr"/>
                 </a:tc>
               </a:tr>
-              <a:tr h="780532">
+              <a:tr h="570287">
                 <a:tc>
                   <a:txBody>
                     <a:bodyPr/>
@@ -5426,6 +5435,1398 @@
                     <a:p>
                       <a:pPr algn="ctr" fontAlgn="ctr"/>
                       <a:r>
+                        <a:rPr lang="es-MX" sz="700" u="none" strike="noStrike">
+                          <a:effectLst/>
+                        </a:rPr>
+                        <a:t>Mitigado</a:t>
+                      </a:r>
+                      <a:endParaRPr lang="es-MX" sz="700" b="0" i="0" u="none" strike="noStrike">
+                        <a:solidFill>
+                          <a:srgbClr val="000000"/>
+                        </a:solidFill>
+                        <a:effectLst/>
+                        <a:latin typeface="Calibri" panose="020F0502020204030204" pitchFamily="34" charset="0"/>
+                      </a:endParaRPr>
+                    </a:p>
+                  </a:txBody>
+                  <a:tcPr marL="0" marR="0" marT="0" marB="0" anchor="ctr"/>
+                </a:tc>
+              </a:tr>
+              <a:tr h="376981">
+                <a:tc>
+                  <a:txBody>
+                    <a:bodyPr/>
+                    <a:lstStyle/>
+                    <a:p>
+                      <a:pPr algn="ctr" fontAlgn="ctr"/>
+                      <a:r>
+                        <a:rPr lang="es-MX" sz="700" u="none" strike="noStrike">
+                          <a:effectLst/>
+                        </a:rPr>
+                        <a:t>3</a:t>
+                      </a:r>
+                      <a:endParaRPr lang="es-MX" sz="700" b="0" i="0" u="none" strike="noStrike">
+                        <a:solidFill>
+                          <a:srgbClr val="000000"/>
+                        </a:solidFill>
+                        <a:effectLst/>
+                        <a:latin typeface="Calibri" panose="020F0502020204030204" pitchFamily="34" charset="0"/>
+                      </a:endParaRPr>
+                    </a:p>
+                  </a:txBody>
+                  <a:tcPr marL="0" marR="0" marT="0" marB="0" anchor="ctr"/>
+                </a:tc>
+                <a:tc>
+                  <a:txBody>
+                    <a:bodyPr/>
+                    <a:lstStyle/>
+                    <a:p>
+                      <a:pPr algn="l" fontAlgn="t"/>
+                      <a:r>
+                        <a:rPr lang="es-ES" sz="700" u="none" strike="noStrike">
+                          <a:effectLst/>
+                        </a:rPr>
+                        <a:t>Perdida de Servidor por falla en el equipo o siniestro natural</a:t>
+                      </a:r>
+                      <a:endParaRPr lang="es-ES" sz="700" b="0" i="0" u="none" strike="noStrike">
+                        <a:solidFill>
+                          <a:srgbClr val="000000"/>
+                        </a:solidFill>
+                        <a:effectLst/>
+                        <a:latin typeface="Calibri" panose="020F0502020204030204" pitchFamily="34" charset="0"/>
+                      </a:endParaRPr>
+                    </a:p>
+                  </a:txBody>
+                  <a:tcPr marL="0" marR="0" marT="0" marB="0"/>
+                </a:tc>
+                <a:tc>
+                  <a:txBody>
+                    <a:bodyPr/>
+                    <a:lstStyle/>
+                    <a:p>
+                      <a:pPr algn="ctr" fontAlgn="ctr"/>
+                      <a:r>
+                        <a:rPr lang="es-MX" sz="700" u="none" strike="noStrike">
+                          <a:effectLst/>
+                        </a:rPr>
+                        <a:t>5</a:t>
+                      </a:r>
+                      <a:endParaRPr lang="es-MX" sz="700" b="0" i="0" u="none" strike="noStrike">
+                        <a:solidFill>
+                          <a:srgbClr val="000000"/>
+                        </a:solidFill>
+                        <a:effectLst/>
+                        <a:latin typeface="Calibri" panose="020F0502020204030204" pitchFamily="34" charset="0"/>
+                      </a:endParaRPr>
+                    </a:p>
+                  </a:txBody>
+                  <a:tcPr marL="0" marR="0" marT="0" marB="0" anchor="ctr"/>
+                </a:tc>
+                <a:tc>
+                  <a:txBody>
+                    <a:bodyPr/>
+                    <a:lstStyle/>
+                    <a:p>
+                      <a:pPr algn="ctr" fontAlgn="ctr"/>
+                      <a:r>
+                        <a:rPr lang="es-MX" sz="700" u="none" strike="noStrike">
+                          <a:effectLst/>
+                        </a:rPr>
+                        <a:t>20%</a:t>
+                      </a:r>
+                      <a:endParaRPr lang="es-MX" sz="700" b="0" i="0" u="none" strike="noStrike">
+                        <a:solidFill>
+                          <a:srgbClr val="000000"/>
+                        </a:solidFill>
+                        <a:effectLst/>
+                        <a:latin typeface="Calibri" panose="020F0502020204030204" pitchFamily="34" charset="0"/>
+                      </a:endParaRPr>
+                    </a:p>
+                  </a:txBody>
+                  <a:tcPr marL="0" marR="0" marT="0" marB="0" anchor="ctr"/>
+                </a:tc>
+                <a:tc>
+                  <a:txBody>
+                    <a:bodyPr/>
+                    <a:lstStyle/>
+                    <a:p>
+                      <a:pPr algn="ctr" fontAlgn="ctr"/>
+                      <a:r>
+                        <a:rPr lang="es-MX" sz="700" u="none" strike="noStrike">
+                          <a:effectLst/>
+                        </a:rPr>
+                        <a:t>1</a:t>
+                      </a:r>
+                      <a:endParaRPr lang="es-MX" sz="700" b="0" i="0" u="none" strike="noStrike">
+                        <a:solidFill>
+                          <a:srgbClr val="000000"/>
+                        </a:solidFill>
+                        <a:effectLst/>
+                        <a:latin typeface="Calibri" panose="020F0502020204030204" pitchFamily="34" charset="0"/>
+                      </a:endParaRPr>
+                    </a:p>
+                  </a:txBody>
+                  <a:tcPr marL="0" marR="0" marT="0" marB="0" anchor="ctr"/>
+                </a:tc>
+                <a:tc>
+                  <a:txBody>
+                    <a:bodyPr/>
+                    <a:lstStyle/>
+                    <a:p>
+                      <a:pPr algn="ctr" fontAlgn="ctr"/>
+                      <a:r>
+                        <a:rPr lang="es-MX" sz="700" u="none" strike="noStrike">
+                          <a:effectLst/>
+                        </a:rPr>
+                        <a:t>1</a:t>
+                      </a:r>
+                      <a:endParaRPr lang="es-MX" sz="700" b="0" i="0" u="none" strike="noStrike">
+                        <a:solidFill>
+                          <a:srgbClr val="000000"/>
+                        </a:solidFill>
+                        <a:effectLst/>
+                        <a:latin typeface="Calibri" panose="020F0502020204030204" pitchFamily="34" charset="0"/>
+                      </a:endParaRPr>
+                    </a:p>
+                  </a:txBody>
+                  <a:tcPr marL="0" marR="0" marT="0" marB="0" anchor="ctr"/>
+                </a:tc>
+                <a:tc>
+                  <a:txBody>
+                    <a:bodyPr/>
+                    <a:lstStyle/>
+                    <a:p>
+                      <a:pPr algn="l" fontAlgn="t"/>
+                      <a:r>
+                        <a:rPr lang="es-ES" sz="700" u="none" strike="noStrike">
+                          <a:effectLst/>
+                        </a:rPr>
+                        <a:t>Generar respaldos preventivos con toda la informacion en un lugar diferente al ordenador </a:t>
+                      </a:r>
+                      <a:endParaRPr lang="es-ES" sz="700" b="0" i="0" u="none" strike="noStrike">
+                        <a:solidFill>
+                          <a:srgbClr val="000000"/>
+                        </a:solidFill>
+                        <a:effectLst/>
+                        <a:latin typeface="Calibri" panose="020F0502020204030204" pitchFamily="34" charset="0"/>
+                      </a:endParaRPr>
+                    </a:p>
+                  </a:txBody>
+                  <a:tcPr marL="0" marR="0" marT="0" marB="0"/>
+                </a:tc>
+                <a:tc>
+                  <a:txBody>
+                    <a:bodyPr/>
+                    <a:lstStyle/>
+                    <a:p>
+                      <a:pPr algn="l" fontAlgn="t"/>
+                      <a:r>
+                        <a:rPr lang="es-ES" sz="700" u="none" strike="noStrike">
+                          <a:effectLst/>
+                        </a:rPr>
+                        <a:t>Reinstalar servicio en un servidor distinto</a:t>
+                      </a:r>
+                      <a:endParaRPr lang="es-ES" sz="700" b="0" i="0" u="none" strike="noStrike">
+                        <a:solidFill>
+                          <a:srgbClr val="000000"/>
+                        </a:solidFill>
+                        <a:effectLst/>
+                        <a:latin typeface="Calibri" panose="020F0502020204030204" pitchFamily="34" charset="0"/>
+                      </a:endParaRPr>
+                    </a:p>
+                  </a:txBody>
+                  <a:tcPr marL="0" marR="0" marT="0" marB="0"/>
+                </a:tc>
+                <a:tc>
+                  <a:txBody>
+                    <a:bodyPr/>
+                    <a:lstStyle/>
+                    <a:p>
+                      <a:pPr algn="ctr" fontAlgn="ctr"/>
+                      <a:r>
+                        <a:rPr lang="es-MX" sz="700" u="none" strike="noStrike">
+                          <a:effectLst/>
+                        </a:rPr>
+                        <a:t>Jovanny Zepeda</a:t>
+                      </a:r>
+                      <a:endParaRPr lang="es-MX" sz="700" b="0" i="0" u="none" strike="noStrike">
+                        <a:solidFill>
+                          <a:srgbClr val="000000"/>
+                        </a:solidFill>
+                        <a:effectLst/>
+                        <a:latin typeface="Calibri" panose="020F0502020204030204" pitchFamily="34" charset="0"/>
+                      </a:endParaRPr>
+                    </a:p>
+                  </a:txBody>
+                  <a:tcPr marL="0" marR="0" marT="0" marB="0" anchor="ctr"/>
+                </a:tc>
+                <a:tc>
+                  <a:txBody>
+                    <a:bodyPr/>
+                    <a:lstStyle/>
+                    <a:p>
+                      <a:pPr algn="ctr" fontAlgn="ctr"/>
+                      <a:r>
+                        <a:rPr lang="es-MX" sz="700" u="none" strike="noStrike">
+                          <a:effectLst/>
+                        </a:rPr>
+                        <a:t>Abierto</a:t>
+                      </a:r>
+                      <a:endParaRPr lang="es-MX" sz="700" b="0" i="0" u="none" strike="noStrike">
+                        <a:solidFill>
+                          <a:srgbClr val="000000"/>
+                        </a:solidFill>
+                        <a:effectLst/>
+                        <a:latin typeface="Calibri" panose="020F0502020204030204" pitchFamily="34" charset="0"/>
+                      </a:endParaRPr>
+                    </a:p>
+                  </a:txBody>
+                  <a:tcPr marL="0" marR="0" marT="0" marB="0" anchor="ctr"/>
+                </a:tc>
+              </a:tr>
+              <a:tr h="376981">
+                <a:tc>
+                  <a:txBody>
+                    <a:bodyPr/>
+                    <a:lstStyle/>
+                    <a:p>
+                      <a:pPr algn="ctr" fontAlgn="ctr"/>
+                      <a:r>
+                        <a:rPr lang="es-MX" sz="700" u="none" strike="noStrike">
+                          <a:effectLst/>
+                        </a:rPr>
+                        <a:t>4</a:t>
+                      </a:r>
+                      <a:endParaRPr lang="es-MX" sz="700" b="0" i="0" u="none" strike="noStrike">
+                        <a:solidFill>
+                          <a:srgbClr val="000000"/>
+                        </a:solidFill>
+                        <a:effectLst/>
+                        <a:latin typeface="Calibri" panose="020F0502020204030204" pitchFamily="34" charset="0"/>
+                      </a:endParaRPr>
+                    </a:p>
+                  </a:txBody>
+                  <a:tcPr marL="0" marR="0" marT="0" marB="0" anchor="ctr"/>
+                </a:tc>
+                <a:tc>
+                  <a:txBody>
+                    <a:bodyPr/>
+                    <a:lstStyle/>
+                    <a:p>
+                      <a:pPr algn="l" fontAlgn="t"/>
+                      <a:r>
+                        <a:rPr lang="es-ES" sz="700" u="none" strike="noStrike">
+                          <a:effectLst/>
+                        </a:rPr>
+                        <a:t>Desviaciones elevadas a causa de pocos clientes</a:t>
+                      </a:r>
+                      <a:endParaRPr lang="es-ES" sz="700" b="0" i="0" u="none" strike="noStrike">
+                        <a:solidFill>
+                          <a:srgbClr val="000000"/>
+                        </a:solidFill>
+                        <a:effectLst/>
+                        <a:latin typeface="Calibri" panose="020F0502020204030204" pitchFamily="34" charset="0"/>
+                      </a:endParaRPr>
+                    </a:p>
+                  </a:txBody>
+                  <a:tcPr marL="0" marR="0" marT="0" marB="0"/>
+                </a:tc>
+                <a:tc>
+                  <a:txBody>
+                    <a:bodyPr/>
+                    <a:lstStyle/>
+                    <a:p>
+                      <a:pPr algn="ctr" fontAlgn="ctr"/>
+                      <a:r>
+                        <a:rPr lang="es-MX" sz="700" u="none" strike="noStrike">
+                          <a:effectLst/>
+                        </a:rPr>
+                        <a:t>2</a:t>
+                      </a:r>
+                      <a:endParaRPr lang="es-MX" sz="700" b="0" i="0" u="none" strike="noStrike">
+                        <a:solidFill>
+                          <a:srgbClr val="000000"/>
+                        </a:solidFill>
+                        <a:effectLst/>
+                        <a:latin typeface="Calibri" panose="020F0502020204030204" pitchFamily="34" charset="0"/>
+                      </a:endParaRPr>
+                    </a:p>
+                  </a:txBody>
+                  <a:tcPr marL="0" marR="0" marT="0" marB="0" anchor="ctr"/>
+                </a:tc>
+                <a:tc>
+                  <a:txBody>
+                    <a:bodyPr/>
+                    <a:lstStyle/>
+                    <a:p>
+                      <a:pPr algn="ctr" fontAlgn="ctr"/>
+                      <a:r>
+                        <a:rPr lang="es-MX" sz="700" u="none" strike="noStrike">
+                          <a:effectLst/>
+                        </a:rPr>
+                        <a:t>65%</a:t>
+                      </a:r>
+                      <a:endParaRPr lang="es-MX" sz="700" b="0" i="0" u="none" strike="noStrike">
+                        <a:solidFill>
+                          <a:srgbClr val="000000"/>
+                        </a:solidFill>
+                        <a:effectLst/>
+                        <a:latin typeface="Calibri" panose="020F0502020204030204" pitchFamily="34" charset="0"/>
+                      </a:endParaRPr>
+                    </a:p>
+                  </a:txBody>
+                  <a:tcPr marL="0" marR="0" marT="0" marB="0" anchor="ctr"/>
+                </a:tc>
+                <a:tc>
+                  <a:txBody>
+                    <a:bodyPr/>
+                    <a:lstStyle/>
+                    <a:p>
+                      <a:pPr algn="ctr" fontAlgn="ctr"/>
+                      <a:r>
+                        <a:rPr lang="es-MX" sz="700" u="none" strike="noStrike">
+                          <a:effectLst/>
+                        </a:rPr>
+                        <a:t>1,3</a:t>
+                      </a:r>
+                      <a:endParaRPr lang="es-MX" sz="700" b="0" i="0" u="none" strike="noStrike">
+                        <a:solidFill>
+                          <a:srgbClr val="000000"/>
+                        </a:solidFill>
+                        <a:effectLst/>
+                        <a:latin typeface="Calibri" panose="020F0502020204030204" pitchFamily="34" charset="0"/>
+                      </a:endParaRPr>
+                    </a:p>
+                  </a:txBody>
+                  <a:tcPr marL="0" marR="0" marT="0" marB="0" anchor="ctr"/>
+                </a:tc>
+                <a:tc>
+                  <a:txBody>
+                    <a:bodyPr/>
+                    <a:lstStyle/>
+                    <a:p>
+                      <a:pPr algn="ctr" fontAlgn="ctr"/>
+                      <a:r>
+                        <a:rPr lang="es-MX" sz="700" u="none" strike="noStrike">
+                          <a:effectLst/>
+                        </a:rPr>
+                        <a:t>3</a:t>
+                      </a:r>
+                      <a:endParaRPr lang="es-MX" sz="700" b="0" i="0" u="none" strike="noStrike">
+                        <a:solidFill>
+                          <a:srgbClr val="000000"/>
+                        </a:solidFill>
+                        <a:effectLst/>
+                        <a:latin typeface="Calibri" panose="020F0502020204030204" pitchFamily="34" charset="0"/>
+                      </a:endParaRPr>
+                    </a:p>
+                  </a:txBody>
+                  <a:tcPr marL="0" marR="0" marT="0" marB="0" anchor="ctr"/>
+                </a:tc>
+                <a:tc>
+                  <a:txBody>
+                    <a:bodyPr/>
+                    <a:lstStyle/>
+                    <a:p>
+                      <a:pPr algn="l" fontAlgn="t"/>
+                      <a:r>
+                        <a:rPr lang="es-ES" sz="700" u="none" strike="noStrike">
+                          <a:effectLst/>
+                        </a:rPr>
+                        <a:t>Generar servicio adecuado para que los clientes comiencen a recomendar los servicios otorgados</a:t>
+                      </a:r>
+                      <a:endParaRPr lang="es-ES" sz="700" b="0" i="0" u="none" strike="noStrike">
+                        <a:solidFill>
+                          <a:srgbClr val="000000"/>
+                        </a:solidFill>
+                        <a:effectLst/>
+                        <a:latin typeface="Calibri" panose="020F0502020204030204" pitchFamily="34" charset="0"/>
+                      </a:endParaRPr>
+                    </a:p>
+                  </a:txBody>
+                  <a:tcPr marL="0" marR="0" marT="0" marB="0"/>
+                </a:tc>
+                <a:tc>
+                  <a:txBody>
+                    <a:bodyPr/>
+                    <a:lstStyle/>
+                    <a:p>
+                      <a:pPr algn="l" fontAlgn="t"/>
+                      <a:r>
+                        <a:rPr lang="es-ES" sz="700" u="none" strike="noStrike">
+                          <a:effectLst/>
+                        </a:rPr>
+                        <a:t>Buscar mas clientes para poder invertir mas tiempo del planeado en la ejecucion</a:t>
+                      </a:r>
+                      <a:endParaRPr lang="es-ES" sz="700" b="0" i="0" u="none" strike="noStrike">
+                        <a:solidFill>
+                          <a:srgbClr val="000000"/>
+                        </a:solidFill>
+                        <a:effectLst/>
+                        <a:latin typeface="Calibri" panose="020F0502020204030204" pitchFamily="34" charset="0"/>
+                      </a:endParaRPr>
+                    </a:p>
+                  </a:txBody>
+                  <a:tcPr marL="0" marR="0" marT="0" marB="0"/>
+                </a:tc>
+                <a:tc>
+                  <a:txBody>
+                    <a:bodyPr/>
+                    <a:lstStyle/>
+                    <a:p>
+                      <a:pPr algn="ctr" fontAlgn="ctr"/>
+                      <a:r>
+                        <a:rPr lang="es-MX" sz="700" u="none" strike="noStrike">
+                          <a:effectLst/>
+                        </a:rPr>
+                        <a:t>Fidel Reyna</a:t>
+                      </a:r>
+                      <a:endParaRPr lang="es-MX" sz="700" b="0" i="0" u="none" strike="noStrike">
+                        <a:solidFill>
+                          <a:srgbClr val="000000"/>
+                        </a:solidFill>
+                        <a:effectLst/>
+                        <a:latin typeface="Calibri" panose="020F0502020204030204" pitchFamily="34" charset="0"/>
+                      </a:endParaRPr>
+                    </a:p>
+                  </a:txBody>
+                  <a:tcPr marL="0" marR="0" marT="0" marB="0" anchor="ctr"/>
+                </a:tc>
+                <a:tc>
+                  <a:txBody>
+                    <a:bodyPr/>
+                    <a:lstStyle/>
+                    <a:p>
+                      <a:pPr algn="ctr" fontAlgn="ctr"/>
+                      <a:r>
+                        <a:rPr lang="es-MX" sz="700" u="none" strike="noStrike">
+                          <a:effectLst/>
+                        </a:rPr>
+                        <a:t>Ocurrido</a:t>
+                      </a:r>
+                      <a:endParaRPr lang="es-MX" sz="700" b="0" i="0" u="none" strike="noStrike">
+                        <a:solidFill>
+                          <a:srgbClr val="000000"/>
+                        </a:solidFill>
+                        <a:effectLst/>
+                        <a:latin typeface="Calibri" panose="020F0502020204030204" pitchFamily="34" charset="0"/>
+                      </a:endParaRPr>
+                    </a:p>
+                  </a:txBody>
+                  <a:tcPr marL="0" marR="0" marT="0" marB="0" anchor="ctr"/>
+                </a:tc>
+              </a:tr>
+              <a:tr h="628299">
+                <a:tc>
+                  <a:txBody>
+                    <a:bodyPr/>
+                    <a:lstStyle/>
+                    <a:p>
+                      <a:pPr algn="ctr" fontAlgn="ctr"/>
+                      <a:r>
+                        <a:rPr lang="es-MX" sz="700" u="none" strike="noStrike">
+                          <a:effectLst/>
+                        </a:rPr>
+                        <a:t>5</a:t>
+                      </a:r>
+                      <a:endParaRPr lang="es-MX" sz="700" b="0" i="0" u="none" strike="noStrike">
+                        <a:solidFill>
+                          <a:srgbClr val="000000"/>
+                        </a:solidFill>
+                        <a:effectLst/>
+                        <a:latin typeface="Calibri" panose="020F0502020204030204" pitchFamily="34" charset="0"/>
+                      </a:endParaRPr>
+                    </a:p>
+                  </a:txBody>
+                  <a:tcPr marL="0" marR="0" marT="0" marB="0" anchor="ctr"/>
+                </a:tc>
+                <a:tc>
+                  <a:txBody>
+                    <a:bodyPr/>
+                    <a:lstStyle/>
+                    <a:p>
+                      <a:pPr algn="l" fontAlgn="t"/>
+                      <a:r>
+                        <a:rPr lang="es-ES" sz="700" u="none" strike="noStrike">
+                          <a:effectLst/>
+                        </a:rPr>
+                        <a:t>Debido a que el servicio web en ocasiones es inestable existe la probabilidad de que el sistema utilizado de tickets sea inaccesible por algunos momentos</a:t>
+                      </a:r>
+                      <a:endParaRPr lang="es-ES" sz="700" b="0" i="0" u="none" strike="noStrike">
+                        <a:solidFill>
+                          <a:srgbClr val="000000"/>
+                        </a:solidFill>
+                        <a:effectLst/>
+                        <a:latin typeface="Calibri" panose="020F0502020204030204" pitchFamily="34" charset="0"/>
+                      </a:endParaRPr>
+                    </a:p>
+                  </a:txBody>
+                  <a:tcPr marL="0" marR="0" marT="0" marB="0"/>
+                </a:tc>
+                <a:tc>
+                  <a:txBody>
+                    <a:bodyPr/>
+                    <a:lstStyle/>
+                    <a:p>
+                      <a:pPr algn="ctr" fontAlgn="ctr"/>
+                      <a:r>
+                        <a:rPr lang="es-MX" sz="700" u="none" strike="noStrike">
+                          <a:effectLst/>
+                        </a:rPr>
+                        <a:t>2</a:t>
+                      </a:r>
+                      <a:endParaRPr lang="es-MX" sz="700" b="0" i="0" u="none" strike="noStrike">
+                        <a:solidFill>
+                          <a:srgbClr val="000000"/>
+                        </a:solidFill>
+                        <a:effectLst/>
+                        <a:latin typeface="Calibri" panose="020F0502020204030204" pitchFamily="34" charset="0"/>
+                      </a:endParaRPr>
+                    </a:p>
+                  </a:txBody>
+                  <a:tcPr marL="0" marR="0" marT="0" marB="0" anchor="ctr"/>
+                </a:tc>
+                <a:tc>
+                  <a:txBody>
+                    <a:bodyPr/>
+                    <a:lstStyle/>
+                    <a:p>
+                      <a:pPr algn="ctr" fontAlgn="ctr"/>
+                      <a:r>
+                        <a:rPr lang="es-MX" sz="700" u="none" strike="noStrike">
+                          <a:effectLst/>
+                        </a:rPr>
+                        <a:t>45%</a:t>
+                      </a:r>
+                      <a:endParaRPr lang="es-MX" sz="700" b="0" i="0" u="none" strike="noStrike">
+                        <a:solidFill>
+                          <a:srgbClr val="000000"/>
+                        </a:solidFill>
+                        <a:effectLst/>
+                        <a:latin typeface="Calibri" panose="020F0502020204030204" pitchFamily="34" charset="0"/>
+                      </a:endParaRPr>
+                    </a:p>
+                  </a:txBody>
+                  <a:tcPr marL="0" marR="0" marT="0" marB="0" anchor="ctr"/>
+                </a:tc>
+                <a:tc>
+                  <a:txBody>
+                    <a:bodyPr/>
+                    <a:lstStyle/>
+                    <a:p>
+                      <a:pPr algn="ctr" fontAlgn="ctr"/>
+                      <a:r>
+                        <a:rPr lang="es-MX" sz="700" u="none" strike="noStrike">
+                          <a:effectLst/>
+                        </a:rPr>
+                        <a:t>0,9</a:t>
+                      </a:r>
+                      <a:endParaRPr lang="es-MX" sz="700" b="0" i="0" u="none" strike="noStrike">
+                        <a:solidFill>
+                          <a:srgbClr val="000000"/>
+                        </a:solidFill>
+                        <a:effectLst/>
+                        <a:latin typeface="Calibri" panose="020F0502020204030204" pitchFamily="34" charset="0"/>
+                      </a:endParaRPr>
+                    </a:p>
+                  </a:txBody>
+                  <a:tcPr marL="0" marR="0" marT="0" marB="0" anchor="ctr"/>
+                </a:tc>
+                <a:tc>
+                  <a:txBody>
+                    <a:bodyPr/>
+                    <a:lstStyle/>
+                    <a:p>
+                      <a:pPr algn="ctr" fontAlgn="ctr"/>
+                      <a:r>
+                        <a:rPr lang="es-MX" sz="700" u="none" strike="noStrike">
+                          <a:effectLst/>
+                        </a:rPr>
+                        <a:t>2</a:t>
+                      </a:r>
+                      <a:endParaRPr lang="es-MX" sz="700" b="0" i="0" u="none" strike="noStrike">
+                        <a:solidFill>
+                          <a:srgbClr val="000000"/>
+                        </a:solidFill>
+                        <a:effectLst/>
+                        <a:latin typeface="Calibri" panose="020F0502020204030204" pitchFamily="34" charset="0"/>
+                      </a:endParaRPr>
+                    </a:p>
+                  </a:txBody>
+                  <a:tcPr marL="0" marR="0" marT="0" marB="0" anchor="ctr"/>
+                </a:tc>
+                <a:tc>
+                  <a:txBody>
+                    <a:bodyPr/>
+                    <a:lstStyle/>
+                    <a:p>
+                      <a:pPr algn="l" fontAlgn="t"/>
+                      <a:r>
+                        <a:rPr lang="es-ES" sz="700" u="none" strike="noStrike">
+                          <a:effectLst/>
+                        </a:rPr>
+                        <a:t>Generar limpiezas y mantenimintos adecuados al servicio HTTP del servidor para evitar fallas</a:t>
+                      </a:r>
+                      <a:endParaRPr lang="es-ES" sz="700" b="0" i="0" u="none" strike="noStrike">
+                        <a:solidFill>
+                          <a:srgbClr val="000000"/>
+                        </a:solidFill>
+                        <a:effectLst/>
+                        <a:latin typeface="Calibri" panose="020F0502020204030204" pitchFamily="34" charset="0"/>
+                      </a:endParaRPr>
+                    </a:p>
+                  </a:txBody>
+                  <a:tcPr marL="0" marR="0" marT="0" marB="0"/>
+                </a:tc>
+                <a:tc>
+                  <a:txBody>
+                    <a:bodyPr/>
+                    <a:lstStyle/>
+                    <a:p>
+                      <a:pPr algn="l" fontAlgn="t"/>
+                      <a:r>
+                        <a:rPr lang="es-ES" sz="700" u="none" strike="noStrike">
+                          <a:effectLst/>
+                        </a:rPr>
+                        <a:t>Generar registro temporal en herramientas secundarias y en caso de falla total migrar la informacion a la herramienta vtigger</a:t>
+                      </a:r>
+                      <a:endParaRPr lang="es-ES" sz="700" b="0" i="0" u="none" strike="noStrike">
+                        <a:solidFill>
+                          <a:srgbClr val="000000"/>
+                        </a:solidFill>
+                        <a:effectLst/>
+                        <a:latin typeface="Calibri" panose="020F0502020204030204" pitchFamily="34" charset="0"/>
+                      </a:endParaRPr>
+                    </a:p>
+                  </a:txBody>
+                  <a:tcPr marL="0" marR="0" marT="0" marB="0"/>
+                </a:tc>
+                <a:tc>
+                  <a:txBody>
+                    <a:bodyPr/>
+                    <a:lstStyle/>
+                    <a:p>
+                      <a:pPr algn="ctr" fontAlgn="ctr"/>
+                      <a:r>
+                        <a:rPr lang="es-MX" sz="700" u="none" strike="noStrike">
+                          <a:effectLst/>
+                        </a:rPr>
+                        <a:t>Jovanny Zepeda</a:t>
+                      </a:r>
+                      <a:endParaRPr lang="es-MX" sz="700" b="0" i="0" u="none" strike="noStrike">
+                        <a:solidFill>
+                          <a:srgbClr val="000000"/>
+                        </a:solidFill>
+                        <a:effectLst/>
+                        <a:latin typeface="Calibri" panose="020F0502020204030204" pitchFamily="34" charset="0"/>
+                      </a:endParaRPr>
+                    </a:p>
+                  </a:txBody>
+                  <a:tcPr marL="0" marR="0" marT="0" marB="0" anchor="ctr"/>
+                </a:tc>
+                <a:tc>
+                  <a:txBody>
+                    <a:bodyPr/>
+                    <a:lstStyle/>
+                    <a:p>
+                      <a:pPr algn="ctr" fontAlgn="ctr"/>
+                      <a:r>
+                        <a:rPr lang="es-MX" sz="700" u="none" strike="noStrike">
+                          <a:effectLst/>
+                        </a:rPr>
+                        <a:t>Abierto</a:t>
+                      </a:r>
+                      <a:endParaRPr lang="es-MX" sz="700" b="0" i="0" u="none" strike="noStrike">
+                        <a:solidFill>
+                          <a:srgbClr val="000000"/>
+                        </a:solidFill>
+                        <a:effectLst/>
+                        <a:latin typeface="Calibri" panose="020F0502020204030204" pitchFamily="34" charset="0"/>
+                      </a:endParaRPr>
+                    </a:p>
+                  </a:txBody>
+                  <a:tcPr marL="0" marR="0" marT="0" marB="0" anchor="ctr"/>
+                </a:tc>
+              </a:tr>
+              <a:tr h="502641">
+                <a:tc>
+                  <a:txBody>
+                    <a:bodyPr/>
+                    <a:lstStyle/>
+                    <a:p>
+                      <a:pPr algn="ctr" fontAlgn="ctr"/>
+                      <a:r>
+                        <a:rPr lang="es-MX" sz="700" u="none" strike="noStrike">
+                          <a:effectLst/>
+                        </a:rPr>
+                        <a:t>6</a:t>
+                      </a:r>
+                      <a:endParaRPr lang="es-MX" sz="700" b="0" i="0" u="none" strike="noStrike">
+                        <a:solidFill>
+                          <a:srgbClr val="000000"/>
+                        </a:solidFill>
+                        <a:effectLst/>
+                        <a:latin typeface="Calibri" panose="020F0502020204030204" pitchFamily="34" charset="0"/>
+                      </a:endParaRPr>
+                    </a:p>
+                  </a:txBody>
+                  <a:tcPr marL="0" marR="0" marT="0" marB="0" anchor="ctr"/>
+                </a:tc>
+                <a:tc>
+                  <a:txBody>
+                    <a:bodyPr/>
+                    <a:lstStyle/>
+                    <a:p>
+                      <a:pPr algn="l" fontAlgn="t"/>
+                      <a:r>
+                        <a:rPr lang="es-MX" sz="700" u="none" strike="noStrike">
+                          <a:effectLst/>
+                        </a:rPr>
+                        <a:t>Perdida o falta de integrantes del equipo basico de trabajo</a:t>
+                      </a:r>
+                      <a:endParaRPr lang="es-MX" sz="700" b="0" i="0" u="none" strike="noStrike">
+                        <a:solidFill>
+                          <a:srgbClr val="000000"/>
+                        </a:solidFill>
+                        <a:effectLst/>
+                        <a:latin typeface="Calibri" panose="020F0502020204030204" pitchFamily="34" charset="0"/>
+                      </a:endParaRPr>
+                    </a:p>
+                  </a:txBody>
+                  <a:tcPr marL="0" marR="0" marT="0" marB="0"/>
+                </a:tc>
+                <a:tc>
+                  <a:txBody>
+                    <a:bodyPr/>
+                    <a:lstStyle/>
+                    <a:p>
+                      <a:pPr algn="ctr" fontAlgn="ctr"/>
+                      <a:r>
+                        <a:rPr lang="es-MX" sz="700" u="none" strike="noStrike">
+                          <a:effectLst/>
+                        </a:rPr>
+                        <a:t>4</a:t>
+                      </a:r>
+                      <a:endParaRPr lang="es-MX" sz="700" b="0" i="0" u="none" strike="noStrike">
+                        <a:solidFill>
+                          <a:srgbClr val="000000"/>
+                        </a:solidFill>
+                        <a:effectLst/>
+                        <a:latin typeface="Calibri" panose="020F0502020204030204" pitchFamily="34" charset="0"/>
+                      </a:endParaRPr>
+                    </a:p>
+                  </a:txBody>
+                  <a:tcPr marL="0" marR="0" marT="0" marB="0" anchor="ctr"/>
+                </a:tc>
+                <a:tc>
+                  <a:txBody>
+                    <a:bodyPr/>
+                    <a:lstStyle/>
+                    <a:p>
+                      <a:pPr algn="ctr" fontAlgn="ctr"/>
+                      <a:r>
+                        <a:rPr lang="es-MX" sz="700" u="none" strike="noStrike">
+                          <a:effectLst/>
+                        </a:rPr>
+                        <a:t>55%</a:t>
+                      </a:r>
+                      <a:endParaRPr lang="es-MX" sz="700" b="0" i="0" u="none" strike="noStrike">
+                        <a:solidFill>
+                          <a:srgbClr val="000000"/>
+                        </a:solidFill>
+                        <a:effectLst/>
+                        <a:latin typeface="Calibri" panose="020F0502020204030204" pitchFamily="34" charset="0"/>
+                      </a:endParaRPr>
+                    </a:p>
+                  </a:txBody>
+                  <a:tcPr marL="0" marR="0" marT="0" marB="0" anchor="ctr"/>
+                </a:tc>
+                <a:tc>
+                  <a:txBody>
+                    <a:bodyPr/>
+                    <a:lstStyle/>
+                    <a:p>
+                      <a:pPr algn="ctr" fontAlgn="ctr"/>
+                      <a:r>
+                        <a:rPr lang="es-MX" sz="700" u="none" strike="noStrike">
+                          <a:effectLst/>
+                        </a:rPr>
+                        <a:t>2,2</a:t>
+                      </a:r>
+                      <a:endParaRPr lang="es-MX" sz="700" b="0" i="0" u="none" strike="noStrike">
+                        <a:solidFill>
+                          <a:srgbClr val="000000"/>
+                        </a:solidFill>
+                        <a:effectLst/>
+                        <a:latin typeface="Calibri" panose="020F0502020204030204" pitchFamily="34" charset="0"/>
+                      </a:endParaRPr>
+                    </a:p>
+                  </a:txBody>
+                  <a:tcPr marL="0" marR="0" marT="0" marB="0" anchor="ctr"/>
+                </a:tc>
+                <a:tc>
+                  <a:txBody>
+                    <a:bodyPr/>
+                    <a:lstStyle/>
+                    <a:p>
+                      <a:pPr algn="ctr" fontAlgn="ctr"/>
+                      <a:r>
+                        <a:rPr lang="es-MX" sz="700" u="none" strike="noStrike">
+                          <a:effectLst/>
+                        </a:rPr>
+                        <a:t>4</a:t>
+                      </a:r>
+                      <a:endParaRPr lang="es-MX" sz="700" b="0" i="0" u="none" strike="noStrike">
+                        <a:solidFill>
+                          <a:srgbClr val="000000"/>
+                        </a:solidFill>
+                        <a:effectLst/>
+                        <a:latin typeface="Calibri" panose="020F0502020204030204" pitchFamily="34" charset="0"/>
+                      </a:endParaRPr>
+                    </a:p>
+                  </a:txBody>
+                  <a:tcPr marL="0" marR="0" marT="0" marB="0" anchor="ctr"/>
+                </a:tc>
+                <a:tc>
+                  <a:txBody>
+                    <a:bodyPr/>
+                    <a:lstStyle/>
+                    <a:p>
+                      <a:pPr algn="l" fontAlgn="t"/>
+                      <a:r>
+                        <a:rPr lang="es-ES" sz="700" u="none" strike="noStrike">
+                          <a:effectLst/>
+                        </a:rPr>
+                        <a:t>Capacitar a todo el personal en diversas secciones</a:t>
+                      </a:r>
+                      <a:endParaRPr lang="es-ES" sz="700" b="0" i="0" u="none" strike="noStrike">
+                        <a:solidFill>
+                          <a:srgbClr val="000000"/>
+                        </a:solidFill>
+                        <a:effectLst/>
+                        <a:latin typeface="Calibri" panose="020F0502020204030204" pitchFamily="34" charset="0"/>
+                      </a:endParaRPr>
+                    </a:p>
+                  </a:txBody>
+                  <a:tcPr marL="0" marR="0" marT="0" marB="0"/>
+                </a:tc>
+                <a:tc>
+                  <a:txBody>
+                    <a:bodyPr/>
+                    <a:lstStyle/>
+                    <a:p>
+                      <a:pPr algn="l" fontAlgn="t"/>
+                      <a:r>
+                        <a:rPr lang="es-ES" sz="700" u="none" strike="noStrike">
+                          <a:effectLst/>
+                        </a:rPr>
+                        <a:t>Dividir tareas del trabajo diario entre integrantes disponibles y en caso de ausencia definitiva contratacion de personale</a:t>
+                      </a:r>
+                      <a:endParaRPr lang="es-ES" sz="700" b="0" i="0" u="none" strike="noStrike">
+                        <a:solidFill>
+                          <a:srgbClr val="000000"/>
+                        </a:solidFill>
+                        <a:effectLst/>
+                        <a:latin typeface="Calibri" panose="020F0502020204030204" pitchFamily="34" charset="0"/>
+                      </a:endParaRPr>
+                    </a:p>
+                  </a:txBody>
+                  <a:tcPr marL="0" marR="0" marT="0" marB="0"/>
+                </a:tc>
+                <a:tc>
+                  <a:txBody>
+                    <a:bodyPr/>
+                    <a:lstStyle/>
+                    <a:p>
+                      <a:pPr algn="ctr" fontAlgn="ctr"/>
+                      <a:r>
+                        <a:rPr lang="es-MX" sz="700" u="none" strike="noStrike">
+                          <a:effectLst/>
+                        </a:rPr>
+                        <a:t>Fidel Reyna</a:t>
+                      </a:r>
+                      <a:endParaRPr lang="es-MX" sz="700" b="0" i="0" u="none" strike="noStrike">
+                        <a:solidFill>
+                          <a:srgbClr val="000000"/>
+                        </a:solidFill>
+                        <a:effectLst/>
+                        <a:latin typeface="Calibri" panose="020F0502020204030204" pitchFamily="34" charset="0"/>
+                      </a:endParaRPr>
+                    </a:p>
+                  </a:txBody>
+                  <a:tcPr marL="0" marR="0" marT="0" marB="0" anchor="ctr"/>
+                </a:tc>
+                <a:tc>
+                  <a:txBody>
+                    <a:bodyPr/>
+                    <a:lstStyle/>
+                    <a:p>
+                      <a:pPr algn="ctr" fontAlgn="ctr"/>
+                      <a:r>
+                        <a:rPr lang="es-MX" sz="700" u="none" strike="noStrike">
+                          <a:effectLst/>
+                        </a:rPr>
+                        <a:t>Mitigado</a:t>
+                      </a:r>
+                      <a:endParaRPr lang="es-MX" sz="700" b="0" i="0" u="none" strike="noStrike">
+                        <a:solidFill>
+                          <a:srgbClr val="000000"/>
+                        </a:solidFill>
+                        <a:effectLst/>
+                        <a:latin typeface="Calibri" panose="020F0502020204030204" pitchFamily="34" charset="0"/>
+                      </a:endParaRPr>
+                    </a:p>
+                  </a:txBody>
+                  <a:tcPr marL="0" marR="0" marT="0" marB="0" anchor="ctr"/>
+                </a:tc>
+              </a:tr>
+              <a:tr h="376981">
+                <a:tc>
+                  <a:txBody>
+                    <a:bodyPr/>
+                    <a:lstStyle/>
+                    <a:p>
+                      <a:pPr algn="ctr" fontAlgn="ctr"/>
+                      <a:r>
+                        <a:rPr lang="es-MX" sz="700" u="none" strike="noStrike">
+                          <a:effectLst/>
+                        </a:rPr>
+                        <a:t>7</a:t>
+                      </a:r>
+                      <a:endParaRPr lang="es-MX" sz="700" b="0" i="0" u="none" strike="noStrike">
+                        <a:solidFill>
+                          <a:srgbClr val="000000"/>
+                        </a:solidFill>
+                        <a:effectLst/>
+                        <a:latin typeface="Calibri" panose="020F0502020204030204" pitchFamily="34" charset="0"/>
+                      </a:endParaRPr>
+                    </a:p>
+                  </a:txBody>
+                  <a:tcPr marL="0" marR="0" marT="0" marB="0" anchor="ctr"/>
+                </a:tc>
+                <a:tc>
+                  <a:txBody>
+                    <a:bodyPr/>
+                    <a:lstStyle/>
+                    <a:p>
+                      <a:pPr algn="l" fontAlgn="t"/>
+                      <a:r>
+                        <a:rPr lang="es-ES" sz="700" u="none" strike="noStrike">
+                          <a:effectLst/>
+                        </a:rPr>
+                        <a:t>Desviaciones de costos y esfuerzo elevadas a causa de exceso de clientes</a:t>
+                      </a:r>
+                      <a:endParaRPr lang="es-ES" sz="700" b="0" i="0" u="none" strike="noStrike">
+                        <a:solidFill>
+                          <a:srgbClr val="000000"/>
+                        </a:solidFill>
+                        <a:effectLst/>
+                        <a:latin typeface="Calibri" panose="020F0502020204030204" pitchFamily="34" charset="0"/>
+                      </a:endParaRPr>
+                    </a:p>
+                  </a:txBody>
+                  <a:tcPr marL="0" marR="0" marT="0" marB="0"/>
+                </a:tc>
+                <a:tc>
+                  <a:txBody>
+                    <a:bodyPr/>
+                    <a:lstStyle/>
+                    <a:p>
+                      <a:pPr algn="ctr" fontAlgn="ctr"/>
+                      <a:r>
+                        <a:rPr lang="es-MX" sz="700" u="none" strike="noStrike">
+                          <a:effectLst/>
+                        </a:rPr>
+                        <a:t>3</a:t>
+                      </a:r>
+                      <a:endParaRPr lang="es-MX" sz="700" b="0" i="0" u="none" strike="noStrike">
+                        <a:solidFill>
+                          <a:srgbClr val="000000"/>
+                        </a:solidFill>
+                        <a:effectLst/>
+                        <a:latin typeface="Calibri" panose="020F0502020204030204" pitchFamily="34" charset="0"/>
+                      </a:endParaRPr>
+                    </a:p>
+                  </a:txBody>
+                  <a:tcPr marL="0" marR="0" marT="0" marB="0" anchor="ctr"/>
+                </a:tc>
+                <a:tc>
+                  <a:txBody>
+                    <a:bodyPr/>
+                    <a:lstStyle/>
+                    <a:p>
+                      <a:pPr algn="ctr" fontAlgn="ctr"/>
+                      <a:r>
+                        <a:rPr lang="es-MX" sz="700" u="none" strike="noStrike">
+                          <a:effectLst/>
+                        </a:rPr>
+                        <a:t>60%</a:t>
+                      </a:r>
+                      <a:endParaRPr lang="es-MX" sz="700" b="0" i="0" u="none" strike="noStrike">
+                        <a:solidFill>
+                          <a:srgbClr val="000000"/>
+                        </a:solidFill>
+                        <a:effectLst/>
+                        <a:latin typeface="Calibri" panose="020F0502020204030204" pitchFamily="34" charset="0"/>
+                      </a:endParaRPr>
+                    </a:p>
+                  </a:txBody>
+                  <a:tcPr marL="0" marR="0" marT="0" marB="0" anchor="ctr"/>
+                </a:tc>
+                <a:tc>
+                  <a:txBody>
+                    <a:bodyPr/>
+                    <a:lstStyle/>
+                    <a:p>
+                      <a:pPr algn="ctr" fontAlgn="ctr"/>
+                      <a:r>
+                        <a:rPr lang="es-MX" sz="700" u="none" strike="noStrike">
+                          <a:effectLst/>
+                        </a:rPr>
+                        <a:t>1,8</a:t>
+                      </a:r>
+                      <a:endParaRPr lang="es-MX" sz="700" b="0" i="0" u="none" strike="noStrike">
+                        <a:solidFill>
+                          <a:srgbClr val="000000"/>
+                        </a:solidFill>
+                        <a:effectLst/>
+                        <a:latin typeface="Calibri" panose="020F0502020204030204" pitchFamily="34" charset="0"/>
+                      </a:endParaRPr>
+                    </a:p>
+                  </a:txBody>
+                  <a:tcPr marL="0" marR="0" marT="0" marB="0" anchor="ctr"/>
+                </a:tc>
+                <a:tc>
+                  <a:txBody>
+                    <a:bodyPr/>
+                    <a:lstStyle/>
+                    <a:p>
+                      <a:pPr algn="ctr" fontAlgn="ctr"/>
+                      <a:r>
+                        <a:rPr lang="es-MX" sz="700" u="none" strike="noStrike">
+                          <a:effectLst/>
+                        </a:rPr>
+                        <a:t>4</a:t>
+                      </a:r>
+                      <a:endParaRPr lang="es-MX" sz="700" b="0" i="0" u="none" strike="noStrike">
+                        <a:solidFill>
+                          <a:srgbClr val="000000"/>
+                        </a:solidFill>
+                        <a:effectLst/>
+                        <a:latin typeface="Calibri" panose="020F0502020204030204" pitchFamily="34" charset="0"/>
+                      </a:endParaRPr>
+                    </a:p>
+                  </a:txBody>
+                  <a:tcPr marL="0" marR="0" marT="0" marB="0" anchor="ctr"/>
+                </a:tc>
+                <a:tc>
+                  <a:txBody>
+                    <a:bodyPr/>
+                    <a:lstStyle/>
+                    <a:p>
+                      <a:pPr algn="l" fontAlgn="t"/>
+                      <a:r>
+                        <a:rPr lang="es-ES" sz="700" u="none" strike="noStrike">
+                          <a:effectLst/>
+                        </a:rPr>
+                        <a:t>Distribucion de trabajo entre equipo de trabajo</a:t>
+                      </a:r>
+                      <a:endParaRPr lang="es-ES" sz="700" b="0" i="0" u="none" strike="noStrike">
+                        <a:solidFill>
+                          <a:srgbClr val="000000"/>
+                        </a:solidFill>
+                        <a:effectLst/>
+                        <a:latin typeface="Calibri" panose="020F0502020204030204" pitchFamily="34" charset="0"/>
+                      </a:endParaRPr>
+                    </a:p>
+                  </a:txBody>
+                  <a:tcPr marL="0" marR="0" marT="0" marB="0"/>
+                </a:tc>
+                <a:tc>
+                  <a:txBody>
+                    <a:bodyPr/>
+                    <a:lstStyle/>
+                    <a:p>
+                      <a:pPr algn="l" fontAlgn="t"/>
+                      <a:r>
+                        <a:rPr lang="es-ES" sz="700" u="none" strike="noStrike">
+                          <a:effectLst/>
+                        </a:rPr>
+                        <a:t>Contratacion y capacitacion de personal nuevo que pueda cubrir necesidades de clientes</a:t>
+                      </a:r>
+                      <a:endParaRPr lang="es-ES" sz="700" b="0" i="0" u="none" strike="noStrike">
+                        <a:solidFill>
+                          <a:srgbClr val="000000"/>
+                        </a:solidFill>
+                        <a:effectLst/>
+                        <a:latin typeface="Calibri" panose="020F0502020204030204" pitchFamily="34" charset="0"/>
+                      </a:endParaRPr>
+                    </a:p>
+                  </a:txBody>
+                  <a:tcPr marL="0" marR="0" marT="0" marB="0"/>
+                </a:tc>
+                <a:tc>
+                  <a:txBody>
+                    <a:bodyPr/>
+                    <a:lstStyle/>
+                    <a:p>
+                      <a:pPr algn="ctr" fontAlgn="ctr"/>
+                      <a:r>
+                        <a:rPr lang="es-MX" sz="700" u="none" strike="noStrike">
+                          <a:effectLst/>
+                        </a:rPr>
+                        <a:t>Fidel Reyna</a:t>
+                      </a:r>
+                      <a:endParaRPr lang="es-MX" sz="700" b="0" i="0" u="none" strike="noStrike">
+                        <a:solidFill>
+                          <a:srgbClr val="000000"/>
+                        </a:solidFill>
+                        <a:effectLst/>
+                        <a:latin typeface="Calibri" panose="020F0502020204030204" pitchFamily="34" charset="0"/>
+                      </a:endParaRPr>
+                    </a:p>
+                  </a:txBody>
+                  <a:tcPr marL="0" marR="0" marT="0" marB="0" anchor="ctr"/>
+                </a:tc>
+                <a:tc>
+                  <a:txBody>
+                    <a:bodyPr/>
+                    <a:lstStyle/>
+                    <a:p>
+                      <a:pPr algn="ctr" fontAlgn="ctr"/>
+                      <a:r>
+                        <a:rPr lang="es-MX" sz="700" u="none" strike="noStrike">
+                          <a:effectLst/>
+                        </a:rPr>
+                        <a:t>Abierto</a:t>
+                      </a:r>
+                      <a:endParaRPr lang="es-MX" sz="700" b="0" i="0" u="none" strike="noStrike">
+                        <a:solidFill>
+                          <a:srgbClr val="000000"/>
+                        </a:solidFill>
+                        <a:effectLst/>
+                        <a:latin typeface="Calibri" panose="020F0502020204030204" pitchFamily="34" charset="0"/>
+                      </a:endParaRPr>
+                    </a:p>
+                  </a:txBody>
+                  <a:tcPr marL="0" marR="0" marT="0" marB="0" anchor="ctr"/>
+                </a:tc>
+              </a:tr>
+              <a:tr h="376981">
+                <a:tc>
+                  <a:txBody>
+                    <a:bodyPr/>
+                    <a:lstStyle/>
+                    <a:p>
+                      <a:pPr algn="ctr" fontAlgn="ctr"/>
+                      <a:r>
+                        <a:rPr lang="es-MX" sz="700" u="none" strike="noStrike">
+                          <a:effectLst/>
+                        </a:rPr>
+                        <a:t>8</a:t>
+                      </a:r>
+                      <a:endParaRPr lang="es-MX" sz="700" b="0" i="0" u="none" strike="noStrike">
+                        <a:solidFill>
+                          <a:srgbClr val="000000"/>
+                        </a:solidFill>
+                        <a:effectLst/>
+                        <a:latin typeface="Calibri" panose="020F0502020204030204" pitchFamily="34" charset="0"/>
+                      </a:endParaRPr>
+                    </a:p>
+                  </a:txBody>
+                  <a:tcPr marL="0" marR="0" marT="0" marB="0" anchor="ctr"/>
+                </a:tc>
+                <a:tc>
+                  <a:txBody>
+                    <a:bodyPr/>
+                    <a:lstStyle/>
+                    <a:p>
+                      <a:pPr algn="l" fontAlgn="t"/>
+                      <a:r>
+                        <a:rPr lang="es-MX" sz="700" u="none" strike="noStrike">
+                          <a:effectLst/>
+                        </a:rPr>
+                        <a:t>Perdida de repositorio de datos</a:t>
+                      </a:r>
+                      <a:endParaRPr lang="es-MX" sz="700" b="0" i="0" u="none" strike="noStrike">
+                        <a:solidFill>
+                          <a:srgbClr val="000000"/>
+                        </a:solidFill>
+                        <a:effectLst/>
+                        <a:latin typeface="Calibri" panose="020F0502020204030204" pitchFamily="34" charset="0"/>
+                      </a:endParaRPr>
+                    </a:p>
+                  </a:txBody>
+                  <a:tcPr marL="0" marR="0" marT="0" marB="0"/>
+                </a:tc>
+                <a:tc>
+                  <a:txBody>
+                    <a:bodyPr/>
+                    <a:lstStyle/>
+                    <a:p>
+                      <a:pPr algn="ctr" fontAlgn="ctr"/>
+                      <a:r>
+                        <a:rPr lang="es-MX" sz="700" u="none" strike="noStrike">
+                          <a:effectLst/>
+                        </a:rPr>
+                        <a:t>5</a:t>
+                      </a:r>
+                      <a:endParaRPr lang="es-MX" sz="700" b="0" i="0" u="none" strike="noStrike">
+                        <a:solidFill>
+                          <a:srgbClr val="000000"/>
+                        </a:solidFill>
+                        <a:effectLst/>
+                        <a:latin typeface="Calibri" panose="020F0502020204030204" pitchFamily="34" charset="0"/>
+                      </a:endParaRPr>
+                    </a:p>
+                  </a:txBody>
+                  <a:tcPr marL="0" marR="0" marT="0" marB="0" anchor="ctr"/>
+                </a:tc>
+                <a:tc>
+                  <a:txBody>
+                    <a:bodyPr/>
+                    <a:lstStyle/>
+                    <a:p>
+                      <a:pPr algn="ctr" fontAlgn="ctr"/>
+                      <a:r>
+                        <a:rPr lang="es-MX" sz="700" u="none" strike="noStrike">
+                          <a:effectLst/>
+                        </a:rPr>
+                        <a:t>15%</a:t>
+                      </a:r>
+                      <a:endParaRPr lang="es-MX" sz="700" b="0" i="0" u="none" strike="noStrike">
+                        <a:solidFill>
+                          <a:srgbClr val="000000"/>
+                        </a:solidFill>
+                        <a:effectLst/>
+                        <a:latin typeface="Calibri" panose="020F0502020204030204" pitchFamily="34" charset="0"/>
+                      </a:endParaRPr>
+                    </a:p>
+                  </a:txBody>
+                  <a:tcPr marL="0" marR="0" marT="0" marB="0" anchor="ctr"/>
+                </a:tc>
+                <a:tc>
+                  <a:txBody>
+                    <a:bodyPr/>
+                    <a:lstStyle/>
+                    <a:p>
+                      <a:pPr algn="ctr" fontAlgn="ctr"/>
+                      <a:r>
+                        <a:rPr lang="es-MX" sz="700" u="none" strike="noStrike">
+                          <a:effectLst/>
+                        </a:rPr>
+                        <a:t>0,75</a:t>
+                      </a:r>
+                      <a:endParaRPr lang="es-MX" sz="700" b="0" i="0" u="none" strike="noStrike">
+                        <a:solidFill>
+                          <a:srgbClr val="000000"/>
+                        </a:solidFill>
+                        <a:effectLst/>
+                        <a:latin typeface="Calibri" panose="020F0502020204030204" pitchFamily="34" charset="0"/>
+                      </a:endParaRPr>
+                    </a:p>
+                  </a:txBody>
+                  <a:tcPr marL="0" marR="0" marT="0" marB="0" anchor="ctr"/>
+                </a:tc>
+                <a:tc>
+                  <a:txBody>
+                    <a:bodyPr/>
+                    <a:lstStyle/>
+                    <a:p>
+                      <a:pPr algn="ctr" fontAlgn="ctr"/>
+                      <a:r>
+                        <a:rPr lang="es-MX" sz="700" u="none" strike="noStrike">
+                          <a:effectLst/>
+                        </a:rPr>
+                        <a:t>4</a:t>
+                      </a:r>
+                      <a:endParaRPr lang="es-MX" sz="700" b="0" i="0" u="none" strike="noStrike">
+                        <a:solidFill>
+                          <a:srgbClr val="000000"/>
+                        </a:solidFill>
+                        <a:effectLst/>
+                        <a:latin typeface="Calibri" panose="020F0502020204030204" pitchFamily="34" charset="0"/>
+                      </a:endParaRPr>
+                    </a:p>
+                  </a:txBody>
+                  <a:tcPr marL="0" marR="0" marT="0" marB="0" anchor="ctr"/>
+                </a:tc>
+                <a:tc>
+                  <a:txBody>
+                    <a:bodyPr/>
+                    <a:lstStyle/>
+                    <a:p>
+                      <a:pPr algn="l" fontAlgn="t"/>
+                      <a:r>
+                        <a:rPr lang="es-ES" sz="700" u="none" strike="noStrike">
+                          <a:effectLst/>
+                        </a:rPr>
+                        <a:t>Generar espaldo secundario en maquinas ajenas al repositorio</a:t>
+                      </a:r>
+                      <a:endParaRPr lang="es-ES" sz="700" b="0" i="0" u="none" strike="noStrike">
+                        <a:solidFill>
+                          <a:srgbClr val="000000"/>
+                        </a:solidFill>
+                        <a:effectLst/>
+                        <a:latin typeface="Calibri" panose="020F0502020204030204" pitchFamily="34" charset="0"/>
+                      </a:endParaRPr>
+                    </a:p>
+                  </a:txBody>
+                  <a:tcPr marL="0" marR="0" marT="0" marB="0"/>
+                </a:tc>
+                <a:tc>
+                  <a:txBody>
+                    <a:bodyPr/>
+                    <a:lstStyle/>
+                    <a:p>
+                      <a:pPr algn="l" fontAlgn="t"/>
+                      <a:r>
+                        <a:rPr lang="es-ES" sz="700" u="none" strike="noStrike">
+                          <a:effectLst/>
+                        </a:rPr>
+                        <a:t>Generacion de un repositorio nuevo que contenga los datos del proyecto agregados</a:t>
+                      </a:r>
+                      <a:endParaRPr lang="es-ES" sz="700" b="0" i="0" u="none" strike="noStrike">
+                        <a:solidFill>
+                          <a:srgbClr val="000000"/>
+                        </a:solidFill>
+                        <a:effectLst/>
+                        <a:latin typeface="Calibri" panose="020F0502020204030204" pitchFamily="34" charset="0"/>
+                      </a:endParaRPr>
+                    </a:p>
+                  </a:txBody>
+                  <a:tcPr marL="0" marR="0" marT="0" marB="0"/>
+                </a:tc>
+                <a:tc>
+                  <a:txBody>
+                    <a:bodyPr/>
+                    <a:lstStyle/>
+                    <a:p>
+                      <a:pPr algn="ctr" fontAlgn="ctr"/>
+                      <a:r>
+                        <a:rPr lang="es-MX" sz="700" u="none" strike="noStrike">
+                          <a:effectLst/>
+                        </a:rPr>
+                        <a:t>Jovanny Zepeda</a:t>
+                      </a:r>
+                      <a:endParaRPr lang="es-MX" sz="700" b="0" i="0" u="none" strike="noStrike">
+                        <a:solidFill>
+                          <a:srgbClr val="000000"/>
+                        </a:solidFill>
+                        <a:effectLst/>
+                        <a:latin typeface="Calibri" panose="020F0502020204030204" pitchFamily="34" charset="0"/>
+                      </a:endParaRPr>
+                    </a:p>
+                  </a:txBody>
+                  <a:tcPr marL="0" marR="0" marT="0" marB="0" anchor="ctr"/>
+                </a:tc>
+                <a:tc>
+                  <a:txBody>
+                    <a:bodyPr/>
+                    <a:lstStyle/>
+                    <a:p>
+                      <a:pPr algn="ctr" fontAlgn="ctr"/>
+                      <a:r>
                         <a:rPr lang="es-MX" sz="700" u="none" strike="noStrike" dirty="0">
                           <a:effectLst/>
                         </a:rPr>
@@ -5447,6 +6848,36 @@
           </a:graphicData>
         </a:graphic>
       </p:graphicFrame>
+      <p:sp>
+        <p:nvSpPr>
+          <p:cNvPr id="6" name="CuadroTexto 5"/>
+          <p:cNvSpPr txBox="1"/>
+          <p:nvPr/>
+        </p:nvSpPr>
+        <p:spPr>
+          <a:xfrm>
+            <a:off x="457200" y="5301208"/>
+            <a:ext cx="8686800" cy="1200329"/>
+          </a:xfrm>
+          <a:prstGeom prst="rect">
+            <a:avLst/>
+          </a:prstGeom>
+          <a:noFill/>
+        </p:spPr>
+        <p:txBody>
+          <a:bodyPr wrap="square" rtlCol="0">
+            <a:spAutoFit/>
+          </a:bodyPr>
+          <a:lstStyle/>
+          <a:p>
+            <a:r>
+              <a:rPr lang="es-MX" dirty="0" smtClean="0"/>
+              <a:t>Tras el arranque del proyecto se ejecutan planes de mitigación tras la creación de políticas , documentos de capacitación y capacitación del personal en secciones de trabajo , a la vez ocurre el primer problema en el proyecto tras presentarse desviaciones altas en los análisis de resultados.</a:t>
+            </a:r>
+            <a:endParaRPr lang="es-MX" dirty="0"/>
+          </a:p>
+        </p:txBody>
+      </p:sp>
     </p:spTree>
     <p:extLst>
       <p:ext uri="{BB962C8B-B14F-4D97-AF65-F5344CB8AC3E}">
@@ -6093,7 +7524,6 @@
               <a:rPr lang="en-US" dirty="0" smtClean="0"/>
               <a:t>.</a:t>
             </a:r>
-            <a:endParaRPr lang="en-US" dirty="0" smtClean="0"/>
           </a:p>
           <a:p>
             <a:pPr>
@@ -6123,7 +7553,6 @@
               <a:rPr lang="en-US" dirty="0" smtClean="0"/>
               <a:t>.</a:t>
             </a:r>
-            <a:endParaRPr lang="en-US" dirty="0" smtClean="0"/>
           </a:p>
           <a:p>
             <a:pPr>
@@ -6139,13 +7568,8 @@
             </a:r>
             <a:r>
               <a:rPr lang="en-US" dirty="0" smtClean="0"/>
-              <a:t>Mayra Tejeda      – </a:t>
-            </a:r>
-            <a:r>
-              <a:rPr lang="en-US" dirty="0" smtClean="0"/>
-              <a:t>Auditor.</a:t>
-            </a:r>
-            <a:endParaRPr lang="en-US" dirty="0" smtClean="0"/>
+              <a:t>Mayra Tejeda      – Auditor.</a:t>
+            </a:r>
           </a:p>
           <a:p>
             <a:pPr>
@@ -6453,7 +7877,7 @@
           <a:p>
             <a:r>
               <a:rPr lang="es-MX" dirty="0" smtClean="0"/>
-              <a:t>Los costos únicamente son enfocados en la planeación ya que para el mes de febrero no existe la manera de reportar gastos en entrega de servicios.</a:t>
+              <a:t>Se obtiene una desviación del 100 % en costos para la sección de entrega de servicio por ausencia de clientes a quienes brindarles el servicio.</a:t>
             </a:r>
             <a:endParaRPr lang="es-MX" dirty="0"/>
           </a:p>
@@ -6461,10 +7885,10 @@
       </p:sp>
       <p:graphicFrame>
         <p:nvGraphicFramePr>
-          <p:cNvPr id="6" name="1 Gráfico">
+          <p:cNvPr id="8" name="1 Gráfico">
             <a:extLst>
               <a:ext uri="{FF2B5EF4-FFF2-40B4-BE49-F238E27FC236}">
-                <a16:creationId xmlns:xdr="http://schemas.openxmlformats.org/drawingml/2006/spreadsheetDrawing" xmlns:a16="http://schemas.microsoft.com/office/drawing/2014/main" xmlns="" xmlns:lc="http://schemas.openxmlformats.org/drawingml/2006/lockedCanvas" id="{00000000-0008-0000-0200-000002000000}"/>
+                <a16:creationId xmlns:lc="http://schemas.openxmlformats.org/drawingml/2006/lockedCanvas" xmlns="" xmlns:a16="http://schemas.microsoft.com/office/drawing/2014/main" xmlns:xdr="http://schemas.openxmlformats.org/drawingml/2006/spreadsheetDrawing" id="{00000000-0008-0000-0200-000002000000}"/>
               </a:ext>
             </a:extLst>
           </p:cNvPr>
@@ -6474,14 +7898,14 @@
           <p:nvPr>
             <p:extLst>
               <p:ext uri="{D42A27DB-BD31-4B8C-83A1-F6EECF244321}">
-                <p14:modId xmlns:p14="http://schemas.microsoft.com/office/powerpoint/2010/main" val="3056856879"/>
+                <p14:modId xmlns:p14="http://schemas.microsoft.com/office/powerpoint/2010/main" val="549379118"/>
               </p:ext>
             </p:extLst>
           </p:nvPr>
         </p:nvGraphicFramePr>
         <p:xfrm>
-          <a:off x="457200" y="929870"/>
-          <a:ext cx="4593166" cy="2819400"/>
+          <a:off x="457200" y="908720"/>
+          <a:ext cx="4751916" cy="2819400"/>
         </p:xfrm>
         <a:graphic>
           <a:graphicData uri="http://schemas.openxmlformats.org/drawingml/2006/chart">
@@ -6491,10 +7915,10 @@
       </p:graphicFrame>
       <p:graphicFrame>
         <p:nvGraphicFramePr>
-          <p:cNvPr id="7" name="2 Gráfico">
+          <p:cNvPr id="9" name="2 Gráfico">
             <a:extLst>
               <a:ext uri="{FF2B5EF4-FFF2-40B4-BE49-F238E27FC236}">
-                <a16:creationId xmlns:xdr="http://schemas.openxmlformats.org/drawingml/2006/spreadsheetDrawing" xmlns="" xmlns:a16="http://schemas.microsoft.com/office/drawing/2014/main" xmlns:lc="http://schemas.openxmlformats.org/drawingml/2006/lockedCanvas" id="{00000000-0008-0000-0200-000003000000}"/>
+                <a16:creationId xmlns:lc="http://schemas.openxmlformats.org/drawingml/2006/lockedCanvas" xmlns="" xmlns:a16="http://schemas.microsoft.com/office/drawing/2014/main" xmlns:xdr="http://schemas.openxmlformats.org/drawingml/2006/spreadsheetDrawing" id="{00000000-0008-0000-0200-000003000000}"/>
               </a:ext>
             </a:extLst>
           </p:cNvPr>
@@ -6504,13 +7928,13 @@
           <p:nvPr>
             <p:extLst>
               <p:ext uri="{D42A27DB-BD31-4B8C-83A1-F6EECF244321}">
-                <p14:modId xmlns:p14="http://schemas.microsoft.com/office/powerpoint/2010/main" val="3125865712"/>
+                <p14:modId xmlns:p14="http://schemas.microsoft.com/office/powerpoint/2010/main" val="553017763"/>
               </p:ext>
             </p:extLst>
           </p:nvPr>
         </p:nvGraphicFramePr>
         <p:xfrm>
-          <a:off x="457200" y="3717032"/>
+          <a:off x="457200" y="3861048"/>
           <a:ext cx="4565650" cy="2800350"/>
         </p:xfrm>
         <a:graphic>
@@ -6674,10 +8098,10 @@
       </p:sp>
       <p:graphicFrame>
         <p:nvGraphicFramePr>
-          <p:cNvPr id="6" name="2 Gráfico">
+          <p:cNvPr id="8" name="2 Gráfico">
             <a:extLst>
               <a:ext uri="{FF2B5EF4-FFF2-40B4-BE49-F238E27FC236}">
-                <a16:creationId xmlns:xdr="http://schemas.openxmlformats.org/drawingml/2006/spreadsheetDrawing" xmlns="" xmlns:a16="http://schemas.microsoft.com/office/drawing/2014/main" xmlns:lc="http://schemas.openxmlformats.org/drawingml/2006/lockedCanvas" id="{00000000-0008-0000-0100-000003000000}"/>
+                <a16:creationId xmlns:lc="http://schemas.openxmlformats.org/drawingml/2006/lockedCanvas" xmlns="" xmlns:a16="http://schemas.microsoft.com/office/drawing/2014/main" xmlns:xdr="http://schemas.openxmlformats.org/drawingml/2006/spreadsheetDrawing" id="{00000000-0008-0000-0100-000003000000}"/>
               </a:ext>
             </a:extLst>
           </p:cNvPr>
@@ -6687,14 +8111,14 @@
           <p:nvPr>
             <p:extLst>
               <p:ext uri="{D42A27DB-BD31-4B8C-83A1-F6EECF244321}">
-                <p14:modId xmlns:p14="http://schemas.microsoft.com/office/powerpoint/2010/main" val="1665211760"/>
+                <p14:modId xmlns:p14="http://schemas.microsoft.com/office/powerpoint/2010/main" val="2054981663"/>
               </p:ext>
             </p:extLst>
           </p:nvPr>
         </p:nvGraphicFramePr>
         <p:xfrm>
-          <a:off x="683568" y="1600200"/>
-          <a:ext cx="7848872" cy="2745317"/>
+          <a:off x="827584" y="1600200"/>
+          <a:ext cx="6830483" cy="2745317"/>
         </p:xfrm>
         <a:graphic>
           <a:graphicData uri="http://schemas.openxmlformats.org/drawingml/2006/chart">
@@ -6704,10 +8128,10 @@
       </p:graphicFrame>
       <p:graphicFrame>
         <p:nvGraphicFramePr>
-          <p:cNvPr id="7" name="4 Gráfico">
+          <p:cNvPr id="9" name="4 Gráfico">
             <a:extLst>
               <a:ext uri="{FF2B5EF4-FFF2-40B4-BE49-F238E27FC236}">
-                <a16:creationId xmlns:xdr="http://schemas.openxmlformats.org/drawingml/2006/spreadsheetDrawing" xmlns="" xmlns:a16="http://schemas.microsoft.com/office/drawing/2014/main" xmlns:lc="http://schemas.openxmlformats.org/drawingml/2006/lockedCanvas" id="{00000000-0008-0000-0100-000005000000}"/>
+                <a16:creationId xmlns:lc="http://schemas.openxmlformats.org/drawingml/2006/lockedCanvas" xmlns="" xmlns:a16="http://schemas.microsoft.com/office/drawing/2014/main" xmlns:xdr="http://schemas.openxmlformats.org/drawingml/2006/spreadsheetDrawing" id="{00000000-0008-0000-0100-000005000000}"/>
               </a:ext>
             </a:extLst>
           </p:cNvPr>
@@ -6717,14 +8141,14 @@
           <p:nvPr>
             <p:extLst>
               <p:ext uri="{D42A27DB-BD31-4B8C-83A1-F6EECF244321}">
-                <p14:modId xmlns:p14="http://schemas.microsoft.com/office/powerpoint/2010/main" val="2566341572"/>
+                <p14:modId xmlns:p14="http://schemas.microsoft.com/office/powerpoint/2010/main" val="3481594359"/>
               </p:ext>
             </p:extLst>
           </p:nvPr>
         </p:nvGraphicFramePr>
         <p:xfrm>
-          <a:off x="899592" y="4509120"/>
-          <a:ext cx="7488832" cy="2339036"/>
+          <a:off x="681621" y="4075586"/>
+          <a:ext cx="5971117" cy="2817284"/>
         </p:xfrm>
         <a:graphic>
           <a:graphicData uri="http://schemas.openxmlformats.org/drawingml/2006/chart">

</xml_diff>

<commit_message>
Actualizando hitos correctos Febrero
</commit_message>
<xml_diff>
--- a/qualtcom/Organizacional/Medicion y Monitoreo/Reporte Monitoreo-150227.pptx
+++ b/qualtcom/Organizacional/Medicion y Monitoreo/Reporte Monitoreo-150227.pptx
@@ -283,11 +283,11 @@
           <c:showBubbleSize val="0"/>
         </c:dLbls>
         <c:gapWidth val="150"/>
-        <c:axId val="94994176"/>
-        <c:axId val="182232704"/>
+        <c:axId val="97727232"/>
+        <c:axId val="97727792"/>
       </c:barChart>
       <c:catAx>
-        <c:axId val="94994176"/>
+        <c:axId val="97727232"/>
         <c:scaling>
           <c:orientation val="minMax"/>
         </c:scaling>
@@ -297,7 +297,7 @@
         <c:majorTickMark val="none"/>
         <c:minorTickMark val="none"/>
         <c:tickLblPos val="nextTo"/>
-        <c:crossAx val="182232704"/>
+        <c:crossAx val="97727792"/>
         <c:crosses val="autoZero"/>
         <c:auto val="1"/>
         <c:lblAlgn val="ctr"/>
@@ -305,7 +305,7 @@
         <c:noMultiLvlLbl val="0"/>
       </c:catAx>
       <c:valAx>
-        <c:axId val="182232704"/>
+        <c:axId val="97727792"/>
         <c:scaling>
           <c:orientation val="minMax"/>
         </c:scaling>
@@ -316,7 +316,7 @@
         <c:majorTickMark val="none"/>
         <c:minorTickMark val="none"/>
         <c:tickLblPos val="nextTo"/>
-        <c:crossAx val="94994176"/>
+        <c:crossAx val="97727232"/>
         <c:crosses val="autoZero"/>
         <c:crossBetween val="between"/>
       </c:valAx>
@@ -433,11 +433,11 @@
           <c:showBubbleSize val="0"/>
         </c:dLbls>
         <c:gapWidth val="150"/>
-        <c:axId val="182234944"/>
-        <c:axId val="182235504"/>
+        <c:axId val="97730032"/>
+        <c:axId val="100640928"/>
       </c:barChart>
       <c:catAx>
-        <c:axId val="182234944"/>
+        <c:axId val="97730032"/>
         <c:scaling>
           <c:orientation val="minMax"/>
         </c:scaling>
@@ -447,7 +447,7 @@
         <c:majorTickMark val="out"/>
         <c:minorTickMark val="none"/>
         <c:tickLblPos val="nextTo"/>
-        <c:crossAx val="182235504"/>
+        <c:crossAx val="100640928"/>
         <c:crosses val="autoZero"/>
         <c:auto val="1"/>
         <c:lblAlgn val="ctr"/>
@@ -455,7 +455,7 @@
         <c:noMultiLvlLbl val="0"/>
       </c:catAx>
       <c:valAx>
-        <c:axId val="182235504"/>
+        <c:axId val="100640928"/>
         <c:scaling>
           <c:orientation val="minMax"/>
           <c:max val="1"/>
@@ -468,7 +468,7 @@
         <c:majorTickMark val="out"/>
         <c:minorTickMark val="none"/>
         <c:tickLblPos val="nextTo"/>
-        <c:crossAx val="182234944"/>
+        <c:crossAx val="97730032"/>
         <c:crosses val="autoZero"/>
         <c:crossBetween val="between"/>
       </c:valAx>
@@ -721,11 +721,11 @@
           <c:showBubbleSize val="0"/>
         </c:dLbls>
         <c:gapWidth val="150"/>
-        <c:axId val="186699072"/>
-        <c:axId val="186699632"/>
+        <c:axId val="100643728"/>
+        <c:axId val="100644288"/>
       </c:barChart>
       <c:catAx>
-        <c:axId val="186699072"/>
+        <c:axId val="100643728"/>
         <c:scaling>
           <c:orientation val="minMax"/>
         </c:scaling>
@@ -735,7 +735,7 @@
         <c:majorTickMark val="none"/>
         <c:minorTickMark val="none"/>
         <c:tickLblPos val="nextTo"/>
-        <c:crossAx val="186699632"/>
+        <c:crossAx val="100644288"/>
         <c:crosses val="autoZero"/>
         <c:auto val="1"/>
         <c:lblAlgn val="ctr"/>
@@ -743,7 +743,7 @@
         <c:noMultiLvlLbl val="0"/>
       </c:catAx>
       <c:valAx>
-        <c:axId val="186699632"/>
+        <c:axId val="100644288"/>
         <c:scaling>
           <c:orientation val="minMax"/>
         </c:scaling>
@@ -754,7 +754,7 @@
         <c:majorTickMark val="none"/>
         <c:minorTickMark val="none"/>
         <c:tickLblPos val="nextTo"/>
-        <c:crossAx val="186699072"/>
+        <c:crossAx val="100643728"/>
         <c:crosses val="autoZero"/>
         <c:crossBetween val="between"/>
       </c:valAx>
@@ -919,11 +919,11 @@
           <c:showBubbleSize val="0"/>
         </c:dLbls>
         <c:gapWidth val="150"/>
-        <c:axId val="183867808"/>
-        <c:axId val="183868368"/>
+        <c:axId val="100646528"/>
+        <c:axId val="100647088"/>
       </c:barChart>
       <c:catAx>
-        <c:axId val="183867808"/>
+        <c:axId val="100646528"/>
         <c:scaling>
           <c:orientation val="minMax"/>
         </c:scaling>
@@ -933,7 +933,7 @@
         <c:majorTickMark val="out"/>
         <c:minorTickMark val="none"/>
         <c:tickLblPos val="nextTo"/>
-        <c:crossAx val="183868368"/>
+        <c:crossAx val="100647088"/>
         <c:crosses val="autoZero"/>
         <c:auto val="1"/>
         <c:lblAlgn val="ctr"/>
@@ -941,7 +941,7 @@
         <c:noMultiLvlLbl val="0"/>
       </c:catAx>
       <c:valAx>
-        <c:axId val="183868368"/>
+        <c:axId val="100647088"/>
         <c:scaling>
           <c:orientation val="minMax"/>
           <c:max val="1"/>
@@ -954,7 +954,7 @@
         <c:majorTickMark val="out"/>
         <c:minorTickMark val="none"/>
         <c:tickLblPos val="nextTo"/>
-        <c:crossAx val="183867808"/>
+        <c:crossAx val="100646528"/>
         <c:crosses val="autoZero"/>
         <c:crossBetween val="between"/>
       </c:valAx>
@@ -1062,11 +1062,11 @@
           <c:showBubbleSize val="0"/>
         </c:dLbls>
         <c:gapWidth val="150"/>
-        <c:axId val="183870608"/>
-        <c:axId val="183886000"/>
+        <c:axId val="100178752"/>
+        <c:axId val="100179312"/>
       </c:barChart>
       <c:catAx>
-        <c:axId val="183870608"/>
+        <c:axId val="100178752"/>
         <c:scaling>
           <c:orientation val="minMax"/>
         </c:scaling>
@@ -1076,7 +1076,7 @@
         <c:majorTickMark val="none"/>
         <c:minorTickMark val="none"/>
         <c:tickLblPos val="nextTo"/>
-        <c:crossAx val="183886000"/>
+        <c:crossAx val="100179312"/>
         <c:crosses val="autoZero"/>
         <c:auto val="1"/>
         <c:lblAlgn val="ctr"/>
@@ -1084,7 +1084,7 @@
         <c:noMultiLvlLbl val="0"/>
       </c:catAx>
       <c:valAx>
-        <c:axId val="183886000"/>
+        <c:axId val="100179312"/>
         <c:scaling>
           <c:orientation val="minMax"/>
           <c:max val="1"/>
@@ -1096,7 +1096,7 @@
         <c:majorTickMark val="none"/>
         <c:minorTickMark val="none"/>
         <c:tickLblPos val="nextTo"/>
-        <c:crossAx val="183870608"/>
+        <c:crossAx val="100178752"/>
         <c:crosses val="autoZero"/>
         <c:crossBetween val="between"/>
       </c:valAx>
@@ -1218,11 +1218,11 @@
           <c:showBubbleSize val="0"/>
         </c:dLbls>
         <c:gapWidth val="150"/>
-        <c:axId val="183888800"/>
-        <c:axId val="183889360"/>
+        <c:axId val="100181552"/>
+        <c:axId val="100182112"/>
       </c:barChart>
       <c:catAx>
-        <c:axId val="183888800"/>
+        <c:axId val="100181552"/>
         <c:scaling>
           <c:orientation val="minMax"/>
         </c:scaling>
@@ -1232,7 +1232,7 @@
         <c:majorTickMark val="none"/>
         <c:minorTickMark val="none"/>
         <c:tickLblPos val="nextTo"/>
-        <c:crossAx val="183889360"/>
+        <c:crossAx val="100182112"/>
         <c:crosses val="autoZero"/>
         <c:auto val="1"/>
         <c:lblAlgn val="ctr"/>
@@ -1240,7 +1240,7 @@
         <c:noMultiLvlLbl val="0"/>
       </c:catAx>
       <c:valAx>
-        <c:axId val="183889360"/>
+        <c:axId val="100182112"/>
         <c:scaling>
           <c:orientation val="minMax"/>
           <c:max val="1"/>
@@ -1252,7 +1252,7 @@
         <c:majorTickMark val="none"/>
         <c:minorTickMark val="none"/>
         <c:tickLblPos val="nextTo"/>
-        <c:crossAx val="183888800"/>
+        <c:crossAx val="100181552"/>
         <c:crosses val="autoZero"/>
         <c:crossBetween val="between"/>
       </c:valAx>
@@ -1376,11 +1376,11 @@
           <c:showBubbleSize val="0"/>
         </c:dLbls>
         <c:gapWidth val="150"/>
-        <c:axId val="184261840"/>
-        <c:axId val="184262400"/>
+        <c:axId val="100184912"/>
+        <c:axId val="100185472"/>
       </c:barChart>
       <c:catAx>
-        <c:axId val="184261840"/>
+        <c:axId val="100184912"/>
         <c:scaling>
           <c:orientation val="minMax"/>
         </c:scaling>
@@ -1390,7 +1390,7 @@
         <c:majorTickMark val="none"/>
         <c:minorTickMark val="none"/>
         <c:tickLblPos val="nextTo"/>
-        <c:crossAx val="184262400"/>
+        <c:crossAx val="100185472"/>
         <c:crosses val="autoZero"/>
         <c:auto val="1"/>
         <c:lblAlgn val="ctr"/>
@@ -1398,7 +1398,7 @@
         <c:noMultiLvlLbl val="0"/>
       </c:catAx>
       <c:valAx>
-        <c:axId val="184262400"/>
+        <c:axId val="100185472"/>
         <c:scaling>
           <c:orientation val="minMax"/>
           <c:max val="1"/>
@@ -1410,7 +1410,7 @@
         <c:majorTickMark val="none"/>
         <c:minorTickMark val="none"/>
         <c:tickLblPos val="nextTo"/>
-        <c:crossAx val="184261840"/>
+        <c:crossAx val="100184912"/>
         <c:crosses val="autoZero"/>
         <c:crossBetween val="between"/>
       </c:valAx>
@@ -1524,11 +1524,11 @@
           <c:showBubbleSize val="0"/>
         </c:dLbls>
         <c:gapWidth val="150"/>
-        <c:axId val="184269472"/>
-        <c:axId val="184270032"/>
+        <c:axId val="101335744"/>
+        <c:axId val="101336304"/>
       </c:barChart>
       <c:catAx>
-        <c:axId val="184269472"/>
+        <c:axId val="101335744"/>
         <c:scaling>
           <c:orientation val="minMax"/>
         </c:scaling>
@@ -1538,7 +1538,7 @@
         <c:majorTickMark val="none"/>
         <c:minorTickMark val="none"/>
         <c:tickLblPos val="nextTo"/>
-        <c:crossAx val="184270032"/>
+        <c:crossAx val="101336304"/>
         <c:crosses val="autoZero"/>
         <c:auto val="1"/>
         <c:lblAlgn val="ctr"/>
@@ -1546,7 +1546,7 @@
         <c:noMultiLvlLbl val="0"/>
       </c:catAx>
       <c:valAx>
-        <c:axId val="184270032"/>
+        <c:axId val="101336304"/>
         <c:scaling>
           <c:orientation val="minMax"/>
         </c:scaling>
@@ -1557,7 +1557,7 @@
         <c:majorTickMark val="none"/>
         <c:minorTickMark val="none"/>
         <c:tickLblPos val="nextTo"/>
-        <c:crossAx val="184269472"/>
+        <c:crossAx val="101335744"/>
         <c:crosses val="autoZero"/>
         <c:crossBetween val="between"/>
       </c:valAx>
@@ -7265,14 +7265,14 @@
           <p:nvPr>
             <p:extLst>
               <p:ext uri="{D42A27DB-BD31-4B8C-83A1-F6EECF244321}">
-                <p14:modId xmlns:p14="http://schemas.microsoft.com/office/powerpoint/2010/main" val="2096550117"/>
+                <p14:modId xmlns:p14="http://schemas.microsoft.com/office/powerpoint/2010/main" val="1817111891"/>
               </p:ext>
             </p:extLst>
           </p:nvPr>
         </p:nvGraphicFramePr>
         <p:xfrm>
           <a:off x="1524000" y="1397000"/>
-          <a:ext cx="6096000" cy="741680"/>
+          <a:ext cx="6096000" cy="1112520"/>
         </p:xfrm>
         <a:graphic>
           <a:graphicData uri="http://schemas.openxmlformats.org/drawingml/2006/table">
@@ -7376,6 +7376,53 @@
                       <a:r>
                         <a:rPr lang="es-MX" dirty="0" smtClean="0"/>
                         <a:t>09-02-2015</a:t>
+                      </a:r>
+                      <a:endParaRPr lang="es-MX" dirty="0"/>
+                    </a:p>
+                  </a:txBody>
+                  <a:tcPr/>
+                </a:tc>
+              </a:tr>
+              <a:tr h="370840">
+                <a:tc>
+                  <a:txBody>
+                    <a:bodyPr/>
+                    <a:lstStyle/>
+                    <a:p>
+                      <a:pPr algn="ctr"/>
+                      <a:r>
+                        <a:rPr lang="es-MX" dirty="0" smtClean="0"/>
+                        <a:t>Febrero</a:t>
+                      </a:r>
+                      <a:endParaRPr lang="es-MX" dirty="0"/>
+                    </a:p>
+                  </a:txBody>
+                  <a:tcPr/>
+                </a:tc>
+                <a:tc>
+                  <a:txBody>
+                    <a:bodyPr/>
+                    <a:lstStyle/>
+                    <a:p>
+                      <a:pPr algn="ctr"/>
+                      <a:r>
+                        <a:rPr lang="es-MX" dirty="0" smtClean="0"/>
+                        <a:t>27-02-15</a:t>
+                      </a:r>
+                      <a:endParaRPr lang="es-MX" dirty="0"/>
+                    </a:p>
+                  </a:txBody>
+                  <a:tcPr/>
+                </a:tc>
+                <a:tc>
+                  <a:txBody>
+                    <a:bodyPr/>
+                    <a:lstStyle/>
+                    <a:p>
+                      <a:pPr algn="ctr"/>
+                      <a:r>
+                        <a:rPr lang="es-MX" dirty="0" smtClean="0"/>
+                        <a:t>27-02-15</a:t>
                       </a:r>
                       <a:endParaRPr lang="es-MX" dirty="0"/>
                     </a:p>
@@ -7888,7 +7935,7 @@
           <p:cNvPr id="8" name="1 Gráfico">
             <a:extLst>
               <a:ext uri="{FF2B5EF4-FFF2-40B4-BE49-F238E27FC236}">
-                <a16:creationId xmlns:lc="http://schemas.openxmlformats.org/drawingml/2006/lockedCanvas" xmlns="" xmlns:a16="http://schemas.microsoft.com/office/drawing/2014/main" xmlns:xdr="http://schemas.openxmlformats.org/drawingml/2006/spreadsheetDrawing" id="{00000000-0008-0000-0200-000002000000}"/>
+                <a16:creationId xmlns:xdr="http://schemas.openxmlformats.org/drawingml/2006/spreadsheetDrawing" xmlns:a16="http://schemas.microsoft.com/office/drawing/2014/main" xmlns="" xmlns:lc="http://schemas.openxmlformats.org/drawingml/2006/lockedCanvas" id="{00000000-0008-0000-0200-000002000000}"/>
               </a:ext>
             </a:extLst>
           </p:cNvPr>
@@ -7918,7 +7965,7 @@
           <p:cNvPr id="9" name="2 Gráfico">
             <a:extLst>
               <a:ext uri="{FF2B5EF4-FFF2-40B4-BE49-F238E27FC236}">
-                <a16:creationId xmlns:lc="http://schemas.openxmlformats.org/drawingml/2006/lockedCanvas" xmlns="" xmlns:a16="http://schemas.microsoft.com/office/drawing/2014/main" xmlns:xdr="http://schemas.openxmlformats.org/drawingml/2006/spreadsheetDrawing" id="{00000000-0008-0000-0200-000003000000}"/>
+                <a16:creationId xmlns:xdr="http://schemas.openxmlformats.org/drawingml/2006/spreadsheetDrawing" xmlns:a16="http://schemas.microsoft.com/office/drawing/2014/main" xmlns="" xmlns:lc="http://schemas.openxmlformats.org/drawingml/2006/lockedCanvas" id="{00000000-0008-0000-0200-000003000000}"/>
               </a:ext>
             </a:extLst>
           </p:cNvPr>
@@ -8101,7 +8148,7 @@
           <p:cNvPr id="8" name="2 Gráfico">
             <a:extLst>
               <a:ext uri="{FF2B5EF4-FFF2-40B4-BE49-F238E27FC236}">
-                <a16:creationId xmlns:lc="http://schemas.openxmlformats.org/drawingml/2006/lockedCanvas" xmlns="" xmlns:a16="http://schemas.microsoft.com/office/drawing/2014/main" xmlns:xdr="http://schemas.openxmlformats.org/drawingml/2006/spreadsheetDrawing" id="{00000000-0008-0000-0100-000003000000}"/>
+                <a16:creationId xmlns:xdr="http://schemas.openxmlformats.org/drawingml/2006/spreadsheetDrawing" xmlns:a16="http://schemas.microsoft.com/office/drawing/2014/main" xmlns="" xmlns:lc="http://schemas.openxmlformats.org/drawingml/2006/lockedCanvas" id="{00000000-0008-0000-0100-000003000000}"/>
               </a:ext>
             </a:extLst>
           </p:cNvPr>
@@ -8131,7 +8178,7 @@
           <p:cNvPr id="9" name="4 Gráfico">
             <a:extLst>
               <a:ext uri="{FF2B5EF4-FFF2-40B4-BE49-F238E27FC236}">
-                <a16:creationId xmlns:lc="http://schemas.openxmlformats.org/drawingml/2006/lockedCanvas" xmlns="" xmlns:a16="http://schemas.microsoft.com/office/drawing/2014/main" xmlns:xdr="http://schemas.openxmlformats.org/drawingml/2006/spreadsheetDrawing" id="{00000000-0008-0000-0100-000005000000}"/>
+                <a16:creationId xmlns:xdr="http://schemas.openxmlformats.org/drawingml/2006/spreadsheetDrawing" xmlns:a16="http://schemas.microsoft.com/office/drawing/2014/main" xmlns="" xmlns:lc="http://schemas.openxmlformats.org/drawingml/2006/lockedCanvas" id="{00000000-0008-0000-0100-000005000000}"/>
               </a:ext>
             </a:extLst>
           </p:cNvPr>
@@ -8284,7 +8331,7 @@
           <p:cNvPr id="4" name="1 Gráfico">
             <a:extLst>
               <a:ext uri="{FF2B5EF4-FFF2-40B4-BE49-F238E27FC236}">
-                <a16:creationId xmlns:xdr="http://schemas.openxmlformats.org/drawingml/2006/spreadsheetDrawing" xmlns="" xmlns:a16="http://schemas.microsoft.com/office/drawing/2014/main" xmlns:lc="http://schemas.openxmlformats.org/drawingml/2006/lockedCanvas" id="{00000000-0008-0000-0500-000002000000}"/>
+                <a16:creationId xmlns:lc="http://schemas.openxmlformats.org/drawingml/2006/lockedCanvas" xmlns:a16="http://schemas.microsoft.com/office/drawing/2014/main" xmlns="" xmlns:xdr="http://schemas.openxmlformats.org/drawingml/2006/spreadsheetDrawing" id="{00000000-0008-0000-0500-000002000000}"/>
               </a:ext>
             </a:extLst>
           </p:cNvPr>
@@ -8467,7 +8514,7 @@
           <p:cNvPr id="4" name="1 Gráfico">
             <a:extLst>
               <a:ext uri="{FF2B5EF4-FFF2-40B4-BE49-F238E27FC236}">
-                <a16:creationId xmlns:xdr="http://schemas.openxmlformats.org/drawingml/2006/spreadsheetDrawing" xmlns="" xmlns:a16="http://schemas.microsoft.com/office/drawing/2014/main" xmlns:lc="http://schemas.openxmlformats.org/drawingml/2006/lockedCanvas" id="{00000000-0008-0000-0600-000002000000}"/>
+                <a16:creationId xmlns:lc="http://schemas.openxmlformats.org/drawingml/2006/lockedCanvas" xmlns:a16="http://schemas.microsoft.com/office/drawing/2014/main" xmlns="" xmlns:xdr="http://schemas.openxmlformats.org/drawingml/2006/spreadsheetDrawing" id="{00000000-0008-0000-0600-000002000000}"/>
               </a:ext>
             </a:extLst>
           </p:cNvPr>
@@ -8650,7 +8697,7 @@
           <p:cNvPr id="8" name="1 Gráfico">
             <a:extLst>
               <a:ext uri="{FF2B5EF4-FFF2-40B4-BE49-F238E27FC236}">
-                <a16:creationId xmlns:xdr="http://schemas.openxmlformats.org/drawingml/2006/spreadsheetDrawing" xmlns:a16="http://schemas.microsoft.com/office/drawing/2014/main" xmlns="" xmlns:lc="http://schemas.openxmlformats.org/drawingml/2006/lockedCanvas" id="{00000000-0008-0000-0400-000002000000}"/>
+                <a16:creationId xmlns:lc="http://schemas.openxmlformats.org/drawingml/2006/lockedCanvas" xmlns="" xmlns:a16="http://schemas.microsoft.com/office/drawing/2014/main" xmlns:xdr="http://schemas.openxmlformats.org/drawingml/2006/spreadsheetDrawing" id="{00000000-0008-0000-0400-000002000000}"/>
               </a:ext>
             </a:extLst>
           </p:cNvPr>
@@ -8833,7 +8880,7 @@
           <p:cNvPr id="7" name="4 Gráfico">
             <a:extLst>
               <a:ext uri="{FF2B5EF4-FFF2-40B4-BE49-F238E27FC236}">
-                <a16:creationId xmlns:xdr="http://schemas.openxmlformats.org/drawingml/2006/spreadsheetDrawing" xmlns:a16="http://schemas.microsoft.com/office/drawing/2014/main" xmlns="" xmlns:lc="http://schemas.openxmlformats.org/drawingml/2006/lockedCanvas" id="{00000000-0008-0000-0300-000005000000}"/>
+                <a16:creationId xmlns:lc="http://schemas.openxmlformats.org/drawingml/2006/lockedCanvas" xmlns="" xmlns:a16="http://schemas.microsoft.com/office/drawing/2014/main" xmlns:xdr="http://schemas.openxmlformats.org/drawingml/2006/spreadsheetDrawing" id="{00000000-0008-0000-0300-000005000000}"/>
               </a:ext>
             </a:extLst>
           </p:cNvPr>

</xml_diff>